<commit_message>
Update Grupo 3 - Proyecto v2.pptx
</commit_message>
<xml_diff>
--- a/group3/Grupo 3 - Proyecto v2.pptx
+++ b/group3/Grupo 3 - Proyecto v2.pptx
@@ -10,8 +10,8 @@
   <p:sldIdLst>
     <p:sldId id="256" r:id="rId2"/>
     <p:sldId id="294" r:id="rId3"/>
-    <p:sldId id="304" r:id="rId4"/>
-    <p:sldId id="297" r:id="rId5"/>
+    <p:sldId id="297" r:id="rId4"/>
+    <p:sldId id="304" r:id="rId5"/>
     <p:sldId id="303" r:id="rId6"/>
   </p:sldIdLst>
   <p:sldSz cx="9144000" cy="5143500" type="screen16x9"/>
@@ -1253,6 +1253,13 @@
         </dgm:presLayoutVars>
       </dgm:prSet>
       <dgm:spPr/>
+      <dgm:t>
+        <a:bodyPr/>
+        <a:lstStyle/>
+        <a:p>
+          <a:endParaRPr lang="es-ES"/>
+        </a:p>
+      </dgm:t>
     </dgm:pt>
     <dgm:pt modelId="{89F738FC-CE16-445B-9850-BC3803597A02}" type="pres">
       <dgm:prSet presAssocID="{C5287B51-1012-4F92-939A-D5B298001D67}" presName="parentText" presStyleLbl="node1" presStyleIdx="0" presStyleCnt="1">
@@ -1262,6 +1269,13 @@
         </dgm:presLayoutVars>
       </dgm:prSet>
       <dgm:spPr/>
+      <dgm:t>
+        <a:bodyPr/>
+        <a:lstStyle/>
+        <a:p>
+          <a:endParaRPr lang="es-ES"/>
+        </a:p>
+      </dgm:t>
     </dgm:pt>
     <dgm:pt modelId="{EBCFE681-1D9D-4878-A425-EA926DA7B110}" type="pres">
       <dgm:prSet presAssocID="{C5287B51-1012-4F92-939A-D5B298001D67}" presName="childText" presStyleLbl="revTx" presStyleIdx="0" presStyleCnt="1">
@@ -1270,20 +1284,27 @@
         </dgm:presLayoutVars>
       </dgm:prSet>
       <dgm:spPr/>
+      <dgm:t>
+        <a:bodyPr/>
+        <a:lstStyle/>
+        <a:p>
+          <a:endParaRPr lang="es-ES"/>
+        </a:p>
+      </dgm:t>
     </dgm:pt>
   </dgm:ptLst>
   <dgm:cxnLst>
+    <dgm:cxn modelId="{0CDA7C7F-B3F7-4FBB-85D8-099C4B1444EE}" srcId="{C5287B51-1012-4F92-939A-D5B298001D67}" destId="{527539A6-A675-487C-AFDD-CFFE0BB8871F}" srcOrd="3" destOrd="0" parTransId="{2E90825F-3035-4107-8B65-A38D4F8EC631}" sibTransId="{DBC6C143-AE1D-4D8C-98A6-6EAE4976D7B4}"/>
+    <dgm:cxn modelId="{783170DA-6512-47C2-B394-1BABFEAE8115}" type="presOf" srcId="{527539A6-A675-487C-AFDD-CFFE0BB8871F}" destId="{EBCFE681-1D9D-4878-A425-EA926DA7B110}" srcOrd="0" destOrd="3" presId="urn:microsoft.com/office/officeart/2005/8/layout/vList2"/>
+    <dgm:cxn modelId="{BE64D4C1-65BD-4CEB-8BEA-77C84F6A8003}" type="presOf" srcId="{969B1D3F-F4B8-4A07-9978-E971692FCC8B}" destId="{EBCFE681-1D9D-4878-A425-EA926DA7B110}" srcOrd="0" destOrd="0" presId="urn:microsoft.com/office/officeart/2005/8/layout/vList2"/>
+    <dgm:cxn modelId="{2F24E150-9766-4E6D-812C-FCA779B30D94}" srcId="{F9FDCCDF-D4A9-4428-9180-B0B279784287}" destId="{C5287B51-1012-4F92-939A-D5B298001D67}" srcOrd="0" destOrd="0" parTransId="{E5DD2BBC-6D3D-4621-9FEE-44E6E28DD7CA}" sibTransId="{89FB0CF1-3797-4A5F-8E9C-2E2EA75EFE5B}"/>
     <dgm:cxn modelId="{193AE806-6CD3-4A2A-97E9-15AD7F2BEB97}" srcId="{C5287B51-1012-4F92-939A-D5B298001D67}" destId="{DE3C2C9A-58A4-42C4-A593-333E7F985B7C}" srcOrd="1" destOrd="0" parTransId="{5ECDE711-B5E3-4A9E-9770-60D75956F64A}" sibTransId="{F137AB4D-D21D-4B32-9ADC-81CD81666216}"/>
+    <dgm:cxn modelId="{FF14E0CE-1F69-4C96-B4C5-57E8365E1E66}" srcId="{C5287B51-1012-4F92-939A-D5B298001D67}" destId="{2C3D8975-0F25-4220-BE49-314596DEE939}" srcOrd="2" destOrd="0" parTransId="{C4A17332-4183-4E45-8311-2645AD35D110}" sibTransId="{5F0D1771-6262-47C0-82EC-99265A240EA3}"/>
     <dgm:cxn modelId="{78F79F09-EA20-4177-A74F-A063CF358A36}" type="presOf" srcId="{F9FDCCDF-D4A9-4428-9180-B0B279784287}" destId="{2255413B-B72D-4A5E-83E2-D8B0FF15F052}" srcOrd="0" destOrd="0" presId="urn:microsoft.com/office/officeart/2005/8/layout/vList2"/>
-    <dgm:cxn modelId="{46381E67-BC60-4B80-9D6C-11B067309D3B}" type="presOf" srcId="{C5287B51-1012-4F92-939A-D5B298001D67}" destId="{89F738FC-CE16-445B-9850-BC3803597A02}" srcOrd="0" destOrd="0" presId="urn:microsoft.com/office/officeart/2005/8/layout/vList2"/>
-    <dgm:cxn modelId="{2F24E150-9766-4E6D-812C-FCA779B30D94}" srcId="{F9FDCCDF-D4A9-4428-9180-B0B279784287}" destId="{C5287B51-1012-4F92-939A-D5B298001D67}" srcOrd="0" destOrd="0" parTransId="{E5DD2BBC-6D3D-4621-9FEE-44E6E28DD7CA}" sibTransId="{89FB0CF1-3797-4A5F-8E9C-2E2EA75EFE5B}"/>
     <dgm:cxn modelId="{D12B7052-0B93-4736-AD97-15915BACBE43}" type="presOf" srcId="{DE3C2C9A-58A4-42C4-A593-333E7F985B7C}" destId="{EBCFE681-1D9D-4878-A425-EA926DA7B110}" srcOrd="0" destOrd="1" presId="urn:microsoft.com/office/officeart/2005/8/layout/vList2"/>
     <dgm:cxn modelId="{655E7F73-04C0-406B-A4AB-97C07B0C6D91}" type="presOf" srcId="{2C3D8975-0F25-4220-BE49-314596DEE939}" destId="{EBCFE681-1D9D-4878-A425-EA926DA7B110}" srcOrd="0" destOrd="2" presId="urn:microsoft.com/office/officeart/2005/8/layout/vList2"/>
-    <dgm:cxn modelId="{0CDA7C7F-B3F7-4FBB-85D8-099C4B1444EE}" srcId="{C5287B51-1012-4F92-939A-D5B298001D67}" destId="{527539A6-A675-487C-AFDD-CFFE0BB8871F}" srcOrd="3" destOrd="0" parTransId="{2E90825F-3035-4107-8B65-A38D4F8EC631}" sibTransId="{DBC6C143-AE1D-4D8C-98A6-6EAE4976D7B4}"/>
-    <dgm:cxn modelId="{BE64D4C1-65BD-4CEB-8BEA-77C84F6A8003}" type="presOf" srcId="{969B1D3F-F4B8-4A07-9978-E971692FCC8B}" destId="{EBCFE681-1D9D-4878-A425-EA926DA7B110}" srcOrd="0" destOrd="0" presId="urn:microsoft.com/office/officeart/2005/8/layout/vList2"/>
-    <dgm:cxn modelId="{FF14E0CE-1F69-4C96-B4C5-57E8365E1E66}" srcId="{C5287B51-1012-4F92-939A-D5B298001D67}" destId="{2C3D8975-0F25-4220-BE49-314596DEE939}" srcOrd="2" destOrd="0" parTransId="{C4A17332-4183-4E45-8311-2645AD35D110}" sibTransId="{5F0D1771-6262-47C0-82EC-99265A240EA3}"/>
-    <dgm:cxn modelId="{783170DA-6512-47C2-B394-1BABFEAE8115}" type="presOf" srcId="{527539A6-A675-487C-AFDD-CFFE0BB8871F}" destId="{EBCFE681-1D9D-4878-A425-EA926DA7B110}" srcOrd="0" destOrd="3" presId="urn:microsoft.com/office/officeart/2005/8/layout/vList2"/>
     <dgm:cxn modelId="{7680A1E5-080D-4138-A6FF-1CA36E9AF9BD}" srcId="{C5287B51-1012-4F92-939A-D5B298001D67}" destId="{969B1D3F-F4B8-4A07-9978-E971692FCC8B}" srcOrd="0" destOrd="0" parTransId="{A179ED19-EB3B-42BC-83B9-54A40CC705E3}" sibTransId="{855D2E37-E97B-462D-9AA0-CB8578EC9B01}"/>
+    <dgm:cxn modelId="{46381E67-BC60-4B80-9D6C-11B067309D3B}" type="presOf" srcId="{C5287B51-1012-4F92-939A-D5B298001D67}" destId="{89F738FC-CE16-445B-9850-BC3803597A02}" srcOrd="0" destOrd="0" presId="urn:microsoft.com/office/officeart/2005/8/layout/vList2"/>
     <dgm:cxn modelId="{C5025EE4-011E-469A-A738-7B7957FDEEA5}" type="presParOf" srcId="{2255413B-B72D-4A5E-83E2-D8B0FF15F052}" destId="{89F738FC-CE16-445B-9850-BC3803597A02}" srcOrd="0" destOrd="0" presId="urn:microsoft.com/office/officeart/2005/8/layout/vList2"/>
     <dgm:cxn modelId="{B6CA32E8-158F-4314-868D-CF859B377A1D}" type="presParOf" srcId="{2255413B-B72D-4A5E-83E2-D8B0FF15F052}" destId="{EBCFE681-1D9D-4878-A425-EA926DA7B110}" srcOrd="1" destOrd="0" presId="urn:microsoft.com/office/officeart/2005/8/layout/vList2"/>
   </dgm:cxnLst>
@@ -1370,7 +1391,7 @@
         </a:bodyPr>
         <a:lstStyle/>
         <a:p>
-          <a:pPr marL="0" lvl="0" indent="0" algn="l" defTabSz="1955800">
+          <a:pPr lvl="0" algn="l" defTabSz="1955800">
             <a:lnSpc>
               <a:spcPct val="90000"/>
             </a:lnSpc>
@@ -1380,7 +1401,6 @@
             <a:spcAft>
               <a:spcPct val="35000"/>
             </a:spcAft>
-            <a:buNone/>
           </a:pPr>
           <a:r>
             <a:rPr lang="en-US" sz="4400" b="1" kern="1200"/>
@@ -1441,7 +1461,7 @@
             <a:spcAft>
               <a:spcPct val="20000"/>
             </a:spcAft>
-            <a:buChar char="•"/>
+            <a:buChar char="••"/>
           </a:pPr>
           <a:r>
             <a:rPr lang="en-US" sz="3400" b="1" kern="1200"/>
@@ -1460,7 +1480,7 @@
             <a:spcAft>
               <a:spcPct val="20000"/>
             </a:spcAft>
-            <a:buChar char="•"/>
+            <a:buChar char="••"/>
           </a:pPr>
           <a:r>
             <a:rPr lang="es-ES" sz="3400" b="1" kern="1200"/>
@@ -1479,7 +1499,7 @@
             <a:spcAft>
               <a:spcPct val="20000"/>
             </a:spcAft>
-            <a:buChar char="•"/>
+            <a:buChar char="••"/>
           </a:pPr>
           <a:r>
             <a:rPr lang="en-US" sz="3400" b="1" kern="1200"/>
@@ -1498,7 +1518,7 @@
             <a:spcAft>
               <a:spcPct val="20000"/>
             </a:spcAft>
-            <a:buChar char="•"/>
+            <a:buChar char="••"/>
           </a:pPr>
           <a:r>
             <a:rPr lang="en-US" sz="3400" b="1" kern="1200"/>
@@ -3644,7 +3664,7 @@
           <a:noFill/>
           <a:extLst>
             <a:ext uri="{909E8E84-426E-40dd-AFC4-6F175D3DCCD1}">
-              <a14:hiddenFill xmlns="" xmlns:a14="http://schemas.microsoft.com/office/drawing/2010/main">
+              <a14:hiddenFill xmlns:a14="http://schemas.microsoft.com/office/drawing/2010/main" xmlns="">
                 <a:solidFill>
                   <a:srgbClr val="FFFFFF"/>
                 </a:solidFill>
@@ -3704,7 +3724,7 @@
             </a:ln>
             <a:extLst>
               <a:ext uri="{91240B29-F687-4f45-9708-019B960494DF}">
-                <a14:hiddenLine xmlns="" xmlns:a14="http://schemas.microsoft.com/office/drawing/2010/main" w="9525">
+                <a14:hiddenLine xmlns:a14="http://schemas.microsoft.com/office/drawing/2010/main" xmlns="" w="9525">
                   <a:solidFill>
                     <a:srgbClr val="000000"/>
                   </a:solidFill>
@@ -3794,7 +3814,7 @@
             </a:ln>
             <a:extLst>
               <a:ext uri="{91240B29-F687-4f45-9708-019B960494DF}">
-                <a14:hiddenLine xmlns="" xmlns:a14="http://schemas.microsoft.com/office/drawing/2010/main" w="9525">
+                <a14:hiddenLine xmlns:a14="http://schemas.microsoft.com/office/drawing/2010/main" xmlns="" w="9525">
                   <a:solidFill>
                     <a:srgbClr val="000000"/>
                   </a:solidFill>
@@ -3884,7 +3904,7 @@
             </a:ln>
             <a:extLst>
               <a:ext uri="{91240B29-F687-4f45-9708-019B960494DF}">
-                <a14:hiddenLine xmlns="" xmlns:a14="http://schemas.microsoft.com/office/drawing/2010/main" w="9525">
+                <a14:hiddenLine xmlns:a14="http://schemas.microsoft.com/office/drawing/2010/main" xmlns="" w="9525">
                   <a:solidFill>
                     <a:srgbClr val="000000"/>
                   </a:solidFill>
@@ -3918,7 +3938,7 @@
             </a:ln>
             <a:extLst>
               <a:ext uri="{91240B29-F687-4f45-9708-019B960494DF}">
-                <a14:hiddenLine xmlns="" xmlns:a14="http://schemas.microsoft.com/office/drawing/2010/main" w="9525">
+                <a14:hiddenLine xmlns:a14="http://schemas.microsoft.com/office/drawing/2010/main" xmlns="" w="9525">
                   <a:solidFill>
                     <a:srgbClr val="000000"/>
                   </a:solidFill>
@@ -4008,7 +4028,7 @@
             </a:ln>
             <a:extLst>
               <a:ext uri="{91240B29-F687-4f45-9708-019B960494DF}">
-                <a14:hiddenLine xmlns="" xmlns:a14="http://schemas.microsoft.com/office/drawing/2010/main" w="9525">
+                <a14:hiddenLine xmlns:a14="http://schemas.microsoft.com/office/drawing/2010/main" xmlns="" w="9525">
                   <a:solidFill>
                     <a:srgbClr val="000000"/>
                   </a:solidFill>
@@ -4070,7 +4090,7 @@
             </a:ln>
             <a:extLst>
               <a:ext uri="{91240B29-F687-4f45-9708-019B960494DF}">
-                <a14:hiddenLine xmlns="" xmlns:a14="http://schemas.microsoft.com/office/drawing/2010/main" w="9525">
+                <a14:hiddenLine xmlns:a14="http://schemas.microsoft.com/office/drawing/2010/main" xmlns="" w="9525">
                   <a:solidFill>
                     <a:srgbClr val="000000"/>
                   </a:solidFill>
@@ -4132,7 +4152,7 @@
             </a:ln>
             <a:extLst>
               <a:ext uri="{91240B29-F687-4f45-9708-019B960494DF}">
-                <a14:hiddenLine xmlns="" xmlns:a14="http://schemas.microsoft.com/office/drawing/2010/main" w="9525">
+                <a14:hiddenLine xmlns:a14="http://schemas.microsoft.com/office/drawing/2010/main" xmlns="" w="9525">
                   <a:solidFill>
                     <a:srgbClr val="000000"/>
                   </a:solidFill>
@@ -4222,7 +4242,7 @@
             </a:ln>
             <a:extLst>
               <a:ext uri="{91240B29-F687-4f45-9708-019B960494DF}">
-                <a14:hiddenLine xmlns="" xmlns:a14="http://schemas.microsoft.com/office/drawing/2010/main" w="9525">
+                <a14:hiddenLine xmlns:a14="http://schemas.microsoft.com/office/drawing/2010/main" xmlns="" w="9525">
                   <a:solidFill>
                     <a:srgbClr val="000000"/>
                   </a:solidFill>
@@ -4284,7 +4304,7 @@
             </a:ln>
             <a:extLst>
               <a:ext uri="{91240B29-F687-4f45-9708-019B960494DF}">
-                <a14:hiddenLine xmlns="" xmlns:a14="http://schemas.microsoft.com/office/drawing/2010/main" w="9525">
+                <a14:hiddenLine xmlns:a14="http://schemas.microsoft.com/office/drawing/2010/main" xmlns="" w="9525">
                   <a:solidFill>
                     <a:srgbClr val="000000"/>
                   </a:solidFill>
@@ -4346,7 +4366,7 @@
             </a:ln>
             <a:extLst>
               <a:ext uri="{91240B29-F687-4f45-9708-019B960494DF}">
-                <a14:hiddenLine xmlns="" xmlns:a14="http://schemas.microsoft.com/office/drawing/2010/main" w="9525">
+                <a14:hiddenLine xmlns:a14="http://schemas.microsoft.com/office/drawing/2010/main" xmlns="" w="9525">
                   <a:solidFill>
                     <a:srgbClr val="000000"/>
                   </a:solidFill>
@@ -4436,7 +4456,7 @@
             </a:ln>
             <a:extLst>
               <a:ext uri="{91240B29-F687-4f45-9708-019B960494DF}">
-                <a14:hiddenLine xmlns="" xmlns:a14="http://schemas.microsoft.com/office/drawing/2010/main" w="9525">
+                <a14:hiddenLine xmlns:a14="http://schemas.microsoft.com/office/drawing/2010/main" xmlns="" w="9525">
                   <a:solidFill>
                     <a:srgbClr val="000000"/>
                   </a:solidFill>
@@ -4526,7 +4546,7 @@
             </a:ln>
             <a:extLst>
               <a:ext uri="{91240B29-F687-4f45-9708-019B960494DF}">
-                <a14:hiddenLine xmlns="" xmlns:a14="http://schemas.microsoft.com/office/drawing/2010/main" w="9525">
+                <a14:hiddenLine xmlns:a14="http://schemas.microsoft.com/office/drawing/2010/main" xmlns="" w="9525">
                   <a:solidFill>
                     <a:srgbClr val="000000"/>
                   </a:solidFill>
@@ -4588,7 +4608,7 @@
             </a:ln>
             <a:extLst>
               <a:ext uri="{91240B29-F687-4f45-9708-019B960494DF}">
-                <a14:hiddenLine xmlns="" xmlns:a14="http://schemas.microsoft.com/office/drawing/2010/main" w="9525">
+                <a14:hiddenLine xmlns:a14="http://schemas.microsoft.com/office/drawing/2010/main" xmlns="" w="9525">
                   <a:solidFill>
                     <a:srgbClr val="000000"/>
                   </a:solidFill>
@@ -4698,7 +4718,7 @@
             </a:ln>
             <a:extLst>
               <a:ext uri="{91240B29-F687-4f45-9708-019B960494DF}">
-                <a14:hiddenLine xmlns="" xmlns:a14="http://schemas.microsoft.com/office/drawing/2010/main" w="9525">
+                <a14:hiddenLine xmlns:a14="http://schemas.microsoft.com/office/drawing/2010/main" xmlns="" w="9525">
                   <a:solidFill>
                     <a:srgbClr val="000000"/>
                   </a:solidFill>
@@ -4760,7 +4780,7 @@
             </a:ln>
             <a:extLst>
               <a:ext uri="{91240B29-F687-4f45-9708-019B960494DF}">
-                <a14:hiddenLine xmlns="" xmlns:a14="http://schemas.microsoft.com/office/drawing/2010/main" w="9525">
+                <a14:hiddenLine xmlns:a14="http://schemas.microsoft.com/office/drawing/2010/main" xmlns="" w="9525">
                   <a:solidFill>
                     <a:srgbClr val="000000"/>
                   </a:solidFill>
@@ -4850,7 +4870,7 @@
             </a:ln>
             <a:extLst>
               <a:ext uri="{91240B29-F687-4f45-9708-019B960494DF}">
-                <a14:hiddenLine xmlns="" xmlns:a14="http://schemas.microsoft.com/office/drawing/2010/main" w="9525">
+                <a14:hiddenLine xmlns:a14="http://schemas.microsoft.com/office/drawing/2010/main" xmlns="" w="9525">
                   <a:solidFill>
                     <a:srgbClr val="000000"/>
                   </a:solidFill>
@@ -4940,7 +4960,7 @@
             </a:ln>
             <a:extLst>
               <a:ext uri="{91240B29-F687-4f45-9708-019B960494DF}">
-                <a14:hiddenLine xmlns="" xmlns:a14="http://schemas.microsoft.com/office/drawing/2010/main" w="9525">
+                <a14:hiddenLine xmlns:a14="http://schemas.microsoft.com/office/drawing/2010/main" xmlns="" w="9525">
                   <a:solidFill>
                     <a:srgbClr val="000000"/>
                   </a:solidFill>
@@ -5002,7 +5022,7 @@
             </a:ln>
             <a:extLst>
               <a:ext uri="{91240B29-F687-4f45-9708-019B960494DF}">
-                <a14:hiddenLine xmlns="" xmlns:a14="http://schemas.microsoft.com/office/drawing/2010/main" w="9525">
+                <a14:hiddenLine xmlns:a14="http://schemas.microsoft.com/office/drawing/2010/main" xmlns="" w="9525">
                   <a:solidFill>
                     <a:srgbClr val="000000"/>
                   </a:solidFill>
@@ -5092,7 +5112,7 @@
             </a:ln>
             <a:extLst>
               <a:ext uri="{91240B29-F687-4f45-9708-019B960494DF}">
-                <a14:hiddenLine xmlns="" xmlns:a14="http://schemas.microsoft.com/office/drawing/2010/main" w="9525">
+                <a14:hiddenLine xmlns:a14="http://schemas.microsoft.com/office/drawing/2010/main" xmlns="" w="9525">
                   <a:solidFill>
                     <a:srgbClr val="000000"/>
                   </a:solidFill>
@@ -5182,7 +5202,7 @@
             </a:ln>
             <a:extLst>
               <a:ext uri="{91240B29-F687-4f45-9708-019B960494DF}">
-                <a14:hiddenLine xmlns="" xmlns:a14="http://schemas.microsoft.com/office/drawing/2010/main" w="9525">
+                <a14:hiddenLine xmlns:a14="http://schemas.microsoft.com/office/drawing/2010/main" xmlns="" w="9525">
                   <a:solidFill>
                     <a:srgbClr val="000000"/>
                   </a:solidFill>
@@ -5238,7 +5258,7 @@
             </a:ln>
             <a:extLst>
               <a:ext uri="{91240B29-F687-4f45-9708-019B960494DF}">
-                <a14:hiddenLine xmlns="" xmlns:a14="http://schemas.microsoft.com/office/drawing/2010/main" w="9525">
+                <a14:hiddenLine xmlns:a14="http://schemas.microsoft.com/office/drawing/2010/main" xmlns="" w="9525">
                   <a:solidFill>
                     <a:srgbClr val="000000"/>
                   </a:solidFill>
@@ -5328,7 +5348,7 @@
             </a:ln>
             <a:extLst>
               <a:ext uri="{91240B29-F687-4f45-9708-019B960494DF}">
-                <a14:hiddenLine xmlns="" xmlns:a14="http://schemas.microsoft.com/office/drawing/2010/main" w="9525">
+                <a14:hiddenLine xmlns:a14="http://schemas.microsoft.com/office/drawing/2010/main" xmlns="" w="9525">
                   <a:solidFill>
                     <a:srgbClr val="000000"/>
                   </a:solidFill>
@@ -5384,7 +5404,7 @@
             </a:ln>
             <a:extLst>
               <a:ext uri="{91240B29-F687-4f45-9708-019B960494DF}">
-                <a14:hiddenLine xmlns="" xmlns:a14="http://schemas.microsoft.com/office/drawing/2010/main" w="9525">
+                <a14:hiddenLine xmlns:a14="http://schemas.microsoft.com/office/drawing/2010/main" xmlns="" w="9525">
                   <a:solidFill>
                     <a:srgbClr val="000000"/>
                   </a:solidFill>
@@ -5474,7 +5494,7 @@
             </a:ln>
             <a:extLst>
               <a:ext uri="{91240B29-F687-4f45-9708-019B960494DF}">
-                <a14:hiddenLine xmlns="" xmlns:a14="http://schemas.microsoft.com/office/drawing/2010/main" w="9525">
+                <a14:hiddenLine xmlns:a14="http://schemas.microsoft.com/office/drawing/2010/main" xmlns="" w="9525">
                   <a:solidFill>
                     <a:srgbClr val="000000"/>
                   </a:solidFill>
@@ -5542,7 +5562,7 @@
             </a:ln>
             <a:extLst>
               <a:ext uri="{91240B29-F687-4f45-9708-019B960494DF}">
-                <a14:hiddenLine xmlns="" xmlns:a14="http://schemas.microsoft.com/office/drawing/2010/main" w="9525">
+                <a14:hiddenLine xmlns:a14="http://schemas.microsoft.com/office/drawing/2010/main" xmlns="" w="9525">
                   <a:solidFill>
                     <a:srgbClr val="000000"/>
                   </a:solidFill>
@@ -5632,7 +5652,7 @@
             </a:ln>
             <a:extLst>
               <a:ext uri="{91240B29-F687-4f45-9708-019B960494DF}">
-                <a14:hiddenLine xmlns="" xmlns:a14="http://schemas.microsoft.com/office/drawing/2010/main" w="9525">
+                <a14:hiddenLine xmlns:a14="http://schemas.microsoft.com/office/drawing/2010/main" xmlns="" w="9525">
                   <a:solidFill>
                     <a:srgbClr val="000000"/>
                   </a:solidFill>
@@ -5700,7 +5720,7 @@
             </a:ln>
             <a:extLst>
               <a:ext uri="{91240B29-F687-4f45-9708-019B960494DF}">
-                <a14:hiddenLine xmlns="" xmlns:a14="http://schemas.microsoft.com/office/drawing/2010/main" w="9525">
+                <a14:hiddenLine xmlns:a14="http://schemas.microsoft.com/office/drawing/2010/main" xmlns="" w="9525">
                   <a:solidFill>
                     <a:srgbClr val="000000"/>
                   </a:solidFill>
@@ -5790,7 +5810,7 @@
             </a:ln>
             <a:extLst>
               <a:ext uri="{91240B29-F687-4f45-9708-019B960494DF}">
-                <a14:hiddenLine xmlns="" xmlns:a14="http://schemas.microsoft.com/office/drawing/2010/main" w="9525">
+                <a14:hiddenLine xmlns:a14="http://schemas.microsoft.com/office/drawing/2010/main" xmlns="" w="9525">
                   <a:solidFill>
                     <a:srgbClr val="000000"/>
                   </a:solidFill>
@@ -5824,7 +5844,7 @@
             </a:ln>
             <a:extLst>
               <a:ext uri="{91240B29-F687-4f45-9708-019B960494DF}">
-                <a14:hiddenLine xmlns="" xmlns:a14="http://schemas.microsoft.com/office/drawing/2010/main" w="9525">
+                <a14:hiddenLine xmlns:a14="http://schemas.microsoft.com/office/drawing/2010/main" xmlns="" w="9525">
                   <a:solidFill>
                     <a:srgbClr val="000000"/>
                   </a:solidFill>
@@ -5914,7 +5934,7 @@
             </a:ln>
             <a:extLst>
               <a:ext uri="{91240B29-F687-4f45-9708-019B960494DF}">
-                <a14:hiddenLine xmlns="" xmlns:a14="http://schemas.microsoft.com/office/drawing/2010/main" w="9525">
+                <a14:hiddenLine xmlns:a14="http://schemas.microsoft.com/office/drawing/2010/main" xmlns="" w="9525">
                   <a:solidFill>
                     <a:srgbClr val="000000"/>
                   </a:solidFill>
@@ -5976,7 +5996,7 @@
             </a:ln>
             <a:extLst>
               <a:ext uri="{91240B29-F687-4f45-9708-019B960494DF}">
-                <a14:hiddenLine xmlns="" xmlns:a14="http://schemas.microsoft.com/office/drawing/2010/main" w="9525">
+                <a14:hiddenLine xmlns:a14="http://schemas.microsoft.com/office/drawing/2010/main" xmlns="" w="9525">
                   <a:solidFill>
                     <a:srgbClr val="000000"/>
                   </a:solidFill>
@@ -6038,7 +6058,7 @@
             </a:ln>
             <a:extLst>
               <a:ext uri="{91240B29-F687-4f45-9708-019B960494DF}">
-                <a14:hiddenLine xmlns="" xmlns:a14="http://schemas.microsoft.com/office/drawing/2010/main" w="9525">
+                <a14:hiddenLine xmlns:a14="http://schemas.microsoft.com/office/drawing/2010/main" xmlns="" w="9525">
                   <a:solidFill>
                     <a:srgbClr val="000000"/>
                   </a:solidFill>
@@ -6128,7 +6148,7 @@
             </a:ln>
             <a:extLst>
               <a:ext uri="{91240B29-F687-4f45-9708-019B960494DF}">
-                <a14:hiddenLine xmlns="" xmlns:a14="http://schemas.microsoft.com/office/drawing/2010/main" w="9525">
+                <a14:hiddenLine xmlns:a14="http://schemas.microsoft.com/office/drawing/2010/main" xmlns="" w="9525">
                   <a:solidFill>
                     <a:srgbClr val="000000"/>
                   </a:solidFill>
@@ -6196,7 +6216,7 @@
             </a:ln>
             <a:extLst>
               <a:ext uri="{91240B29-F687-4f45-9708-019B960494DF}">
-                <a14:hiddenLine xmlns="" xmlns:a14="http://schemas.microsoft.com/office/drawing/2010/main" w="9525">
+                <a14:hiddenLine xmlns:a14="http://schemas.microsoft.com/office/drawing/2010/main" xmlns="" w="9525">
                   <a:solidFill>
                     <a:srgbClr val="000000"/>
                   </a:solidFill>
@@ -6258,7 +6278,7 @@
             </a:ln>
             <a:extLst>
               <a:ext uri="{91240B29-F687-4f45-9708-019B960494DF}">
-                <a14:hiddenLine xmlns="" xmlns:a14="http://schemas.microsoft.com/office/drawing/2010/main" w="9525">
+                <a14:hiddenLine xmlns:a14="http://schemas.microsoft.com/office/drawing/2010/main" xmlns="" w="9525">
                   <a:solidFill>
                     <a:srgbClr val="000000"/>
                   </a:solidFill>
@@ -6348,7 +6368,7 @@
             </a:ln>
             <a:extLst>
               <a:ext uri="{91240B29-F687-4f45-9708-019B960494DF}">
-                <a14:hiddenLine xmlns="" xmlns:a14="http://schemas.microsoft.com/office/drawing/2010/main" w="9525">
+                <a14:hiddenLine xmlns:a14="http://schemas.microsoft.com/office/drawing/2010/main" xmlns="" w="9525">
                   <a:solidFill>
                     <a:srgbClr val="000000"/>
                   </a:solidFill>
@@ -6410,7 +6430,7 @@
             </a:ln>
             <a:extLst>
               <a:ext uri="{91240B29-F687-4f45-9708-019B960494DF}">
-                <a14:hiddenLine xmlns="" xmlns:a14="http://schemas.microsoft.com/office/drawing/2010/main" w="9525">
+                <a14:hiddenLine xmlns:a14="http://schemas.microsoft.com/office/drawing/2010/main" xmlns="" w="9525">
                   <a:solidFill>
                     <a:srgbClr val="000000"/>
                   </a:solidFill>
@@ -6500,7 +6520,7 @@
             </a:ln>
             <a:extLst>
               <a:ext uri="{91240B29-F687-4f45-9708-019B960494DF}">
-                <a14:hiddenLine xmlns="" xmlns:a14="http://schemas.microsoft.com/office/drawing/2010/main" w="9525">
+                <a14:hiddenLine xmlns:a14="http://schemas.microsoft.com/office/drawing/2010/main" xmlns="" w="9525">
                   <a:solidFill>
                     <a:srgbClr val="000000"/>
                   </a:solidFill>
@@ -6562,7 +6582,7 @@
             </a:ln>
             <a:extLst>
               <a:ext uri="{91240B29-F687-4f45-9708-019B960494DF}">
-                <a14:hiddenLine xmlns="" xmlns:a14="http://schemas.microsoft.com/office/drawing/2010/main" w="9525">
+                <a14:hiddenLine xmlns:a14="http://schemas.microsoft.com/office/drawing/2010/main" xmlns="" w="9525">
                   <a:solidFill>
                     <a:srgbClr val="000000"/>
                   </a:solidFill>
@@ -6652,7 +6672,7 @@
             </a:ln>
             <a:extLst>
               <a:ext uri="{91240B29-F687-4f45-9708-019B960494DF}">
-                <a14:hiddenLine xmlns="" xmlns:a14="http://schemas.microsoft.com/office/drawing/2010/main" w="9525">
+                <a14:hiddenLine xmlns:a14="http://schemas.microsoft.com/office/drawing/2010/main" xmlns="" w="9525">
                   <a:solidFill>
                     <a:srgbClr val="000000"/>
                   </a:solidFill>
@@ -6686,7 +6706,7 @@
             </a:ln>
             <a:extLst>
               <a:ext uri="{91240B29-F687-4f45-9708-019B960494DF}">
-                <a14:hiddenLine xmlns="" xmlns:a14="http://schemas.microsoft.com/office/drawing/2010/main" w="9525">
+                <a14:hiddenLine xmlns:a14="http://schemas.microsoft.com/office/drawing/2010/main" xmlns="" w="9525">
                   <a:solidFill>
                     <a:srgbClr val="000000"/>
                   </a:solidFill>
@@ -6751,7 +6771,7 @@
             </a:ln>
             <a:extLst>
               <a:ext uri="{91240B29-F687-4f45-9708-019B960494DF}">
-                <a14:hiddenLine xmlns="" xmlns:a14="http://schemas.microsoft.com/office/drawing/2010/main" w="9525">
+                <a14:hiddenLine xmlns:a14="http://schemas.microsoft.com/office/drawing/2010/main" xmlns="" w="9525">
                   <a:solidFill>
                     <a:srgbClr val="000000"/>
                   </a:solidFill>
@@ -6841,7 +6861,7 @@
             </a:ln>
             <a:extLst>
               <a:ext uri="{91240B29-F687-4f45-9708-019B960494DF}">
-                <a14:hiddenLine xmlns="" xmlns:a14="http://schemas.microsoft.com/office/drawing/2010/main" w="9525">
+                <a14:hiddenLine xmlns:a14="http://schemas.microsoft.com/office/drawing/2010/main" xmlns="" w="9525">
                   <a:solidFill>
                     <a:srgbClr val="000000"/>
                   </a:solidFill>
@@ -6903,7 +6923,7 @@
             </a:ln>
             <a:extLst>
               <a:ext uri="{91240B29-F687-4f45-9708-019B960494DF}">
-                <a14:hiddenLine xmlns="" xmlns:a14="http://schemas.microsoft.com/office/drawing/2010/main" w="9525">
+                <a14:hiddenLine xmlns:a14="http://schemas.microsoft.com/office/drawing/2010/main" xmlns="" w="9525">
                   <a:solidFill>
                     <a:srgbClr val="000000"/>
                   </a:solidFill>
@@ -6993,7 +7013,7 @@
             </a:ln>
             <a:extLst>
               <a:ext uri="{91240B29-F687-4f45-9708-019B960494DF}">
-                <a14:hiddenLine xmlns="" xmlns:a14="http://schemas.microsoft.com/office/drawing/2010/main" w="9525">
+                <a14:hiddenLine xmlns:a14="http://schemas.microsoft.com/office/drawing/2010/main" xmlns="" w="9525">
                   <a:solidFill>
                     <a:srgbClr val="000000"/>
                   </a:solidFill>
@@ -7083,7 +7103,7 @@
             </a:ln>
             <a:extLst>
               <a:ext uri="{91240B29-F687-4f45-9708-019B960494DF}">
-                <a14:hiddenLine xmlns="" xmlns:a14="http://schemas.microsoft.com/office/drawing/2010/main" w="9525">
+                <a14:hiddenLine xmlns:a14="http://schemas.microsoft.com/office/drawing/2010/main" xmlns="" w="9525">
                   <a:solidFill>
                     <a:srgbClr val="000000"/>
                   </a:solidFill>
@@ -7148,7 +7168,7 @@
             </a:ln>
             <a:extLst>
               <a:ext uri="{91240B29-F687-4f45-9708-019B960494DF}">
-                <a14:hiddenLine xmlns="" xmlns:a14="http://schemas.microsoft.com/office/drawing/2010/main" w="9525">
+                <a14:hiddenLine xmlns:a14="http://schemas.microsoft.com/office/drawing/2010/main" xmlns="" w="9525">
                   <a:solidFill>
                     <a:srgbClr val="000000"/>
                   </a:solidFill>
@@ -7210,7 +7230,7 @@
             </a:ln>
             <a:extLst>
               <a:ext uri="{91240B29-F687-4f45-9708-019B960494DF}">
-                <a14:hiddenLine xmlns="" xmlns:a14="http://schemas.microsoft.com/office/drawing/2010/main" w="9525">
+                <a14:hiddenLine xmlns:a14="http://schemas.microsoft.com/office/drawing/2010/main" xmlns="" w="9525">
                   <a:solidFill>
                     <a:srgbClr val="000000"/>
                   </a:solidFill>
@@ -7300,7 +7320,7 @@
             </a:ln>
             <a:extLst>
               <a:ext uri="{91240B29-F687-4f45-9708-019B960494DF}">
-                <a14:hiddenLine xmlns="" xmlns:a14="http://schemas.microsoft.com/office/drawing/2010/main" w="9525">
+                <a14:hiddenLine xmlns:a14="http://schemas.microsoft.com/office/drawing/2010/main" xmlns="" w="9525">
                   <a:solidFill>
                     <a:srgbClr val="000000"/>
                   </a:solidFill>
@@ -7390,7 +7410,7 @@
             </a:ln>
             <a:extLst>
               <a:ext uri="{91240B29-F687-4f45-9708-019B960494DF}">
-                <a14:hiddenLine xmlns="" xmlns:a14="http://schemas.microsoft.com/office/drawing/2010/main" w="9525">
+                <a14:hiddenLine xmlns:a14="http://schemas.microsoft.com/office/drawing/2010/main" xmlns="" w="9525">
                   <a:solidFill>
                     <a:srgbClr val="000000"/>
                   </a:solidFill>
@@ -7452,7 +7472,7 @@
             </a:ln>
             <a:extLst>
               <a:ext uri="{91240B29-F687-4f45-9708-019B960494DF}">
-                <a14:hiddenLine xmlns="" xmlns:a14="http://schemas.microsoft.com/office/drawing/2010/main" w="9525">
+                <a14:hiddenLine xmlns:a14="http://schemas.microsoft.com/office/drawing/2010/main" xmlns="" w="9525">
                   <a:solidFill>
                     <a:srgbClr val="000000"/>
                   </a:solidFill>
@@ -7572,7 +7592,7 @@
             </a:ln>
             <a:extLst>
               <a:ext uri="{91240B29-F687-4f45-9708-019B960494DF}">
-                <a14:hiddenLine xmlns="" xmlns:a14="http://schemas.microsoft.com/office/drawing/2010/main" w="9525">
+                <a14:hiddenLine xmlns:a14="http://schemas.microsoft.com/office/drawing/2010/main" xmlns="" w="9525">
                   <a:solidFill>
                     <a:srgbClr val="000000"/>
                   </a:solidFill>
@@ -7640,7 +7660,7 @@
             </a:ln>
             <a:extLst>
               <a:ext uri="{91240B29-F687-4f45-9708-019B960494DF}">
-                <a14:hiddenLine xmlns="" xmlns:a14="http://schemas.microsoft.com/office/drawing/2010/main" w="9525">
+                <a14:hiddenLine xmlns:a14="http://schemas.microsoft.com/office/drawing/2010/main" xmlns="" w="9525">
                   <a:solidFill>
                     <a:srgbClr val="000000"/>
                   </a:solidFill>
@@ -7730,7 +7750,7 @@
             </a:ln>
             <a:extLst>
               <a:ext uri="{91240B29-F687-4f45-9708-019B960494DF}">
-                <a14:hiddenLine xmlns="" xmlns:a14="http://schemas.microsoft.com/office/drawing/2010/main" w="9525">
+                <a14:hiddenLine xmlns:a14="http://schemas.microsoft.com/office/drawing/2010/main" xmlns="" w="9525">
                   <a:solidFill>
                     <a:srgbClr val="000000"/>
                   </a:solidFill>
@@ -13800,7 +13820,7 @@
           <a:noFill/>
           <a:extLst>
             <a:ext uri="{909E8E84-426E-40dd-AFC4-6F175D3DCCD1}">
-              <a14:hiddenFill xmlns="" xmlns:a14="http://schemas.microsoft.com/office/drawing/2010/main">
+              <a14:hiddenFill xmlns:a14="http://schemas.microsoft.com/office/drawing/2010/main" xmlns="">
                 <a:solidFill>
                   <a:srgbClr val="FFFFFF"/>
                 </a:solidFill>
@@ -13874,7 +13894,7 @@
               </a:ln>
               <a:extLst>
                 <a:ext uri="{91240B29-F687-4f45-9708-019B960494DF}">
-                  <a14:hiddenLine xmlns="" xmlns:a14="http://schemas.microsoft.com/office/drawing/2010/main" w="9525">
+                  <a14:hiddenLine xmlns:a14="http://schemas.microsoft.com/office/drawing/2010/main" xmlns="" w="9525">
                     <a:solidFill>
                       <a:srgbClr val="000000"/>
                     </a:solidFill>
@@ -13964,7 +13984,7 @@
               </a:ln>
               <a:extLst>
                 <a:ext uri="{91240B29-F687-4f45-9708-019B960494DF}">
-                  <a14:hiddenLine xmlns="" xmlns:a14="http://schemas.microsoft.com/office/drawing/2010/main" w="9525">
+                  <a14:hiddenLine xmlns:a14="http://schemas.microsoft.com/office/drawing/2010/main" xmlns="" w="9525">
                     <a:solidFill>
                       <a:srgbClr val="000000"/>
                     </a:solidFill>
@@ -14054,7 +14074,7 @@
               </a:ln>
               <a:extLst>
                 <a:ext uri="{91240B29-F687-4f45-9708-019B960494DF}">
-                  <a14:hiddenLine xmlns="" xmlns:a14="http://schemas.microsoft.com/office/drawing/2010/main" w="9525">
+                  <a14:hiddenLine xmlns:a14="http://schemas.microsoft.com/office/drawing/2010/main" xmlns="" w="9525">
                     <a:solidFill>
                       <a:srgbClr val="000000"/>
                     </a:solidFill>
@@ -14116,7 +14136,7 @@
               </a:ln>
               <a:extLst>
                 <a:ext uri="{91240B29-F687-4f45-9708-019B960494DF}">
-                  <a14:hiddenLine xmlns="" xmlns:a14="http://schemas.microsoft.com/office/drawing/2010/main" w="9525">
+                  <a14:hiddenLine xmlns:a14="http://schemas.microsoft.com/office/drawing/2010/main" xmlns="" w="9525">
                     <a:solidFill>
                       <a:srgbClr val="000000"/>
                     </a:solidFill>
@@ -14206,7 +14226,7 @@
               </a:ln>
               <a:extLst>
                 <a:ext uri="{91240B29-F687-4f45-9708-019B960494DF}">
-                  <a14:hiddenLine xmlns="" xmlns:a14="http://schemas.microsoft.com/office/drawing/2010/main" w="9525">
+                  <a14:hiddenLine xmlns:a14="http://schemas.microsoft.com/office/drawing/2010/main" xmlns="" w="9525">
                     <a:solidFill>
                       <a:srgbClr val="000000"/>
                     </a:solidFill>
@@ -14268,7 +14288,7 @@
               </a:ln>
               <a:extLst>
                 <a:ext uri="{91240B29-F687-4f45-9708-019B960494DF}">
-                  <a14:hiddenLine xmlns="" xmlns:a14="http://schemas.microsoft.com/office/drawing/2010/main" w="9525">
+                  <a14:hiddenLine xmlns:a14="http://schemas.microsoft.com/office/drawing/2010/main" xmlns="" w="9525">
                     <a:solidFill>
                       <a:srgbClr val="000000"/>
                     </a:solidFill>
@@ -14330,7 +14350,7 @@
               </a:ln>
               <a:extLst>
                 <a:ext uri="{91240B29-F687-4f45-9708-019B960494DF}">
-                  <a14:hiddenLine xmlns="" xmlns:a14="http://schemas.microsoft.com/office/drawing/2010/main" w="9525">
+                  <a14:hiddenLine xmlns:a14="http://schemas.microsoft.com/office/drawing/2010/main" xmlns="" w="9525">
                     <a:solidFill>
                       <a:srgbClr val="000000"/>
                     </a:solidFill>
@@ -14420,7 +14440,7 @@
               </a:ln>
               <a:extLst>
                 <a:ext uri="{91240B29-F687-4f45-9708-019B960494DF}">
-                  <a14:hiddenLine xmlns="" xmlns:a14="http://schemas.microsoft.com/office/drawing/2010/main" w="9525">
+                  <a14:hiddenLine xmlns:a14="http://schemas.microsoft.com/office/drawing/2010/main" xmlns="" w="9525">
                     <a:solidFill>
                       <a:srgbClr val="000000"/>
                     </a:solidFill>
@@ -14510,7 +14530,7 @@
               </a:ln>
               <a:extLst>
                 <a:ext uri="{91240B29-F687-4f45-9708-019B960494DF}">
-                  <a14:hiddenLine xmlns="" xmlns:a14="http://schemas.microsoft.com/office/drawing/2010/main" w="9525">
+                  <a14:hiddenLine xmlns:a14="http://schemas.microsoft.com/office/drawing/2010/main" xmlns="" w="9525">
                     <a:solidFill>
                       <a:srgbClr val="000000"/>
                     </a:solidFill>
@@ -14572,7 +14592,7 @@
               </a:ln>
               <a:extLst>
                 <a:ext uri="{91240B29-F687-4f45-9708-019B960494DF}">
-                  <a14:hiddenLine xmlns="" xmlns:a14="http://schemas.microsoft.com/office/drawing/2010/main" w="9525">
+                  <a14:hiddenLine xmlns:a14="http://schemas.microsoft.com/office/drawing/2010/main" xmlns="" w="9525">
                     <a:solidFill>
                       <a:srgbClr val="000000"/>
                     </a:solidFill>
@@ -14682,7 +14702,7 @@
               </a:ln>
               <a:extLst>
                 <a:ext uri="{91240B29-F687-4f45-9708-019B960494DF}">
-                  <a14:hiddenLine xmlns="" xmlns:a14="http://schemas.microsoft.com/office/drawing/2010/main" w="9525">
+                  <a14:hiddenLine xmlns:a14="http://schemas.microsoft.com/office/drawing/2010/main" xmlns="" w="9525">
                     <a:solidFill>
                       <a:srgbClr val="000000"/>
                     </a:solidFill>
@@ -14766,7 +14786,7 @@
               </a:ln>
               <a:extLst>
                 <a:ext uri="{91240B29-F687-4f45-9708-019B960494DF}">
-                  <a14:hiddenLine xmlns="" xmlns:a14="http://schemas.microsoft.com/office/drawing/2010/main" w="9525">
+                  <a14:hiddenLine xmlns:a14="http://schemas.microsoft.com/office/drawing/2010/main" xmlns="" w="9525">
                     <a:solidFill>
                       <a:srgbClr val="000000"/>
                     </a:solidFill>
@@ -14828,7 +14848,7 @@
               </a:ln>
               <a:extLst>
                 <a:ext uri="{91240B29-F687-4f45-9708-019B960494DF}">
-                  <a14:hiddenLine xmlns="" xmlns:a14="http://schemas.microsoft.com/office/drawing/2010/main" w="9525">
+                  <a14:hiddenLine xmlns:a14="http://schemas.microsoft.com/office/drawing/2010/main" xmlns="" w="9525">
                     <a:solidFill>
                       <a:srgbClr val="000000"/>
                     </a:solidFill>
@@ -14890,7 +14910,7 @@
               </a:ln>
               <a:extLst>
                 <a:ext uri="{91240B29-F687-4f45-9708-019B960494DF}">
-                  <a14:hiddenLine xmlns="" xmlns:a14="http://schemas.microsoft.com/office/drawing/2010/main" w="9525">
+                  <a14:hiddenLine xmlns:a14="http://schemas.microsoft.com/office/drawing/2010/main" xmlns="" w="9525">
                     <a:solidFill>
                       <a:srgbClr val="000000"/>
                     </a:solidFill>
@@ -14980,7 +15000,7 @@
               </a:ln>
               <a:extLst>
                 <a:ext uri="{91240B29-F687-4f45-9708-019B960494DF}">
-                  <a14:hiddenLine xmlns="" xmlns:a14="http://schemas.microsoft.com/office/drawing/2010/main" w="9525">
+                  <a14:hiddenLine xmlns:a14="http://schemas.microsoft.com/office/drawing/2010/main" xmlns="" w="9525">
                     <a:solidFill>
                       <a:srgbClr val="000000"/>
                     </a:solidFill>
@@ -15014,7 +15034,7 @@
               </a:ln>
               <a:extLst>
                 <a:ext uri="{91240B29-F687-4f45-9708-019B960494DF}">
-                  <a14:hiddenLine xmlns="" xmlns:a14="http://schemas.microsoft.com/office/drawing/2010/main" w="9525">
+                  <a14:hiddenLine xmlns:a14="http://schemas.microsoft.com/office/drawing/2010/main" xmlns="" w="9525">
                     <a:solidFill>
                       <a:srgbClr val="000000"/>
                     </a:solidFill>
@@ -15079,7 +15099,7 @@
               </a:ln>
               <a:extLst>
                 <a:ext uri="{91240B29-F687-4f45-9708-019B960494DF}">
-                  <a14:hiddenLine xmlns="" xmlns:a14="http://schemas.microsoft.com/office/drawing/2010/main" w="9525">
+                  <a14:hiddenLine xmlns:a14="http://schemas.microsoft.com/office/drawing/2010/main" xmlns="" w="9525">
                     <a:solidFill>
                       <a:srgbClr val="000000"/>
                     </a:solidFill>
@@ -15169,7 +15189,7 @@
               </a:ln>
               <a:extLst>
                 <a:ext uri="{91240B29-F687-4f45-9708-019B960494DF}">
-                  <a14:hiddenLine xmlns="" xmlns:a14="http://schemas.microsoft.com/office/drawing/2010/main" w="9525">
+                  <a14:hiddenLine xmlns:a14="http://schemas.microsoft.com/office/drawing/2010/main" xmlns="" w="9525">
                     <a:solidFill>
                       <a:srgbClr val="000000"/>
                     </a:solidFill>
@@ -15231,7 +15251,7 @@
               </a:ln>
               <a:extLst>
                 <a:ext uri="{91240B29-F687-4f45-9708-019B960494DF}">
-                  <a14:hiddenLine xmlns="" xmlns:a14="http://schemas.microsoft.com/office/drawing/2010/main" w="9525">
+                  <a14:hiddenLine xmlns:a14="http://schemas.microsoft.com/office/drawing/2010/main" xmlns="" w="9525">
                     <a:solidFill>
                       <a:srgbClr val="000000"/>
                     </a:solidFill>
@@ -15321,7 +15341,7 @@
               </a:ln>
               <a:extLst>
                 <a:ext uri="{91240B29-F687-4f45-9708-019B960494DF}">
-                  <a14:hiddenLine xmlns="" xmlns:a14="http://schemas.microsoft.com/office/drawing/2010/main" w="9525">
+                  <a14:hiddenLine xmlns:a14="http://schemas.microsoft.com/office/drawing/2010/main" xmlns="" w="9525">
                     <a:solidFill>
                       <a:srgbClr val="000000"/>
                     </a:solidFill>
@@ -15386,7 +15406,7 @@
               </a:ln>
               <a:extLst>
                 <a:ext uri="{91240B29-F687-4f45-9708-019B960494DF}">
-                  <a14:hiddenLine xmlns="" xmlns:a14="http://schemas.microsoft.com/office/drawing/2010/main" w="9525">
+                  <a14:hiddenLine xmlns:a14="http://schemas.microsoft.com/office/drawing/2010/main" xmlns="" w="9525">
                     <a:solidFill>
                       <a:srgbClr val="000000"/>
                     </a:solidFill>
@@ -15448,7 +15468,7 @@
               </a:ln>
               <a:extLst>
                 <a:ext uri="{91240B29-F687-4f45-9708-019B960494DF}">
-                  <a14:hiddenLine xmlns="" xmlns:a14="http://schemas.microsoft.com/office/drawing/2010/main" w="9525">
+                  <a14:hiddenLine xmlns:a14="http://schemas.microsoft.com/office/drawing/2010/main" xmlns="" w="9525">
                     <a:solidFill>
                       <a:srgbClr val="000000"/>
                     </a:solidFill>
@@ -15538,7 +15558,7 @@
               </a:ln>
               <a:extLst>
                 <a:ext uri="{91240B29-F687-4f45-9708-019B960494DF}">
-                  <a14:hiddenLine xmlns="" xmlns:a14="http://schemas.microsoft.com/office/drawing/2010/main" w="9525">
+                  <a14:hiddenLine xmlns:a14="http://schemas.microsoft.com/office/drawing/2010/main" xmlns="" w="9525">
                     <a:solidFill>
                       <a:srgbClr val="000000"/>
                     </a:solidFill>
@@ -15628,7 +15648,7 @@
               </a:ln>
               <a:extLst>
                 <a:ext uri="{91240B29-F687-4f45-9708-019B960494DF}">
-                  <a14:hiddenLine xmlns="" xmlns:a14="http://schemas.microsoft.com/office/drawing/2010/main" w="9525">
+                  <a14:hiddenLine xmlns:a14="http://schemas.microsoft.com/office/drawing/2010/main" xmlns="" w="9525">
                     <a:solidFill>
                       <a:srgbClr val="000000"/>
                     </a:solidFill>
@@ -15693,7 +15713,7 @@
               </a:ln>
               <a:extLst>
                 <a:ext uri="{91240B29-F687-4f45-9708-019B960494DF}">
-                  <a14:hiddenLine xmlns="" xmlns:a14="http://schemas.microsoft.com/office/drawing/2010/main" w="9525">
+                  <a14:hiddenLine xmlns:a14="http://schemas.microsoft.com/office/drawing/2010/main" xmlns="" w="9525">
                     <a:solidFill>
                       <a:srgbClr val="000000"/>
                     </a:solidFill>
@@ -15813,7 +15833,7 @@
               </a:ln>
               <a:extLst>
                 <a:ext uri="{91240B29-F687-4f45-9708-019B960494DF}">
-                  <a14:hiddenLine xmlns="" xmlns:a14="http://schemas.microsoft.com/office/drawing/2010/main" w="9525">
+                  <a14:hiddenLine xmlns:a14="http://schemas.microsoft.com/office/drawing/2010/main" xmlns="" w="9525">
                     <a:solidFill>
                       <a:srgbClr val="000000"/>
                     </a:solidFill>
@@ -15911,7 +15931,7 @@
               </a:ln>
               <a:extLst>
                 <a:ext uri="{91240B29-F687-4f45-9708-019B960494DF}">
-                  <a14:hiddenLine xmlns="" xmlns:a14="http://schemas.microsoft.com/office/drawing/2010/main" w="9525">
+                  <a14:hiddenLine xmlns:a14="http://schemas.microsoft.com/office/drawing/2010/main" xmlns="" w="9525">
                     <a:solidFill>
                       <a:srgbClr val="000000"/>
                     </a:solidFill>
@@ -16026,7 +16046,7 @@
               </a:ln>
               <a:extLst>
                 <a:ext uri="{91240B29-F687-4f45-9708-019B960494DF}">
-                  <a14:hiddenLine xmlns="" xmlns:a14="http://schemas.microsoft.com/office/drawing/2010/main" w="9525">
+                  <a14:hiddenLine xmlns:a14="http://schemas.microsoft.com/office/drawing/2010/main" xmlns="" w="9525">
                     <a:solidFill>
                       <a:srgbClr val="000000"/>
                     </a:solidFill>
@@ -16116,7 +16136,7 @@
               </a:ln>
               <a:extLst>
                 <a:ext uri="{91240B29-F687-4f45-9708-019B960494DF}">
-                  <a14:hiddenLine xmlns="" xmlns:a14="http://schemas.microsoft.com/office/drawing/2010/main" w="9525">
+                  <a14:hiddenLine xmlns:a14="http://schemas.microsoft.com/office/drawing/2010/main" xmlns="" w="9525">
                     <a:solidFill>
                       <a:srgbClr val="000000"/>
                     </a:solidFill>
@@ -16181,7 +16201,7 @@
               </a:ln>
               <a:extLst>
                 <a:ext uri="{91240B29-F687-4f45-9708-019B960494DF}">
-                  <a14:hiddenLine xmlns="" xmlns:a14="http://schemas.microsoft.com/office/drawing/2010/main" w="9525">
+                  <a14:hiddenLine xmlns:a14="http://schemas.microsoft.com/office/drawing/2010/main" xmlns="" w="9525">
                     <a:solidFill>
                       <a:srgbClr val="000000"/>
                     </a:solidFill>
@@ -16271,7 +16291,7 @@
               </a:ln>
               <a:extLst>
                 <a:ext uri="{91240B29-F687-4f45-9708-019B960494DF}">
-                  <a14:hiddenLine xmlns="" xmlns:a14="http://schemas.microsoft.com/office/drawing/2010/main" w="9525">
+                  <a14:hiddenLine xmlns:a14="http://schemas.microsoft.com/office/drawing/2010/main" xmlns="" w="9525">
                     <a:solidFill>
                       <a:srgbClr val="000000"/>
                     </a:solidFill>
@@ -16339,7 +16359,7 @@
               </a:ln>
               <a:extLst>
                 <a:ext uri="{91240B29-F687-4f45-9708-019B960494DF}">
-                  <a14:hiddenLine xmlns="" xmlns:a14="http://schemas.microsoft.com/office/drawing/2010/main" w="9525">
+                  <a14:hiddenLine xmlns:a14="http://schemas.microsoft.com/office/drawing/2010/main" xmlns="" w="9525">
                     <a:solidFill>
                       <a:srgbClr val="000000"/>
                     </a:solidFill>
@@ -16429,7 +16449,7 @@
               </a:ln>
               <a:extLst>
                 <a:ext uri="{91240B29-F687-4f45-9708-019B960494DF}">
-                  <a14:hiddenLine xmlns="" xmlns:a14="http://schemas.microsoft.com/office/drawing/2010/main" w="9525">
+                  <a14:hiddenLine xmlns:a14="http://schemas.microsoft.com/office/drawing/2010/main" xmlns="" w="9525">
                     <a:solidFill>
                       <a:srgbClr val="000000"/>
                     </a:solidFill>
@@ -16497,7 +16517,7 @@
               </a:ln>
               <a:extLst>
                 <a:ext uri="{91240B29-F687-4f45-9708-019B960494DF}">
-                  <a14:hiddenLine xmlns="" xmlns:a14="http://schemas.microsoft.com/office/drawing/2010/main" w="9525">
+                  <a14:hiddenLine xmlns:a14="http://schemas.microsoft.com/office/drawing/2010/main" xmlns="" w="9525">
                     <a:solidFill>
                       <a:srgbClr val="000000"/>
                     </a:solidFill>
@@ -16587,7 +16607,7 @@
               </a:ln>
               <a:extLst>
                 <a:ext uri="{91240B29-F687-4f45-9708-019B960494DF}">
-                  <a14:hiddenLine xmlns="" xmlns:a14="http://schemas.microsoft.com/office/drawing/2010/main" w="9525">
+                  <a14:hiddenLine xmlns:a14="http://schemas.microsoft.com/office/drawing/2010/main" xmlns="" w="9525">
                     <a:solidFill>
                       <a:srgbClr val="000000"/>
                     </a:solidFill>
@@ -16621,7 +16641,7 @@
               </a:ln>
               <a:extLst>
                 <a:ext uri="{91240B29-F687-4f45-9708-019B960494DF}">
-                  <a14:hiddenLine xmlns="" xmlns:a14="http://schemas.microsoft.com/office/drawing/2010/main" w="9525">
+                  <a14:hiddenLine xmlns:a14="http://schemas.microsoft.com/office/drawing/2010/main" xmlns="" w="9525">
                     <a:solidFill>
                       <a:srgbClr val="000000"/>
                     </a:solidFill>
@@ -17214,7 +17234,7 @@
                 <a16:creationId xmlns:a16="http://schemas.microsoft.com/office/drawing/2014/main" id="{174E31E4-530B-4247-962C-F46F5F66DFFB}"/>
               </a:ext>
               <a:ext uri="{C183D7F6-B498-43B3-948B-1728B52AA6E4}">
-                <adec:decorative xmlns:adec="http://schemas.microsoft.com/office/drawing/2017/decorative" val="1"/>
+                <adec:decorative xmlns:adec="http://schemas.microsoft.com/office/drawing/2017/decorative" xmlns="" val="1"/>
               </a:ext>
             </a:extLst>
           </p:cNvPr>
@@ -17254,7 +17274,7 @@
           <a:noFill/>
           <a:extLst>
             <a:ext uri="{909E8E84-426E-40dd-AFC4-6F175D3DCCD1}">
-              <a14:hiddenFill xmlns:a14="http://schemas.microsoft.com/office/drawing/2010/main" xmlns:a16="http://schemas.microsoft.com/office/drawing/2014/main" xmlns="">
+              <a14:hiddenFill xmlns="" xmlns:a16="http://schemas.microsoft.com/office/drawing/2014/main" xmlns:a14="http://schemas.microsoft.com/office/drawing/2010/main">
                 <a:solidFill>
                   <a:srgbClr val="FFFFFF"/>
                 </a:solidFill>
@@ -17271,7 +17291,7 @@
                 <a16:creationId xmlns:a16="http://schemas.microsoft.com/office/drawing/2014/main" id="{96FA2727-C33B-44D1-885B-76DC0424E577}"/>
               </a:ext>
               <a:ext uri="{C183D7F6-B498-43B3-948B-1728B52AA6E4}">
-                <adec:decorative xmlns:adec="http://schemas.microsoft.com/office/drawing/2017/decorative" val="1"/>
+                <adec:decorative xmlns:adec="http://schemas.microsoft.com/office/drawing/2017/decorative" xmlns="" val="1"/>
               </a:ext>
             </a:extLst>
           </p:cNvPr>
@@ -17302,7 +17322,7 @@
                   <a16:creationId xmlns:a16="http://schemas.microsoft.com/office/drawing/2014/main" id="{4A64FD4C-29BA-46E7-AE31-AB38BB694295}"/>
                 </a:ext>
                 <a:ext uri="{C183D7F6-B498-43B3-948B-1728B52AA6E4}">
-                  <adec:decorative xmlns:adec="http://schemas.microsoft.com/office/drawing/2017/decorative" val="1"/>
+                  <adec:decorative xmlns:adec="http://schemas.microsoft.com/office/drawing/2017/decorative" xmlns="" val="1"/>
                 </a:ext>
               </a:extLst>
             </p:cNvPr>
@@ -17346,7 +17366,7 @@
                     <a16:creationId xmlns:a16="http://schemas.microsoft.com/office/drawing/2014/main" id="{A28E5FB6-5905-4F5D-A6CE-E6222C405E5B}"/>
                   </a:ext>
                   <a:ext uri="{C183D7F6-B498-43B3-948B-1728B52AA6E4}">
-                    <adec:decorative xmlns:adec="http://schemas.microsoft.com/office/drawing/2017/decorative" val="1"/>
+                    <adec:decorative xmlns:adec="http://schemas.microsoft.com/office/drawing/2017/decorative" xmlns="" val="1"/>
                   </a:ext>
                 </a:extLst>
               </p:cNvPr>
@@ -17375,7 +17395,7 @@
               </a:ln>
               <a:extLst>
                 <a:ext uri="{91240B29-F687-4f45-9708-019B960494DF}">
-                  <a14:hiddenLine xmlns:a14="http://schemas.microsoft.com/office/drawing/2010/main" xmlns:a16="http://schemas.microsoft.com/office/drawing/2014/main" xmlns="" w="9525">
+                  <a14:hiddenLine xmlns="" xmlns:a16="http://schemas.microsoft.com/office/drawing/2014/main" xmlns:a14="http://schemas.microsoft.com/office/drawing/2010/main" w="9525">
                     <a:solidFill>
                       <a:srgbClr val="000000"/>
                     </a:solidFill>
@@ -17395,7 +17415,7 @@
                     <a16:creationId xmlns:a16="http://schemas.microsoft.com/office/drawing/2014/main" id="{F838FE17-378C-4BCE-80C0-FDD1CB074E22}"/>
                   </a:ext>
                   <a:ext uri="{C183D7F6-B498-43B3-948B-1728B52AA6E4}">
-                    <adec:decorative xmlns:adec="http://schemas.microsoft.com/office/drawing/2017/decorative" val="1"/>
+                    <adec:decorative xmlns:adec="http://schemas.microsoft.com/office/drawing/2017/decorative" xmlns="" val="1"/>
                   </a:ext>
                 </a:extLst>
               </p:cNvPr>
@@ -17480,7 +17500,7 @@
               </a:ln>
               <a:extLst>
                 <a:ext uri="{91240B29-F687-4f45-9708-019B960494DF}">
-                  <a14:hiddenLine xmlns:a14="http://schemas.microsoft.com/office/drawing/2010/main" xmlns:a16="http://schemas.microsoft.com/office/drawing/2014/main" xmlns="" w="9525">
+                  <a14:hiddenLine xmlns="" xmlns:a16="http://schemas.microsoft.com/office/drawing/2014/main" xmlns:a14="http://schemas.microsoft.com/office/drawing/2010/main" w="9525">
                     <a:solidFill>
                       <a:srgbClr val="000000"/>
                     </a:solidFill>
@@ -17500,7 +17520,7 @@
                     <a16:creationId xmlns:a16="http://schemas.microsoft.com/office/drawing/2014/main" id="{12A1474E-6A37-4F4D-A638-DD0EC0A5B5B7}"/>
                   </a:ext>
                   <a:ext uri="{C183D7F6-B498-43B3-948B-1728B52AA6E4}">
-                    <adec:decorative xmlns:adec="http://schemas.microsoft.com/office/drawing/2017/decorative" val="1"/>
+                    <adec:decorative xmlns:adec="http://schemas.microsoft.com/office/drawing/2017/decorative" xmlns="" val="1"/>
                   </a:ext>
                 </a:extLst>
               </p:cNvPr>
@@ -17585,7 +17605,7 @@
               </a:ln>
               <a:extLst>
                 <a:ext uri="{91240B29-F687-4f45-9708-019B960494DF}">
-                  <a14:hiddenLine xmlns:a14="http://schemas.microsoft.com/office/drawing/2010/main" xmlns:a16="http://schemas.microsoft.com/office/drawing/2014/main" xmlns="" w="9525">
+                  <a14:hiddenLine xmlns="" xmlns:a16="http://schemas.microsoft.com/office/drawing/2014/main" xmlns:a14="http://schemas.microsoft.com/office/drawing/2010/main" w="9525">
                     <a:solidFill>
                       <a:srgbClr val="000000"/>
                     </a:solidFill>
@@ -17605,7 +17625,7 @@
                     <a16:creationId xmlns:a16="http://schemas.microsoft.com/office/drawing/2014/main" id="{49EA8CC2-4D0F-4C86-9CA9-FC3792FED1C1}"/>
                   </a:ext>
                   <a:ext uri="{C183D7F6-B498-43B3-948B-1728B52AA6E4}">
-                    <adec:decorative xmlns:adec="http://schemas.microsoft.com/office/drawing/2017/decorative" val="1"/>
+                    <adec:decorative xmlns:adec="http://schemas.microsoft.com/office/drawing/2017/decorative" xmlns="" val="1"/>
                   </a:ext>
                 </a:extLst>
               </p:cNvPr>
@@ -17662,7 +17682,7 @@
               </a:ln>
               <a:extLst>
                 <a:ext uri="{91240B29-F687-4f45-9708-019B960494DF}">
-                  <a14:hiddenLine xmlns:a14="http://schemas.microsoft.com/office/drawing/2010/main" xmlns:a16="http://schemas.microsoft.com/office/drawing/2014/main" xmlns="" w="9525">
+                  <a14:hiddenLine xmlns="" xmlns:a16="http://schemas.microsoft.com/office/drawing/2014/main" xmlns:a14="http://schemas.microsoft.com/office/drawing/2010/main" w="9525">
                     <a:solidFill>
                       <a:srgbClr val="000000"/>
                     </a:solidFill>
@@ -17682,7 +17702,7 @@
                     <a16:creationId xmlns:a16="http://schemas.microsoft.com/office/drawing/2014/main" id="{69548BD5-92E6-42BD-9719-16AA005C5678}"/>
                   </a:ext>
                   <a:ext uri="{C183D7F6-B498-43B3-948B-1728B52AA6E4}">
-                    <adec:decorative xmlns:adec="http://schemas.microsoft.com/office/drawing/2017/decorative" val="1"/>
+                    <adec:decorative xmlns:adec="http://schemas.microsoft.com/office/drawing/2017/decorative" xmlns="" val="1"/>
                   </a:ext>
                 </a:extLst>
               </p:cNvPr>
@@ -17767,7 +17787,7 @@
               </a:ln>
               <a:extLst>
                 <a:ext uri="{91240B29-F687-4f45-9708-019B960494DF}">
-                  <a14:hiddenLine xmlns:a14="http://schemas.microsoft.com/office/drawing/2010/main" xmlns:a16="http://schemas.microsoft.com/office/drawing/2014/main" xmlns="" w="9525">
+                  <a14:hiddenLine xmlns="" xmlns:a16="http://schemas.microsoft.com/office/drawing/2014/main" xmlns:a14="http://schemas.microsoft.com/office/drawing/2010/main" w="9525">
                     <a:solidFill>
                       <a:srgbClr val="000000"/>
                     </a:solidFill>
@@ -17787,7 +17807,7 @@
                     <a16:creationId xmlns:a16="http://schemas.microsoft.com/office/drawing/2014/main" id="{93005965-F240-4349-A563-515973BF0133}"/>
                   </a:ext>
                   <a:ext uri="{C183D7F6-B498-43B3-948B-1728B52AA6E4}">
-                    <adec:decorative xmlns:adec="http://schemas.microsoft.com/office/drawing/2017/decorative" val="1"/>
+                    <adec:decorative xmlns:adec="http://schemas.microsoft.com/office/drawing/2017/decorative" xmlns="" val="1"/>
                   </a:ext>
                 </a:extLst>
               </p:cNvPr>
@@ -17844,7 +17864,7 @@
               </a:ln>
               <a:extLst>
                 <a:ext uri="{91240B29-F687-4f45-9708-019B960494DF}">
-                  <a14:hiddenLine xmlns:a14="http://schemas.microsoft.com/office/drawing/2010/main" xmlns:a16="http://schemas.microsoft.com/office/drawing/2014/main" xmlns="" w="9525">
+                  <a14:hiddenLine xmlns="" xmlns:a16="http://schemas.microsoft.com/office/drawing/2014/main" xmlns:a14="http://schemas.microsoft.com/office/drawing/2010/main" w="9525">
                     <a:solidFill>
                       <a:srgbClr val="000000"/>
                     </a:solidFill>
@@ -17864,7 +17884,7 @@
                     <a16:creationId xmlns:a16="http://schemas.microsoft.com/office/drawing/2014/main" id="{277A546F-05BB-4274-A6A6-9DACC27ABCFA}"/>
                   </a:ext>
                   <a:ext uri="{C183D7F6-B498-43B3-948B-1728B52AA6E4}">
-                    <adec:decorative xmlns:adec="http://schemas.microsoft.com/office/drawing/2017/decorative" val="1"/>
+                    <adec:decorative xmlns:adec="http://schemas.microsoft.com/office/drawing/2017/decorative" xmlns="" val="1"/>
                   </a:ext>
                 </a:extLst>
               </p:cNvPr>
@@ -17921,7 +17941,7 @@
               </a:ln>
               <a:extLst>
                 <a:ext uri="{91240B29-F687-4f45-9708-019B960494DF}">
-                  <a14:hiddenLine xmlns:a14="http://schemas.microsoft.com/office/drawing/2010/main" xmlns:a16="http://schemas.microsoft.com/office/drawing/2014/main" xmlns="" w="9525">
+                  <a14:hiddenLine xmlns="" xmlns:a16="http://schemas.microsoft.com/office/drawing/2014/main" xmlns:a14="http://schemas.microsoft.com/office/drawing/2010/main" w="9525">
                     <a:solidFill>
                       <a:srgbClr val="000000"/>
                     </a:solidFill>
@@ -17941,7 +17961,7 @@
                     <a16:creationId xmlns:a16="http://schemas.microsoft.com/office/drawing/2014/main" id="{7BE7FF91-E18E-41AA-A952-07CB0C02C8B6}"/>
                   </a:ext>
                   <a:ext uri="{C183D7F6-B498-43B3-948B-1728B52AA6E4}">
-                    <adec:decorative xmlns:adec="http://schemas.microsoft.com/office/drawing/2017/decorative" val="1"/>
+                    <adec:decorative xmlns:adec="http://schemas.microsoft.com/office/drawing/2017/decorative" xmlns="" val="1"/>
                   </a:ext>
                 </a:extLst>
               </p:cNvPr>
@@ -18026,7 +18046,7 @@
               </a:ln>
               <a:extLst>
                 <a:ext uri="{91240B29-F687-4f45-9708-019B960494DF}">
-                  <a14:hiddenLine xmlns:a14="http://schemas.microsoft.com/office/drawing/2010/main" xmlns:a16="http://schemas.microsoft.com/office/drawing/2014/main" xmlns="" w="9525">
+                  <a14:hiddenLine xmlns="" xmlns:a16="http://schemas.microsoft.com/office/drawing/2014/main" xmlns:a14="http://schemas.microsoft.com/office/drawing/2010/main" w="9525">
                     <a:solidFill>
                       <a:srgbClr val="000000"/>
                     </a:solidFill>
@@ -18046,7 +18066,7 @@
                     <a16:creationId xmlns:a16="http://schemas.microsoft.com/office/drawing/2014/main" id="{3F6A31AA-E4FB-4DD0-9AB1-BDD994CFA50E}"/>
                   </a:ext>
                   <a:ext uri="{C183D7F6-B498-43B3-948B-1728B52AA6E4}">
-                    <adec:decorative xmlns:adec="http://schemas.microsoft.com/office/drawing/2017/decorative" val="1"/>
+                    <adec:decorative xmlns:adec="http://schemas.microsoft.com/office/drawing/2017/decorative" xmlns="" val="1"/>
                   </a:ext>
                 </a:extLst>
               </p:cNvPr>
@@ -18131,7 +18151,7 @@
               </a:ln>
               <a:extLst>
                 <a:ext uri="{91240B29-F687-4f45-9708-019B960494DF}">
-                  <a14:hiddenLine xmlns:a14="http://schemas.microsoft.com/office/drawing/2010/main" xmlns:a16="http://schemas.microsoft.com/office/drawing/2014/main" xmlns="" w="9525">
+                  <a14:hiddenLine xmlns="" xmlns:a16="http://schemas.microsoft.com/office/drawing/2014/main" xmlns:a14="http://schemas.microsoft.com/office/drawing/2010/main" w="9525">
                     <a:solidFill>
                       <a:srgbClr val="000000"/>
                     </a:solidFill>
@@ -18151,7 +18171,7 @@
                     <a16:creationId xmlns:a16="http://schemas.microsoft.com/office/drawing/2014/main" id="{F99B8398-08D8-4C1E-8D7F-BAFB4D393765}"/>
                   </a:ext>
                   <a:ext uri="{C183D7F6-B498-43B3-948B-1728B52AA6E4}">
-                    <adec:decorative xmlns:adec="http://schemas.microsoft.com/office/drawing/2017/decorative" val="1"/>
+                    <adec:decorative xmlns:adec="http://schemas.microsoft.com/office/drawing/2017/decorative" xmlns="" val="1"/>
                   </a:ext>
                 </a:extLst>
               </p:cNvPr>
@@ -18208,7 +18228,7 @@
               </a:ln>
               <a:extLst>
                 <a:ext uri="{91240B29-F687-4f45-9708-019B960494DF}">
-                  <a14:hiddenLine xmlns:a14="http://schemas.microsoft.com/office/drawing/2010/main" xmlns:a16="http://schemas.microsoft.com/office/drawing/2014/main" xmlns="" w="9525">
+                  <a14:hiddenLine xmlns="" xmlns:a16="http://schemas.microsoft.com/office/drawing/2014/main" xmlns:a14="http://schemas.microsoft.com/office/drawing/2010/main" w="9525">
                     <a:solidFill>
                       <a:srgbClr val="000000"/>
                     </a:solidFill>
@@ -18228,7 +18248,7 @@
                     <a16:creationId xmlns:a16="http://schemas.microsoft.com/office/drawing/2014/main" id="{CD3984BB-CCC2-49D9-A80B-9507BE5A9167}"/>
                   </a:ext>
                   <a:ext uri="{C183D7F6-B498-43B3-948B-1728B52AA6E4}">
-                    <adec:decorative xmlns:adec="http://schemas.microsoft.com/office/drawing/2017/decorative" val="1"/>
+                    <adec:decorative xmlns:adec="http://schemas.microsoft.com/office/drawing/2017/decorative" xmlns="" val="1"/>
                   </a:ext>
                 </a:extLst>
               </p:cNvPr>
@@ -18333,7 +18353,7 @@
               </a:ln>
               <a:extLst>
                 <a:ext uri="{91240B29-F687-4f45-9708-019B960494DF}">
-                  <a14:hiddenLine xmlns:a14="http://schemas.microsoft.com/office/drawing/2010/main" xmlns:a16="http://schemas.microsoft.com/office/drawing/2014/main" xmlns="" w="9525">
+                  <a14:hiddenLine xmlns="" xmlns:a16="http://schemas.microsoft.com/office/drawing/2014/main" xmlns:a14="http://schemas.microsoft.com/office/drawing/2010/main" w="9525">
                     <a:solidFill>
                       <a:srgbClr val="000000"/>
                     </a:solidFill>
@@ -18353,7 +18373,7 @@
                     <a16:creationId xmlns:a16="http://schemas.microsoft.com/office/drawing/2014/main" id="{78FF7C07-82F5-4A64-9D71-29CBE1B79007}"/>
                   </a:ext>
                   <a:ext uri="{C183D7F6-B498-43B3-948B-1728B52AA6E4}">
-                    <adec:decorative xmlns:adec="http://schemas.microsoft.com/office/drawing/2017/decorative" val="1"/>
+                    <adec:decorative xmlns:adec="http://schemas.microsoft.com/office/drawing/2017/decorative" xmlns="" val="1"/>
                   </a:ext>
                 </a:extLst>
               </p:cNvPr>
@@ -18396,7 +18416,7 @@
                     <a16:creationId xmlns:a16="http://schemas.microsoft.com/office/drawing/2014/main" id="{7F1773CA-6AE7-4723-B072-CEC5F3829B40}"/>
                   </a:ext>
                   <a:ext uri="{C183D7F6-B498-43B3-948B-1728B52AA6E4}">
-                    <adec:decorative xmlns:adec="http://schemas.microsoft.com/office/drawing/2017/decorative" val="1"/>
+                    <adec:decorative xmlns:adec="http://schemas.microsoft.com/office/drawing/2017/decorative" xmlns="" val="1"/>
                   </a:ext>
                 </a:extLst>
               </p:cNvPr>
@@ -18447,7 +18467,7 @@
               </a:ln>
               <a:extLst>
                 <a:ext uri="{91240B29-F687-4f45-9708-019B960494DF}">
-                  <a14:hiddenLine xmlns:a14="http://schemas.microsoft.com/office/drawing/2010/main" xmlns:a16="http://schemas.microsoft.com/office/drawing/2014/main" xmlns="" w="9525">
+                  <a14:hiddenLine xmlns="" xmlns:a16="http://schemas.microsoft.com/office/drawing/2014/main" xmlns:a14="http://schemas.microsoft.com/office/drawing/2010/main" w="9525">
                     <a:solidFill>
                       <a:srgbClr val="000000"/>
                     </a:solidFill>
@@ -18467,7 +18487,7 @@
                     <a16:creationId xmlns:a16="http://schemas.microsoft.com/office/drawing/2014/main" id="{D5EC23E0-B877-4A62-B084-5407401FB6A1}"/>
                   </a:ext>
                   <a:ext uri="{C183D7F6-B498-43B3-948B-1728B52AA6E4}">
-                    <adec:decorative xmlns:adec="http://schemas.microsoft.com/office/drawing/2017/decorative" val="1"/>
+                    <adec:decorative xmlns:adec="http://schemas.microsoft.com/office/drawing/2017/decorative" xmlns="" val="1"/>
                   </a:ext>
                 </a:extLst>
               </p:cNvPr>
@@ -18524,7 +18544,7 @@
               </a:ln>
               <a:extLst>
                 <a:ext uri="{91240B29-F687-4f45-9708-019B960494DF}">
-                  <a14:hiddenLine xmlns:a14="http://schemas.microsoft.com/office/drawing/2010/main" xmlns:a16="http://schemas.microsoft.com/office/drawing/2014/main" xmlns="" w="9525">
+                  <a14:hiddenLine xmlns="" xmlns:a16="http://schemas.microsoft.com/office/drawing/2014/main" xmlns:a14="http://schemas.microsoft.com/office/drawing/2010/main" w="9525">
                     <a:solidFill>
                       <a:srgbClr val="000000"/>
                     </a:solidFill>
@@ -18544,7 +18564,7 @@
                     <a16:creationId xmlns:a16="http://schemas.microsoft.com/office/drawing/2014/main" id="{633C4B0E-E7C6-4A1A-9D3A-80C8E3C59DCD}"/>
                   </a:ext>
                   <a:ext uri="{C183D7F6-B498-43B3-948B-1728B52AA6E4}">
-                    <adec:decorative xmlns:adec="http://schemas.microsoft.com/office/drawing/2017/decorative" val="1"/>
+                    <adec:decorative xmlns:adec="http://schemas.microsoft.com/office/drawing/2017/decorative" xmlns="" val="1"/>
                   </a:ext>
                 </a:extLst>
               </p:cNvPr>
@@ -18601,7 +18621,7 @@
               </a:ln>
               <a:extLst>
                 <a:ext uri="{91240B29-F687-4f45-9708-019B960494DF}">
-                  <a14:hiddenLine xmlns:a14="http://schemas.microsoft.com/office/drawing/2010/main" xmlns:a16="http://schemas.microsoft.com/office/drawing/2014/main" xmlns="" w="9525">
+                  <a14:hiddenLine xmlns="" xmlns:a16="http://schemas.microsoft.com/office/drawing/2014/main" xmlns:a14="http://schemas.microsoft.com/office/drawing/2010/main" w="9525">
                     <a:solidFill>
                       <a:srgbClr val="000000"/>
                     </a:solidFill>
@@ -18621,7 +18641,7 @@
                     <a16:creationId xmlns:a16="http://schemas.microsoft.com/office/drawing/2014/main" id="{AB21372F-73AC-4C69-81F0-0D44D36F6EF2}"/>
                   </a:ext>
                   <a:ext uri="{C183D7F6-B498-43B3-948B-1728B52AA6E4}">
-                    <adec:decorative xmlns:adec="http://schemas.microsoft.com/office/drawing/2017/decorative" val="1"/>
+                    <adec:decorative xmlns:adec="http://schemas.microsoft.com/office/drawing/2017/decorative" xmlns="" val="1"/>
                   </a:ext>
                 </a:extLst>
               </p:cNvPr>
@@ -18706,7 +18726,7 @@
               </a:ln>
               <a:extLst>
                 <a:ext uri="{91240B29-F687-4f45-9708-019B960494DF}">
-                  <a14:hiddenLine xmlns:a14="http://schemas.microsoft.com/office/drawing/2010/main" xmlns:a16="http://schemas.microsoft.com/office/drawing/2014/main" xmlns="" w="9525">
+                  <a14:hiddenLine xmlns="" xmlns:a16="http://schemas.microsoft.com/office/drawing/2014/main" xmlns:a14="http://schemas.microsoft.com/office/drawing/2010/main" w="9525">
                     <a:solidFill>
                       <a:srgbClr val="000000"/>
                     </a:solidFill>
@@ -18726,7 +18746,7 @@
                     <a16:creationId xmlns:a16="http://schemas.microsoft.com/office/drawing/2014/main" id="{B5619D97-D7A8-4DFF-8AB1-F4B393C1B408}"/>
                   </a:ext>
                   <a:ext uri="{C183D7F6-B498-43B3-948B-1728B52AA6E4}">
-                    <adec:decorative xmlns:adec="http://schemas.microsoft.com/office/drawing/2017/decorative" val="1"/>
+                    <adec:decorative xmlns:adec="http://schemas.microsoft.com/office/drawing/2017/decorative" xmlns="" val="1"/>
                   </a:ext>
                 </a:extLst>
               </p:cNvPr>
@@ -18755,7 +18775,7 @@
               </a:ln>
               <a:extLst>
                 <a:ext uri="{91240B29-F687-4f45-9708-019B960494DF}">
-                  <a14:hiddenLine xmlns:a14="http://schemas.microsoft.com/office/drawing/2010/main" xmlns:a16="http://schemas.microsoft.com/office/drawing/2014/main" xmlns="" w="9525">
+                  <a14:hiddenLine xmlns="" xmlns:a16="http://schemas.microsoft.com/office/drawing/2014/main" xmlns:a14="http://schemas.microsoft.com/office/drawing/2010/main" w="9525">
                     <a:solidFill>
                       <a:srgbClr val="000000"/>
                     </a:solidFill>
@@ -18775,7 +18795,7 @@
                     <a16:creationId xmlns:a16="http://schemas.microsoft.com/office/drawing/2014/main" id="{55E03CED-9618-41BB-898B-2FECEFD7B74C}"/>
                   </a:ext>
                   <a:ext uri="{C183D7F6-B498-43B3-948B-1728B52AA6E4}">
-                    <adec:decorative xmlns:adec="http://schemas.microsoft.com/office/drawing/2017/decorative" val="1"/>
+                    <adec:decorative xmlns:adec="http://schemas.microsoft.com/office/drawing/2017/decorative" xmlns="" val="1"/>
                   </a:ext>
                 </a:extLst>
               </p:cNvPr>
@@ -18835,7 +18855,7 @@
               </a:ln>
               <a:extLst>
                 <a:ext uri="{91240B29-F687-4f45-9708-019B960494DF}">
-                  <a14:hiddenLine xmlns:a14="http://schemas.microsoft.com/office/drawing/2010/main" xmlns:a16="http://schemas.microsoft.com/office/drawing/2014/main" xmlns="" w="9525">
+                  <a14:hiddenLine xmlns="" xmlns:a16="http://schemas.microsoft.com/office/drawing/2014/main" xmlns:a14="http://schemas.microsoft.com/office/drawing/2010/main" w="9525">
                     <a:solidFill>
                       <a:srgbClr val="000000"/>
                     </a:solidFill>
@@ -18855,7 +18875,7 @@
                     <a16:creationId xmlns:a16="http://schemas.microsoft.com/office/drawing/2014/main" id="{78F0A5C5-589E-4053-A41A-FA77210C3D8A}"/>
                   </a:ext>
                   <a:ext uri="{C183D7F6-B498-43B3-948B-1728B52AA6E4}">
-                    <adec:decorative xmlns:adec="http://schemas.microsoft.com/office/drawing/2017/decorative" val="1"/>
+                    <adec:decorative xmlns:adec="http://schemas.microsoft.com/office/drawing/2017/decorative" xmlns="" val="1"/>
                   </a:ext>
                 </a:extLst>
               </p:cNvPr>
@@ -18940,7 +18960,7 @@
               </a:ln>
               <a:extLst>
                 <a:ext uri="{91240B29-F687-4f45-9708-019B960494DF}">
-                  <a14:hiddenLine xmlns:a14="http://schemas.microsoft.com/office/drawing/2010/main" xmlns:a16="http://schemas.microsoft.com/office/drawing/2014/main" xmlns="" w="9525">
+                  <a14:hiddenLine xmlns="" xmlns:a16="http://schemas.microsoft.com/office/drawing/2014/main" xmlns:a14="http://schemas.microsoft.com/office/drawing/2010/main" w="9525">
                     <a:solidFill>
                       <a:srgbClr val="000000"/>
                     </a:solidFill>
@@ -18960,7 +18980,7 @@
                     <a16:creationId xmlns:a16="http://schemas.microsoft.com/office/drawing/2014/main" id="{AC2718F8-15C5-4DAB-B194-AAEE8A205E42}"/>
                   </a:ext>
                   <a:ext uri="{C183D7F6-B498-43B3-948B-1728B52AA6E4}">
-                    <adec:decorative xmlns:adec="http://schemas.microsoft.com/office/drawing/2017/decorative" val="1"/>
+                    <adec:decorative xmlns:adec="http://schemas.microsoft.com/office/drawing/2017/decorative" xmlns="" val="1"/>
                   </a:ext>
                 </a:extLst>
               </p:cNvPr>
@@ -19017,7 +19037,7 @@
               </a:ln>
               <a:extLst>
                 <a:ext uri="{91240B29-F687-4f45-9708-019B960494DF}">
-                  <a14:hiddenLine xmlns:a14="http://schemas.microsoft.com/office/drawing/2010/main" xmlns:a16="http://schemas.microsoft.com/office/drawing/2014/main" xmlns="" w="9525">
+                  <a14:hiddenLine xmlns="" xmlns:a16="http://schemas.microsoft.com/office/drawing/2014/main" xmlns:a14="http://schemas.microsoft.com/office/drawing/2010/main" w="9525">
                     <a:solidFill>
                       <a:srgbClr val="000000"/>
                     </a:solidFill>
@@ -19037,7 +19057,7 @@
                     <a16:creationId xmlns:a16="http://schemas.microsoft.com/office/drawing/2014/main" id="{23C6608B-EA21-4579-B33F-55E52AC28756}"/>
                   </a:ext>
                   <a:ext uri="{C183D7F6-B498-43B3-948B-1728B52AA6E4}">
-                    <adec:decorative xmlns:adec="http://schemas.microsoft.com/office/drawing/2017/decorative" val="1"/>
+                    <adec:decorative xmlns:adec="http://schemas.microsoft.com/office/drawing/2017/decorative" xmlns="" val="1"/>
                   </a:ext>
                 </a:extLst>
               </p:cNvPr>
@@ -19122,7 +19142,7 @@
               </a:ln>
               <a:extLst>
                 <a:ext uri="{91240B29-F687-4f45-9708-019B960494DF}">
-                  <a14:hiddenLine xmlns:a14="http://schemas.microsoft.com/office/drawing/2010/main" xmlns:a16="http://schemas.microsoft.com/office/drawing/2014/main" xmlns="" w="9525">
+                  <a14:hiddenLine xmlns="" xmlns:a16="http://schemas.microsoft.com/office/drawing/2014/main" xmlns:a14="http://schemas.microsoft.com/office/drawing/2010/main" w="9525">
                     <a:solidFill>
                       <a:srgbClr val="000000"/>
                     </a:solidFill>
@@ -19142,7 +19162,7 @@
                     <a16:creationId xmlns:a16="http://schemas.microsoft.com/office/drawing/2014/main" id="{4A2FEFA2-D838-4CE1-90BA-B6C2EEB54381}"/>
                   </a:ext>
                   <a:ext uri="{C183D7F6-B498-43B3-948B-1728B52AA6E4}">
-                    <adec:decorative xmlns:adec="http://schemas.microsoft.com/office/drawing/2017/decorative" val="1"/>
+                    <adec:decorative xmlns:adec="http://schemas.microsoft.com/office/drawing/2017/decorative" xmlns="" val="1"/>
                   </a:ext>
                 </a:extLst>
               </p:cNvPr>
@@ -19202,7 +19222,7 @@
               </a:ln>
               <a:extLst>
                 <a:ext uri="{91240B29-F687-4f45-9708-019B960494DF}">
-                  <a14:hiddenLine xmlns:a14="http://schemas.microsoft.com/office/drawing/2010/main" xmlns:a16="http://schemas.microsoft.com/office/drawing/2014/main" xmlns="" w="9525">
+                  <a14:hiddenLine xmlns="" xmlns:a16="http://schemas.microsoft.com/office/drawing/2014/main" xmlns:a14="http://schemas.microsoft.com/office/drawing/2010/main" w="9525">
                     <a:solidFill>
                       <a:srgbClr val="000000"/>
                     </a:solidFill>
@@ -19222,7 +19242,7 @@
                     <a16:creationId xmlns:a16="http://schemas.microsoft.com/office/drawing/2014/main" id="{1A39CA24-DF18-4FCC-8265-36FC72ED589B}"/>
                   </a:ext>
                   <a:ext uri="{C183D7F6-B498-43B3-948B-1728B52AA6E4}">
-                    <adec:decorative xmlns:adec="http://schemas.microsoft.com/office/drawing/2017/decorative" val="1"/>
+                    <adec:decorative xmlns:adec="http://schemas.microsoft.com/office/drawing/2017/decorative" xmlns="" val="1"/>
                   </a:ext>
                 </a:extLst>
               </p:cNvPr>
@@ -19279,7 +19299,7 @@
               </a:ln>
               <a:extLst>
                 <a:ext uri="{91240B29-F687-4f45-9708-019B960494DF}">
-                  <a14:hiddenLine xmlns:a14="http://schemas.microsoft.com/office/drawing/2010/main" xmlns:a16="http://schemas.microsoft.com/office/drawing/2014/main" xmlns="" w="9525">
+                  <a14:hiddenLine xmlns="" xmlns:a16="http://schemas.microsoft.com/office/drawing/2014/main" xmlns:a14="http://schemas.microsoft.com/office/drawing/2010/main" w="9525">
                     <a:solidFill>
                       <a:srgbClr val="000000"/>
                     </a:solidFill>
@@ -19299,7 +19319,7 @@
                     <a16:creationId xmlns:a16="http://schemas.microsoft.com/office/drawing/2014/main" id="{50A32DBD-9B22-49C3-A628-A98533FBF4FB}"/>
                   </a:ext>
                   <a:ext uri="{C183D7F6-B498-43B3-948B-1728B52AA6E4}">
-                    <adec:decorative xmlns:adec="http://schemas.microsoft.com/office/drawing/2017/decorative" val="1"/>
+                    <adec:decorative xmlns:adec="http://schemas.microsoft.com/office/drawing/2017/decorative" xmlns="" val="1"/>
                   </a:ext>
                 </a:extLst>
               </p:cNvPr>
@@ -19384,7 +19404,7 @@
               </a:ln>
               <a:extLst>
                 <a:ext uri="{91240B29-F687-4f45-9708-019B960494DF}">
-                  <a14:hiddenLine xmlns:a14="http://schemas.microsoft.com/office/drawing/2010/main" xmlns:a16="http://schemas.microsoft.com/office/drawing/2014/main" xmlns="" w="9525">
+                  <a14:hiddenLine xmlns="" xmlns:a16="http://schemas.microsoft.com/office/drawing/2014/main" xmlns:a14="http://schemas.microsoft.com/office/drawing/2010/main" w="9525">
                     <a:solidFill>
                       <a:srgbClr val="000000"/>
                     </a:solidFill>
@@ -19404,7 +19424,7 @@
                     <a16:creationId xmlns:a16="http://schemas.microsoft.com/office/drawing/2014/main" id="{A3C0B30D-BB1A-4B3D-A162-3EBE6267F214}"/>
                   </a:ext>
                   <a:ext uri="{C183D7F6-B498-43B3-948B-1728B52AA6E4}">
-                    <adec:decorative xmlns:adec="http://schemas.microsoft.com/office/drawing/2017/decorative" val="1"/>
+                    <adec:decorative xmlns:adec="http://schemas.microsoft.com/office/drawing/2017/decorative" xmlns="" val="1"/>
                   </a:ext>
                 </a:extLst>
               </p:cNvPr>
@@ -19489,7 +19509,7 @@
               </a:ln>
               <a:extLst>
                 <a:ext uri="{91240B29-F687-4f45-9708-019B960494DF}">
-                  <a14:hiddenLine xmlns:a14="http://schemas.microsoft.com/office/drawing/2010/main" xmlns:a16="http://schemas.microsoft.com/office/drawing/2014/main" xmlns="" w="9525">
+                  <a14:hiddenLine xmlns="" xmlns:a16="http://schemas.microsoft.com/office/drawing/2014/main" xmlns:a14="http://schemas.microsoft.com/office/drawing/2010/main" w="9525">
                     <a:solidFill>
                       <a:srgbClr val="000000"/>
                     </a:solidFill>
@@ -19509,7 +19529,7 @@
                     <a16:creationId xmlns:a16="http://schemas.microsoft.com/office/drawing/2014/main" id="{092B125A-1548-445E-8689-07BEEC815596}"/>
                   </a:ext>
                   <a:ext uri="{C183D7F6-B498-43B3-948B-1728B52AA6E4}">
-                    <adec:decorative xmlns:adec="http://schemas.microsoft.com/office/drawing/2017/decorative" val="1"/>
+                    <adec:decorative xmlns:adec="http://schemas.microsoft.com/office/drawing/2017/decorative" xmlns="" val="1"/>
                   </a:ext>
                 </a:extLst>
               </p:cNvPr>
@@ -19569,7 +19589,7 @@
               </a:ln>
               <a:extLst>
                 <a:ext uri="{91240B29-F687-4f45-9708-019B960494DF}">
-                  <a14:hiddenLine xmlns:a14="http://schemas.microsoft.com/office/drawing/2010/main" xmlns:a16="http://schemas.microsoft.com/office/drawing/2014/main" xmlns="" w="9525">
+                  <a14:hiddenLine xmlns="" xmlns:a16="http://schemas.microsoft.com/office/drawing/2014/main" xmlns:a14="http://schemas.microsoft.com/office/drawing/2010/main" w="9525">
                     <a:solidFill>
                       <a:srgbClr val="000000"/>
                     </a:solidFill>
@@ -19589,7 +19609,7 @@
                     <a16:creationId xmlns:a16="http://schemas.microsoft.com/office/drawing/2014/main" id="{D6A7D7B9-9A7E-4FD2-A1B4-1C5CFAE54989}"/>
                   </a:ext>
                   <a:ext uri="{C183D7F6-B498-43B3-948B-1728B52AA6E4}">
-                    <adec:decorative xmlns:adec="http://schemas.microsoft.com/office/drawing/2017/decorative" val="1"/>
+                    <adec:decorative xmlns:adec="http://schemas.microsoft.com/office/drawing/2017/decorative" xmlns="" val="1"/>
                   </a:ext>
                 </a:extLst>
               </p:cNvPr>
@@ -19704,7 +19724,7 @@
               </a:ln>
               <a:extLst>
                 <a:ext uri="{91240B29-F687-4f45-9708-019B960494DF}">
-                  <a14:hiddenLine xmlns:a14="http://schemas.microsoft.com/office/drawing/2010/main" xmlns:a16="http://schemas.microsoft.com/office/drawing/2014/main" xmlns="" w="9525">
+                  <a14:hiddenLine xmlns="" xmlns:a16="http://schemas.microsoft.com/office/drawing/2014/main" xmlns:a14="http://schemas.microsoft.com/office/drawing/2010/main" w="9525">
                     <a:solidFill>
                       <a:srgbClr val="000000"/>
                     </a:solidFill>
@@ -19725,7 +19745,7 @@
                   <a16:creationId xmlns:a16="http://schemas.microsoft.com/office/drawing/2014/main" id="{DB1B0C3F-D935-4306-B5B1-6AA635881120}"/>
                 </a:ext>
                 <a:ext uri="{C183D7F6-B498-43B3-948B-1728B52AA6E4}">
-                  <adec:decorative xmlns:adec="http://schemas.microsoft.com/office/drawing/2017/decorative" val="1"/>
+                  <adec:decorative xmlns:adec="http://schemas.microsoft.com/office/drawing/2017/decorative" xmlns="" val="1"/>
                 </a:ext>
               </a:extLst>
             </p:cNvPr>
@@ -19772,7 +19792,7 @@
                     <a16:creationId xmlns:a16="http://schemas.microsoft.com/office/drawing/2014/main" id="{75BC67F5-D485-467A-BCCB-D062EB6DD0E2}"/>
                   </a:ext>
                   <a:ext uri="{C183D7F6-B498-43B3-948B-1728B52AA6E4}">
-                    <adec:decorative xmlns:adec="http://schemas.microsoft.com/office/drawing/2017/decorative" val="1"/>
+                    <adec:decorative xmlns:adec="http://schemas.microsoft.com/office/drawing/2017/decorative" xmlns="" val="1"/>
                   </a:ext>
                 </a:extLst>
               </p:cNvPr>
@@ -19832,7 +19852,7 @@
               </a:ln>
               <a:extLst>
                 <a:ext uri="{91240B29-F687-4f45-9708-019B960494DF}">
-                  <a14:hiddenLine xmlns:a14="http://schemas.microsoft.com/office/drawing/2010/main" xmlns:a16="http://schemas.microsoft.com/office/drawing/2014/main" xmlns="" w="9525">
+                  <a14:hiddenLine xmlns="" xmlns:a16="http://schemas.microsoft.com/office/drawing/2014/main" xmlns:a14="http://schemas.microsoft.com/office/drawing/2010/main" w="9525">
                     <a:solidFill>
                       <a:srgbClr val="000000"/>
                     </a:solidFill>
@@ -19852,7 +19872,7 @@
                     <a16:creationId xmlns:a16="http://schemas.microsoft.com/office/drawing/2014/main" id="{7FB0B620-AB12-4F0B-AD1C-A47A5FBC6323}"/>
                   </a:ext>
                   <a:ext uri="{C183D7F6-B498-43B3-948B-1728B52AA6E4}">
-                    <adec:decorative xmlns:adec="http://schemas.microsoft.com/office/drawing/2017/decorative" val="1"/>
+                    <adec:decorative xmlns:adec="http://schemas.microsoft.com/office/drawing/2017/decorative" xmlns="" val="1"/>
                   </a:ext>
                 </a:extLst>
               </p:cNvPr>
@@ -19962,7 +19982,7 @@
               </a:ln>
               <a:extLst>
                 <a:ext uri="{91240B29-F687-4f45-9708-019B960494DF}">
-                  <a14:hiddenLine xmlns:a14="http://schemas.microsoft.com/office/drawing/2010/main" xmlns:a16="http://schemas.microsoft.com/office/drawing/2014/main" xmlns="" w="9525">
+                  <a14:hiddenLine xmlns="" xmlns:a16="http://schemas.microsoft.com/office/drawing/2014/main" xmlns:a14="http://schemas.microsoft.com/office/drawing/2010/main" w="9525">
                     <a:solidFill>
                       <a:srgbClr val="000000"/>
                     </a:solidFill>
@@ -19982,7 +20002,7 @@
                     <a16:creationId xmlns:a16="http://schemas.microsoft.com/office/drawing/2014/main" id="{6AEFA891-E591-4F7F-9DBA-FC78E9B8F1BC}"/>
                   </a:ext>
                   <a:ext uri="{C183D7F6-B498-43B3-948B-1728B52AA6E4}">
-                    <adec:decorative xmlns:adec="http://schemas.microsoft.com/office/drawing/2017/decorative" val="1"/>
+                    <adec:decorative xmlns:adec="http://schemas.microsoft.com/office/drawing/2017/decorative" xmlns="" val="1"/>
                   </a:ext>
                 </a:extLst>
               </p:cNvPr>
@@ -20067,7 +20087,7 @@
               </a:ln>
               <a:extLst>
                 <a:ext uri="{91240B29-F687-4f45-9708-019B960494DF}">
-                  <a14:hiddenLine xmlns:a14="http://schemas.microsoft.com/office/drawing/2010/main" xmlns:a16="http://schemas.microsoft.com/office/drawing/2014/main" xmlns="" w="9525">
+                  <a14:hiddenLine xmlns="" xmlns:a16="http://schemas.microsoft.com/office/drawing/2014/main" xmlns:a14="http://schemas.microsoft.com/office/drawing/2010/main" w="9525">
                     <a:solidFill>
                       <a:srgbClr val="000000"/>
                     </a:solidFill>
@@ -20087,7 +20107,7 @@
                     <a16:creationId xmlns:a16="http://schemas.microsoft.com/office/drawing/2014/main" id="{78921FFF-4B57-4E33-BE94-5A8BFC95E03D}"/>
                   </a:ext>
                   <a:ext uri="{C183D7F6-B498-43B3-948B-1728B52AA6E4}">
-                    <adec:decorative xmlns:adec="http://schemas.microsoft.com/office/drawing/2017/decorative" val="1"/>
+                    <adec:decorative xmlns:adec="http://schemas.microsoft.com/office/drawing/2017/decorative" xmlns="" val="1"/>
                   </a:ext>
                 </a:extLst>
               </p:cNvPr>
@@ -20147,7 +20167,7 @@
               </a:ln>
               <a:extLst>
                 <a:ext uri="{91240B29-F687-4f45-9708-019B960494DF}">
-                  <a14:hiddenLine xmlns:a14="http://schemas.microsoft.com/office/drawing/2010/main" xmlns:a16="http://schemas.microsoft.com/office/drawing/2014/main" xmlns="" w="9525">
+                  <a14:hiddenLine xmlns="" xmlns:a16="http://schemas.microsoft.com/office/drawing/2014/main" xmlns:a14="http://schemas.microsoft.com/office/drawing/2010/main" w="9525">
                     <a:solidFill>
                       <a:srgbClr val="000000"/>
                     </a:solidFill>
@@ -20167,7 +20187,7 @@
                     <a16:creationId xmlns:a16="http://schemas.microsoft.com/office/drawing/2014/main" id="{0C4A1658-5AAE-4925-B106-BC0A17862E79}"/>
                   </a:ext>
                   <a:ext uri="{C183D7F6-B498-43B3-948B-1728B52AA6E4}">
-                    <adec:decorative xmlns:adec="http://schemas.microsoft.com/office/drawing/2017/decorative" val="1"/>
+                    <adec:decorative xmlns:adec="http://schemas.microsoft.com/office/drawing/2017/decorative" xmlns="" val="1"/>
                   </a:ext>
                 </a:extLst>
               </p:cNvPr>
@@ -20252,7 +20272,7 @@
               </a:ln>
               <a:extLst>
                 <a:ext uri="{91240B29-F687-4f45-9708-019B960494DF}">
-                  <a14:hiddenLine xmlns:a14="http://schemas.microsoft.com/office/drawing/2010/main" xmlns:a16="http://schemas.microsoft.com/office/drawing/2014/main" xmlns="" w="9525">
+                  <a14:hiddenLine xmlns="" xmlns:a16="http://schemas.microsoft.com/office/drawing/2014/main" xmlns:a14="http://schemas.microsoft.com/office/drawing/2010/main" w="9525">
                     <a:solidFill>
                       <a:srgbClr val="000000"/>
                     </a:solidFill>
@@ -20272,7 +20292,7 @@
                     <a16:creationId xmlns:a16="http://schemas.microsoft.com/office/drawing/2014/main" id="{DE6DF3EB-099A-427A-A999-3BAF3BCA94E1}"/>
                   </a:ext>
                   <a:ext uri="{C183D7F6-B498-43B3-948B-1728B52AA6E4}">
-                    <adec:decorative xmlns:adec="http://schemas.microsoft.com/office/drawing/2017/decorative" val="1"/>
+                    <adec:decorative xmlns:adec="http://schemas.microsoft.com/office/drawing/2017/decorative" xmlns="" val="1"/>
                   </a:ext>
                 </a:extLst>
               </p:cNvPr>
@@ -20335,7 +20355,7 @@
               </a:ln>
               <a:extLst>
                 <a:ext uri="{91240B29-F687-4f45-9708-019B960494DF}">
-                  <a14:hiddenLine xmlns:a14="http://schemas.microsoft.com/office/drawing/2010/main" xmlns:a16="http://schemas.microsoft.com/office/drawing/2014/main" xmlns="" w="9525">
+                  <a14:hiddenLine xmlns="" xmlns:a16="http://schemas.microsoft.com/office/drawing/2014/main" xmlns:a14="http://schemas.microsoft.com/office/drawing/2010/main" w="9525">
                     <a:solidFill>
                       <a:srgbClr val="000000"/>
                     </a:solidFill>
@@ -20355,7 +20375,7 @@
                     <a16:creationId xmlns:a16="http://schemas.microsoft.com/office/drawing/2014/main" id="{CC595EFE-4690-4B81-83B1-F863B951B0E1}"/>
                   </a:ext>
                   <a:ext uri="{C183D7F6-B498-43B3-948B-1728B52AA6E4}">
-                    <adec:decorative xmlns:adec="http://schemas.microsoft.com/office/drawing/2017/decorative" val="1"/>
+                    <adec:decorative xmlns:adec="http://schemas.microsoft.com/office/drawing/2017/decorative" xmlns="" val="1"/>
                   </a:ext>
                 </a:extLst>
               </p:cNvPr>
@@ -20440,7 +20460,7 @@
               </a:ln>
               <a:extLst>
                 <a:ext uri="{91240B29-F687-4f45-9708-019B960494DF}">
-                  <a14:hiddenLine xmlns:a14="http://schemas.microsoft.com/office/drawing/2010/main" xmlns:a16="http://schemas.microsoft.com/office/drawing/2014/main" xmlns="" w="9525">
+                  <a14:hiddenLine xmlns="" xmlns:a16="http://schemas.microsoft.com/office/drawing/2014/main" xmlns:a14="http://schemas.microsoft.com/office/drawing/2010/main" w="9525">
                     <a:solidFill>
                       <a:srgbClr val="000000"/>
                     </a:solidFill>
@@ -20460,7 +20480,7 @@
                     <a16:creationId xmlns:a16="http://schemas.microsoft.com/office/drawing/2014/main" id="{400FAC39-AEAC-4B54-9694-29D537C203B1}"/>
                   </a:ext>
                   <a:ext uri="{C183D7F6-B498-43B3-948B-1728B52AA6E4}">
-                    <adec:decorative xmlns:adec="http://schemas.microsoft.com/office/drawing/2017/decorative" val="1"/>
+                    <adec:decorative xmlns:adec="http://schemas.microsoft.com/office/drawing/2017/decorative" xmlns="" val="1"/>
                   </a:ext>
                 </a:extLst>
               </p:cNvPr>
@@ -20523,7 +20543,7 @@
               </a:ln>
               <a:extLst>
                 <a:ext uri="{91240B29-F687-4f45-9708-019B960494DF}">
-                  <a14:hiddenLine xmlns:a14="http://schemas.microsoft.com/office/drawing/2010/main" xmlns:a16="http://schemas.microsoft.com/office/drawing/2014/main" xmlns="" w="9525">
+                  <a14:hiddenLine xmlns="" xmlns:a16="http://schemas.microsoft.com/office/drawing/2014/main" xmlns:a14="http://schemas.microsoft.com/office/drawing/2010/main" w="9525">
                     <a:solidFill>
                       <a:srgbClr val="000000"/>
                     </a:solidFill>
@@ -20543,7 +20563,7 @@
                     <a16:creationId xmlns:a16="http://schemas.microsoft.com/office/drawing/2014/main" id="{C61298B0-056E-4D83-B168-1C054A17A0CB}"/>
                   </a:ext>
                   <a:ext uri="{C183D7F6-B498-43B3-948B-1728B52AA6E4}">
-                    <adec:decorative xmlns:adec="http://schemas.microsoft.com/office/drawing/2017/decorative" val="1"/>
+                    <adec:decorative xmlns:adec="http://schemas.microsoft.com/office/drawing/2017/decorative" xmlns="" val="1"/>
                   </a:ext>
                 </a:extLst>
               </p:cNvPr>
@@ -20628,7 +20648,7 @@
               </a:ln>
               <a:extLst>
                 <a:ext uri="{91240B29-F687-4f45-9708-019B960494DF}">
-                  <a14:hiddenLine xmlns:a14="http://schemas.microsoft.com/office/drawing/2010/main" xmlns:a16="http://schemas.microsoft.com/office/drawing/2014/main" xmlns="" w="9525">
+                  <a14:hiddenLine xmlns="" xmlns:a16="http://schemas.microsoft.com/office/drawing/2014/main" xmlns:a14="http://schemas.microsoft.com/office/drawing/2010/main" w="9525">
                     <a:solidFill>
                       <a:srgbClr val="000000"/>
                     </a:solidFill>
@@ -20648,7 +20668,7 @@
                     <a16:creationId xmlns:a16="http://schemas.microsoft.com/office/drawing/2014/main" id="{9F9E69A2-F9B0-40C2-BDC8-143835426BEF}"/>
                   </a:ext>
                   <a:ext uri="{C183D7F6-B498-43B3-948B-1728B52AA6E4}">
-                    <adec:decorative xmlns:adec="http://schemas.microsoft.com/office/drawing/2017/decorative" val="1"/>
+                    <adec:decorative xmlns:adec="http://schemas.microsoft.com/office/drawing/2017/decorative" xmlns="" val="1"/>
                   </a:ext>
                 </a:extLst>
               </p:cNvPr>
@@ -20677,7 +20697,7 @@
               </a:ln>
               <a:extLst>
                 <a:ext uri="{91240B29-F687-4f45-9708-019B960494DF}">
-                  <a14:hiddenLine xmlns:a14="http://schemas.microsoft.com/office/drawing/2010/main" xmlns:a16="http://schemas.microsoft.com/office/drawing/2014/main" xmlns="" w="9525">
+                  <a14:hiddenLine xmlns="" xmlns:a16="http://schemas.microsoft.com/office/drawing/2014/main" xmlns:a14="http://schemas.microsoft.com/office/drawing/2010/main" w="9525">
                     <a:solidFill>
                       <a:srgbClr val="000000"/>
                     </a:solidFill>
@@ -20699,7 +20719,7 @@
                 <a16:creationId xmlns:a16="http://schemas.microsoft.com/office/drawing/2014/main" id="{54B9C16B-AC4A-44ED-9075-F76549B46E7C}"/>
               </a:ext>
               <a:ext uri="{C183D7F6-B498-43B3-948B-1728B52AA6E4}">
-                <adec:decorative xmlns:adec="http://schemas.microsoft.com/office/drawing/2017/decorative" val="1"/>
+                <adec:decorative xmlns:adec="http://schemas.microsoft.com/office/drawing/2017/decorative" xmlns="" val="1"/>
               </a:ext>
             </a:extLst>
           </p:cNvPr>
@@ -20759,7 +20779,7 @@
                 <a16:creationId xmlns:a16="http://schemas.microsoft.com/office/drawing/2014/main" id="{62A2FEB6-F419-4684-9ABC-9E32E012E8B7}"/>
               </a:ext>
               <a:ext uri="{C183D7F6-B498-43B3-948B-1728B52AA6E4}">
-                <adec:decorative xmlns:adec="http://schemas.microsoft.com/office/drawing/2017/decorative" val="1"/>
+                <adec:decorative xmlns:adec="http://schemas.microsoft.com/office/drawing/2017/decorative" xmlns="" val="1"/>
               </a:ext>
             </a:extLst>
           </p:cNvPr>
@@ -20805,7 +20825,7 @@
                   <a16:creationId xmlns:a16="http://schemas.microsoft.com/office/drawing/2014/main" id="{21E24A15-28D6-4CEB-9268-0BB0BEEAF38C}"/>
                 </a:ext>
                 <a:ext uri="{C183D7F6-B498-43B3-948B-1728B52AA6E4}">
-                  <adec:decorative xmlns:adec="http://schemas.microsoft.com/office/drawing/2017/decorative" val="1"/>
+                  <adec:decorative xmlns:adec="http://schemas.microsoft.com/office/drawing/2017/decorative" xmlns="" val="1"/>
                 </a:ext>
               </a:extLst>
             </p:cNvPr>
@@ -20834,7 +20854,7 @@
             </a:ln>
             <a:extLst>
               <a:ext uri="{91240B29-F687-4f45-9708-019B960494DF}">
-                <a14:hiddenLine xmlns:a14="http://schemas.microsoft.com/office/drawing/2010/main" xmlns:dgm="http://schemas.openxmlformats.org/drawingml/2006/diagram" xmlns:p14="http://schemas.microsoft.com/office/powerpoint/2010/main" xmlns:a16="http://schemas.microsoft.com/office/drawing/2014/main" xmlns="" w="9525">
+                <a14:hiddenLine xmlns="" xmlns:a16="http://schemas.microsoft.com/office/drawing/2014/main" xmlns:p14="http://schemas.microsoft.com/office/powerpoint/2010/main" xmlns:dgm="http://schemas.openxmlformats.org/drawingml/2006/diagram" xmlns:a14="http://schemas.microsoft.com/office/drawing/2010/main" w="9525">
                   <a:solidFill>
                     <a:srgbClr val="000000"/>
                   </a:solidFill>
@@ -20854,7 +20874,7 @@
                   <a16:creationId xmlns:a16="http://schemas.microsoft.com/office/drawing/2014/main" id="{4345933F-9633-4510-90E1-08B0E2A19E79}"/>
                 </a:ext>
                 <a:ext uri="{C183D7F6-B498-43B3-948B-1728B52AA6E4}">
-                  <adec:decorative xmlns:adec="http://schemas.microsoft.com/office/drawing/2017/decorative" val="1"/>
+                  <adec:decorative xmlns:adec="http://schemas.microsoft.com/office/drawing/2017/decorative" xmlns="" val="1"/>
                 </a:ext>
               </a:extLst>
             </p:cNvPr>
@@ -20939,7 +20959,7 @@
             </a:ln>
             <a:extLst>
               <a:ext uri="{91240B29-F687-4f45-9708-019B960494DF}">
-                <a14:hiddenLine xmlns:a14="http://schemas.microsoft.com/office/drawing/2010/main" xmlns:dgm="http://schemas.openxmlformats.org/drawingml/2006/diagram" xmlns:p14="http://schemas.microsoft.com/office/powerpoint/2010/main" xmlns:a16="http://schemas.microsoft.com/office/drawing/2014/main" xmlns="" w="9525">
+                <a14:hiddenLine xmlns="" xmlns:a16="http://schemas.microsoft.com/office/drawing/2014/main" xmlns:p14="http://schemas.microsoft.com/office/powerpoint/2010/main" xmlns:dgm="http://schemas.openxmlformats.org/drawingml/2006/diagram" xmlns:a14="http://schemas.microsoft.com/office/drawing/2010/main" w="9525">
                   <a:solidFill>
                     <a:srgbClr val="000000"/>
                   </a:solidFill>
@@ -20959,7 +20979,7 @@
                   <a16:creationId xmlns:a16="http://schemas.microsoft.com/office/drawing/2014/main" id="{C68A48FB-1BE4-4053-A76F-5A5511BA0E0B}"/>
                 </a:ext>
                 <a:ext uri="{C183D7F6-B498-43B3-948B-1728B52AA6E4}">
-                  <adec:decorative xmlns:adec="http://schemas.microsoft.com/office/drawing/2017/decorative" val="1"/>
+                  <adec:decorative xmlns:adec="http://schemas.microsoft.com/office/drawing/2017/decorative" xmlns="" val="1"/>
                 </a:ext>
               </a:extLst>
             </p:cNvPr>
@@ -21044,7 +21064,7 @@
             </a:ln>
             <a:extLst>
               <a:ext uri="{91240B29-F687-4f45-9708-019B960494DF}">
-                <a14:hiddenLine xmlns:a14="http://schemas.microsoft.com/office/drawing/2010/main" xmlns:dgm="http://schemas.openxmlformats.org/drawingml/2006/diagram" xmlns:p14="http://schemas.microsoft.com/office/powerpoint/2010/main" xmlns:a16="http://schemas.microsoft.com/office/drawing/2014/main" xmlns="" w="9525">
+                <a14:hiddenLine xmlns="" xmlns:a16="http://schemas.microsoft.com/office/drawing/2014/main" xmlns:p14="http://schemas.microsoft.com/office/powerpoint/2010/main" xmlns:dgm="http://schemas.openxmlformats.org/drawingml/2006/diagram" xmlns:a14="http://schemas.microsoft.com/office/drawing/2010/main" w="9525">
                   <a:solidFill>
                     <a:srgbClr val="000000"/>
                   </a:solidFill>
@@ -21064,7 +21084,7 @@
                   <a16:creationId xmlns:a16="http://schemas.microsoft.com/office/drawing/2014/main" id="{8149777B-6A9F-4C95-BF44-F96464507130}"/>
                 </a:ext>
                 <a:ext uri="{C183D7F6-B498-43B3-948B-1728B52AA6E4}">
-                  <adec:decorative xmlns:adec="http://schemas.microsoft.com/office/drawing/2017/decorative" val="1"/>
+                  <adec:decorative xmlns:adec="http://schemas.microsoft.com/office/drawing/2017/decorative" xmlns="" val="1"/>
                 </a:ext>
               </a:extLst>
             </p:cNvPr>
@@ -21121,7 +21141,7 @@
             </a:ln>
             <a:extLst>
               <a:ext uri="{91240B29-F687-4f45-9708-019B960494DF}">
-                <a14:hiddenLine xmlns:a14="http://schemas.microsoft.com/office/drawing/2010/main" xmlns:dgm="http://schemas.openxmlformats.org/drawingml/2006/diagram" xmlns:p14="http://schemas.microsoft.com/office/powerpoint/2010/main" xmlns:a16="http://schemas.microsoft.com/office/drawing/2014/main" xmlns="" w="9525">
+                <a14:hiddenLine xmlns="" xmlns:a16="http://schemas.microsoft.com/office/drawing/2014/main" xmlns:p14="http://schemas.microsoft.com/office/powerpoint/2010/main" xmlns:dgm="http://schemas.openxmlformats.org/drawingml/2006/diagram" xmlns:a14="http://schemas.microsoft.com/office/drawing/2010/main" w="9525">
                   <a:solidFill>
                     <a:srgbClr val="000000"/>
                   </a:solidFill>
@@ -21141,7 +21161,7 @@
                   <a16:creationId xmlns:a16="http://schemas.microsoft.com/office/drawing/2014/main" id="{0654845E-622A-4AD3-8F3A-6E1DEAB5FCA2}"/>
                 </a:ext>
                 <a:ext uri="{C183D7F6-B498-43B3-948B-1728B52AA6E4}">
-                  <adec:decorative xmlns:adec="http://schemas.microsoft.com/office/drawing/2017/decorative" val="1"/>
+                  <adec:decorative xmlns:adec="http://schemas.microsoft.com/office/drawing/2017/decorative" xmlns="" val="1"/>
                 </a:ext>
               </a:extLst>
             </p:cNvPr>
@@ -21226,7 +21246,7 @@
             </a:ln>
             <a:extLst>
               <a:ext uri="{91240B29-F687-4f45-9708-019B960494DF}">
-                <a14:hiddenLine xmlns:a14="http://schemas.microsoft.com/office/drawing/2010/main" xmlns:dgm="http://schemas.openxmlformats.org/drawingml/2006/diagram" xmlns:p14="http://schemas.microsoft.com/office/powerpoint/2010/main" xmlns:a16="http://schemas.microsoft.com/office/drawing/2014/main" xmlns="" w="9525">
+                <a14:hiddenLine xmlns="" xmlns:a16="http://schemas.microsoft.com/office/drawing/2014/main" xmlns:p14="http://schemas.microsoft.com/office/powerpoint/2010/main" xmlns:dgm="http://schemas.openxmlformats.org/drawingml/2006/diagram" xmlns:a14="http://schemas.microsoft.com/office/drawing/2010/main" w="9525">
                   <a:solidFill>
                     <a:srgbClr val="000000"/>
                   </a:solidFill>
@@ -21246,7 +21266,7 @@
                   <a16:creationId xmlns:a16="http://schemas.microsoft.com/office/drawing/2014/main" id="{DF1C0739-3D08-4C83-857E-B0724A6E8C74}"/>
                 </a:ext>
                 <a:ext uri="{C183D7F6-B498-43B3-948B-1728B52AA6E4}">
-                  <adec:decorative xmlns:adec="http://schemas.microsoft.com/office/drawing/2017/decorative" val="1"/>
+                  <adec:decorative xmlns:adec="http://schemas.microsoft.com/office/drawing/2017/decorative" xmlns="" val="1"/>
                 </a:ext>
               </a:extLst>
             </p:cNvPr>
@@ -21303,7 +21323,7 @@
             </a:ln>
             <a:extLst>
               <a:ext uri="{91240B29-F687-4f45-9708-019B960494DF}">
-                <a14:hiddenLine xmlns:a14="http://schemas.microsoft.com/office/drawing/2010/main" xmlns:dgm="http://schemas.openxmlformats.org/drawingml/2006/diagram" xmlns:p14="http://schemas.microsoft.com/office/powerpoint/2010/main" xmlns:a16="http://schemas.microsoft.com/office/drawing/2014/main" xmlns="" w="9525">
+                <a14:hiddenLine xmlns="" xmlns:a16="http://schemas.microsoft.com/office/drawing/2014/main" xmlns:p14="http://schemas.microsoft.com/office/powerpoint/2010/main" xmlns:dgm="http://schemas.openxmlformats.org/drawingml/2006/diagram" xmlns:a14="http://schemas.microsoft.com/office/drawing/2010/main" w="9525">
                   <a:solidFill>
                     <a:srgbClr val="000000"/>
                   </a:solidFill>
@@ -21323,7 +21343,7 @@
                   <a16:creationId xmlns:a16="http://schemas.microsoft.com/office/drawing/2014/main" id="{D235EAA0-7D5A-453A-9643-EE7A4954EA92}"/>
                 </a:ext>
                 <a:ext uri="{C183D7F6-B498-43B3-948B-1728B52AA6E4}">
-                  <adec:decorative xmlns:adec="http://schemas.microsoft.com/office/drawing/2017/decorative" val="1"/>
+                  <adec:decorative xmlns:adec="http://schemas.microsoft.com/office/drawing/2017/decorative" xmlns="" val="1"/>
                 </a:ext>
               </a:extLst>
             </p:cNvPr>
@@ -21380,7 +21400,7 @@
             </a:ln>
             <a:extLst>
               <a:ext uri="{91240B29-F687-4f45-9708-019B960494DF}">
-                <a14:hiddenLine xmlns:a14="http://schemas.microsoft.com/office/drawing/2010/main" xmlns:dgm="http://schemas.openxmlformats.org/drawingml/2006/diagram" xmlns:p14="http://schemas.microsoft.com/office/powerpoint/2010/main" xmlns:a16="http://schemas.microsoft.com/office/drawing/2014/main" xmlns="" w="9525">
+                <a14:hiddenLine xmlns="" xmlns:a16="http://schemas.microsoft.com/office/drawing/2014/main" xmlns:p14="http://schemas.microsoft.com/office/powerpoint/2010/main" xmlns:dgm="http://schemas.openxmlformats.org/drawingml/2006/diagram" xmlns:a14="http://schemas.microsoft.com/office/drawing/2010/main" w="9525">
                   <a:solidFill>
                     <a:srgbClr val="000000"/>
                   </a:solidFill>
@@ -21400,7 +21420,7 @@
                   <a16:creationId xmlns:a16="http://schemas.microsoft.com/office/drawing/2014/main" id="{94C6FB7C-72DE-42DE-8F58-CCE9B8F5562A}"/>
                 </a:ext>
                 <a:ext uri="{C183D7F6-B498-43B3-948B-1728B52AA6E4}">
-                  <adec:decorative xmlns:adec="http://schemas.microsoft.com/office/drawing/2017/decorative" val="1"/>
+                  <adec:decorative xmlns:adec="http://schemas.microsoft.com/office/drawing/2017/decorative" xmlns="" val="1"/>
                 </a:ext>
               </a:extLst>
             </p:cNvPr>
@@ -21485,7 +21505,7 @@
             </a:ln>
             <a:extLst>
               <a:ext uri="{91240B29-F687-4f45-9708-019B960494DF}">
-                <a14:hiddenLine xmlns:a14="http://schemas.microsoft.com/office/drawing/2010/main" xmlns:dgm="http://schemas.openxmlformats.org/drawingml/2006/diagram" xmlns:p14="http://schemas.microsoft.com/office/powerpoint/2010/main" xmlns:a16="http://schemas.microsoft.com/office/drawing/2014/main" xmlns="" w="9525">
+                <a14:hiddenLine xmlns="" xmlns:a16="http://schemas.microsoft.com/office/drawing/2014/main" xmlns:p14="http://schemas.microsoft.com/office/powerpoint/2010/main" xmlns:dgm="http://schemas.openxmlformats.org/drawingml/2006/diagram" xmlns:a14="http://schemas.microsoft.com/office/drawing/2010/main" w="9525">
                   <a:solidFill>
                     <a:srgbClr val="000000"/>
                   </a:solidFill>
@@ -21505,7 +21525,7 @@
                   <a16:creationId xmlns:a16="http://schemas.microsoft.com/office/drawing/2014/main" id="{FE31E0FE-EC8D-4EA7-BD9D-02F8C54FDB35}"/>
                 </a:ext>
                 <a:ext uri="{C183D7F6-B498-43B3-948B-1728B52AA6E4}">
-                  <adec:decorative xmlns:adec="http://schemas.microsoft.com/office/drawing/2017/decorative" val="1"/>
+                  <adec:decorative xmlns:adec="http://schemas.microsoft.com/office/drawing/2017/decorative" xmlns="" val="1"/>
                 </a:ext>
               </a:extLst>
             </p:cNvPr>
@@ -21590,7 +21610,7 @@
             </a:ln>
             <a:extLst>
               <a:ext uri="{91240B29-F687-4f45-9708-019B960494DF}">
-                <a14:hiddenLine xmlns:a14="http://schemas.microsoft.com/office/drawing/2010/main" xmlns:dgm="http://schemas.openxmlformats.org/drawingml/2006/diagram" xmlns:p14="http://schemas.microsoft.com/office/powerpoint/2010/main" xmlns:a16="http://schemas.microsoft.com/office/drawing/2014/main" xmlns="" w="9525">
+                <a14:hiddenLine xmlns="" xmlns:a16="http://schemas.microsoft.com/office/drawing/2014/main" xmlns:p14="http://schemas.microsoft.com/office/powerpoint/2010/main" xmlns:dgm="http://schemas.openxmlformats.org/drawingml/2006/diagram" xmlns:a14="http://schemas.microsoft.com/office/drawing/2010/main" w="9525">
                   <a:solidFill>
                     <a:srgbClr val="000000"/>
                   </a:solidFill>
@@ -21610,7 +21630,7 @@
                   <a16:creationId xmlns:a16="http://schemas.microsoft.com/office/drawing/2014/main" id="{69FE4B12-13E0-48F9-9E18-66406B8D3CDE}"/>
                 </a:ext>
                 <a:ext uri="{C183D7F6-B498-43B3-948B-1728B52AA6E4}">
-                  <adec:decorative xmlns:adec="http://schemas.microsoft.com/office/drawing/2017/decorative" val="1"/>
+                  <adec:decorative xmlns:adec="http://schemas.microsoft.com/office/drawing/2017/decorative" xmlns="" val="1"/>
                 </a:ext>
               </a:extLst>
             </p:cNvPr>
@@ -21667,7 +21687,7 @@
             </a:ln>
             <a:extLst>
               <a:ext uri="{91240B29-F687-4f45-9708-019B960494DF}">
-                <a14:hiddenLine xmlns:a14="http://schemas.microsoft.com/office/drawing/2010/main" xmlns:dgm="http://schemas.openxmlformats.org/drawingml/2006/diagram" xmlns:p14="http://schemas.microsoft.com/office/powerpoint/2010/main" xmlns:a16="http://schemas.microsoft.com/office/drawing/2014/main" xmlns="" w="9525">
+                <a14:hiddenLine xmlns="" xmlns:a16="http://schemas.microsoft.com/office/drawing/2014/main" xmlns:p14="http://schemas.microsoft.com/office/powerpoint/2010/main" xmlns:dgm="http://schemas.openxmlformats.org/drawingml/2006/diagram" xmlns:a14="http://schemas.microsoft.com/office/drawing/2010/main" w="9525">
                   <a:solidFill>
                     <a:srgbClr val="000000"/>
                   </a:solidFill>
@@ -21687,7 +21707,7 @@
                   <a16:creationId xmlns:a16="http://schemas.microsoft.com/office/drawing/2014/main" id="{87FAADC3-B321-43EE-B8F3-2842D84098DB}"/>
                 </a:ext>
                 <a:ext uri="{C183D7F6-B498-43B3-948B-1728B52AA6E4}">
-                  <adec:decorative xmlns:adec="http://schemas.microsoft.com/office/drawing/2017/decorative" val="1"/>
+                  <adec:decorative xmlns:adec="http://schemas.microsoft.com/office/drawing/2017/decorative" xmlns="" val="1"/>
                 </a:ext>
               </a:extLst>
             </p:cNvPr>
@@ -21792,7 +21812,7 @@
             </a:ln>
             <a:extLst>
               <a:ext uri="{91240B29-F687-4f45-9708-019B960494DF}">
-                <a14:hiddenLine xmlns:a14="http://schemas.microsoft.com/office/drawing/2010/main" xmlns:dgm="http://schemas.openxmlformats.org/drawingml/2006/diagram" xmlns:p14="http://schemas.microsoft.com/office/powerpoint/2010/main" xmlns:a16="http://schemas.microsoft.com/office/drawing/2014/main" xmlns="" w="9525">
+                <a14:hiddenLine xmlns="" xmlns:a16="http://schemas.microsoft.com/office/drawing/2014/main" xmlns:p14="http://schemas.microsoft.com/office/powerpoint/2010/main" xmlns:dgm="http://schemas.openxmlformats.org/drawingml/2006/diagram" xmlns:a14="http://schemas.microsoft.com/office/drawing/2010/main" w="9525">
                   <a:solidFill>
                     <a:srgbClr val="000000"/>
                   </a:solidFill>
@@ -21812,7 +21832,7 @@
                   <a16:creationId xmlns:a16="http://schemas.microsoft.com/office/drawing/2014/main" id="{90461464-1683-402F-A72B-8558CC67774C}"/>
                 </a:ext>
                 <a:ext uri="{C183D7F6-B498-43B3-948B-1728B52AA6E4}">
-                  <adec:decorative xmlns:adec="http://schemas.microsoft.com/office/drawing/2017/decorative" val="1"/>
+                  <adec:decorative xmlns:adec="http://schemas.microsoft.com/office/drawing/2017/decorative" xmlns="" val="1"/>
                 </a:ext>
               </a:extLst>
             </p:cNvPr>
@@ -21855,7 +21875,7 @@
                   <a16:creationId xmlns:a16="http://schemas.microsoft.com/office/drawing/2014/main" id="{70F594E7-32D0-45B9-A3CF-636CF6FCBDCD}"/>
                 </a:ext>
                 <a:ext uri="{C183D7F6-B498-43B3-948B-1728B52AA6E4}">
-                  <adec:decorative xmlns:adec="http://schemas.microsoft.com/office/drawing/2017/decorative" val="1"/>
+                  <adec:decorative xmlns:adec="http://schemas.microsoft.com/office/drawing/2017/decorative" xmlns="" val="1"/>
                 </a:ext>
               </a:extLst>
             </p:cNvPr>
@@ -21906,7 +21926,7 @@
             </a:ln>
             <a:extLst>
               <a:ext uri="{91240B29-F687-4f45-9708-019B960494DF}">
-                <a14:hiddenLine xmlns:a14="http://schemas.microsoft.com/office/drawing/2010/main" xmlns:dgm="http://schemas.openxmlformats.org/drawingml/2006/diagram" xmlns:p14="http://schemas.microsoft.com/office/powerpoint/2010/main" xmlns:a16="http://schemas.microsoft.com/office/drawing/2014/main" xmlns="" w="9525">
+                <a14:hiddenLine xmlns="" xmlns:a16="http://schemas.microsoft.com/office/drawing/2014/main" xmlns:p14="http://schemas.microsoft.com/office/powerpoint/2010/main" xmlns:dgm="http://schemas.openxmlformats.org/drawingml/2006/diagram" xmlns:a14="http://schemas.microsoft.com/office/drawing/2010/main" w="9525">
                   <a:solidFill>
                     <a:srgbClr val="000000"/>
                   </a:solidFill>
@@ -21926,7 +21946,7 @@
                   <a16:creationId xmlns:a16="http://schemas.microsoft.com/office/drawing/2014/main" id="{8AEF60E1-26C2-4E3C-B839-347DDD23C308}"/>
                 </a:ext>
                 <a:ext uri="{C183D7F6-B498-43B3-948B-1728B52AA6E4}">
-                  <adec:decorative xmlns:adec="http://schemas.microsoft.com/office/drawing/2017/decorative" val="1"/>
+                  <adec:decorative xmlns:adec="http://schemas.microsoft.com/office/drawing/2017/decorative" xmlns="" val="1"/>
                 </a:ext>
               </a:extLst>
             </p:cNvPr>
@@ -21983,7 +22003,7 @@
             </a:ln>
             <a:extLst>
               <a:ext uri="{91240B29-F687-4f45-9708-019B960494DF}">
-                <a14:hiddenLine xmlns:a14="http://schemas.microsoft.com/office/drawing/2010/main" xmlns:dgm="http://schemas.openxmlformats.org/drawingml/2006/diagram" xmlns:p14="http://schemas.microsoft.com/office/powerpoint/2010/main" xmlns:a16="http://schemas.microsoft.com/office/drawing/2014/main" xmlns="" w="9525">
+                <a14:hiddenLine xmlns="" xmlns:a16="http://schemas.microsoft.com/office/drawing/2014/main" xmlns:p14="http://schemas.microsoft.com/office/powerpoint/2010/main" xmlns:dgm="http://schemas.openxmlformats.org/drawingml/2006/diagram" xmlns:a14="http://schemas.microsoft.com/office/drawing/2010/main" w="9525">
                   <a:solidFill>
                     <a:srgbClr val="000000"/>
                   </a:solidFill>
@@ -22003,7 +22023,7 @@
                   <a16:creationId xmlns:a16="http://schemas.microsoft.com/office/drawing/2014/main" id="{792FE54B-EE9D-4E57-B6BC-6A9196BE8950}"/>
                 </a:ext>
                 <a:ext uri="{C183D7F6-B498-43B3-948B-1728B52AA6E4}">
-                  <adec:decorative xmlns:adec="http://schemas.microsoft.com/office/drawing/2017/decorative" val="1"/>
+                  <adec:decorative xmlns:adec="http://schemas.microsoft.com/office/drawing/2017/decorative" xmlns="" val="1"/>
                 </a:ext>
               </a:extLst>
             </p:cNvPr>
@@ -22060,7 +22080,7 @@
             </a:ln>
             <a:extLst>
               <a:ext uri="{91240B29-F687-4f45-9708-019B960494DF}">
-                <a14:hiddenLine xmlns:a14="http://schemas.microsoft.com/office/drawing/2010/main" xmlns:dgm="http://schemas.openxmlformats.org/drawingml/2006/diagram" xmlns:p14="http://schemas.microsoft.com/office/powerpoint/2010/main" xmlns:a16="http://schemas.microsoft.com/office/drawing/2014/main" xmlns="" w="9525">
+                <a14:hiddenLine xmlns="" xmlns:a16="http://schemas.microsoft.com/office/drawing/2014/main" xmlns:p14="http://schemas.microsoft.com/office/powerpoint/2010/main" xmlns:dgm="http://schemas.openxmlformats.org/drawingml/2006/diagram" xmlns:a14="http://schemas.microsoft.com/office/drawing/2010/main" w="9525">
                   <a:solidFill>
                     <a:srgbClr val="000000"/>
                   </a:solidFill>
@@ -22080,7 +22100,7 @@
                   <a16:creationId xmlns:a16="http://schemas.microsoft.com/office/drawing/2014/main" id="{72BE56DF-619D-463E-8F88-CABA09DA88EC}"/>
                 </a:ext>
                 <a:ext uri="{C183D7F6-B498-43B3-948B-1728B52AA6E4}">
-                  <adec:decorative xmlns:adec="http://schemas.microsoft.com/office/drawing/2017/decorative" val="1"/>
+                  <adec:decorative xmlns:adec="http://schemas.microsoft.com/office/drawing/2017/decorative" xmlns="" val="1"/>
                 </a:ext>
               </a:extLst>
             </p:cNvPr>
@@ -22165,7 +22185,7 @@
             </a:ln>
             <a:extLst>
               <a:ext uri="{91240B29-F687-4f45-9708-019B960494DF}">
-                <a14:hiddenLine xmlns:a14="http://schemas.microsoft.com/office/drawing/2010/main" xmlns:dgm="http://schemas.openxmlformats.org/drawingml/2006/diagram" xmlns:p14="http://schemas.microsoft.com/office/powerpoint/2010/main" xmlns:a16="http://schemas.microsoft.com/office/drawing/2014/main" xmlns="" w="9525">
+                <a14:hiddenLine xmlns="" xmlns:a16="http://schemas.microsoft.com/office/drawing/2014/main" xmlns:p14="http://schemas.microsoft.com/office/powerpoint/2010/main" xmlns:dgm="http://schemas.openxmlformats.org/drawingml/2006/diagram" xmlns:a14="http://schemas.microsoft.com/office/drawing/2010/main" w="9525">
                   <a:solidFill>
                     <a:srgbClr val="000000"/>
                   </a:solidFill>
@@ -22185,7 +22205,7 @@
                   <a16:creationId xmlns:a16="http://schemas.microsoft.com/office/drawing/2014/main" id="{C7430457-1935-4BBF-A6A7-7C3125A02EF9}"/>
                 </a:ext>
                 <a:ext uri="{C183D7F6-B498-43B3-948B-1728B52AA6E4}">
-                  <adec:decorative xmlns:adec="http://schemas.microsoft.com/office/drawing/2017/decorative" val="1"/>
+                  <adec:decorative xmlns:adec="http://schemas.microsoft.com/office/drawing/2017/decorative" xmlns="" val="1"/>
                 </a:ext>
               </a:extLst>
             </p:cNvPr>
@@ -22214,7 +22234,7 @@
             </a:ln>
             <a:extLst>
               <a:ext uri="{91240B29-F687-4f45-9708-019B960494DF}">
-                <a14:hiddenLine xmlns:a14="http://schemas.microsoft.com/office/drawing/2010/main" xmlns:dgm="http://schemas.openxmlformats.org/drawingml/2006/diagram" xmlns:p14="http://schemas.microsoft.com/office/powerpoint/2010/main" xmlns:a16="http://schemas.microsoft.com/office/drawing/2014/main" xmlns="" w="9525">
+                <a14:hiddenLine xmlns="" xmlns:a16="http://schemas.microsoft.com/office/drawing/2014/main" xmlns:p14="http://schemas.microsoft.com/office/powerpoint/2010/main" xmlns:dgm="http://schemas.openxmlformats.org/drawingml/2006/diagram" xmlns:a14="http://schemas.microsoft.com/office/drawing/2010/main" w="9525">
                   <a:solidFill>
                     <a:srgbClr val="000000"/>
                   </a:solidFill>
@@ -22234,7 +22254,7 @@
                   <a16:creationId xmlns:a16="http://schemas.microsoft.com/office/drawing/2014/main" id="{BB006150-E547-4E84-A2B1-59131F3D531A}"/>
                 </a:ext>
                 <a:ext uri="{C183D7F6-B498-43B3-948B-1728B52AA6E4}">
-                  <adec:decorative xmlns:adec="http://schemas.microsoft.com/office/drawing/2017/decorative" val="1"/>
+                  <adec:decorative xmlns:adec="http://schemas.microsoft.com/office/drawing/2017/decorative" xmlns="" val="1"/>
                 </a:ext>
               </a:extLst>
             </p:cNvPr>
@@ -22294,7 +22314,7 @@
             </a:ln>
             <a:extLst>
               <a:ext uri="{91240B29-F687-4f45-9708-019B960494DF}">
-                <a14:hiddenLine xmlns:a14="http://schemas.microsoft.com/office/drawing/2010/main" xmlns:dgm="http://schemas.openxmlformats.org/drawingml/2006/diagram" xmlns:p14="http://schemas.microsoft.com/office/powerpoint/2010/main" xmlns:a16="http://schemas.microsoft.com/office/drawing/2014/main" xmlns="" w="9525">
+                <a14:hiddenLine xmlns="" xmlns:a16="http://schemas.microsoft.com/office/drawing/2014/main" xmlns:p14="http://schemas.microsoft.com/office/powerpoint/2010/main" xmlns:dgm="http://schemas.openxmlformats.org/drawingml/2006/diagram" xmlns:a14="http://schemas.microsoft.com/office/drawing/2010/main" w="9525">
                   <a:solidFill>
                     <a:srgbClr val="000000"/>
                   </a:solidFill>
@@ -22314,7 +22334,7 @@
                   <a16:creationId xmlns:a16="http://schemas.microsoft.com/office/drawing/2014/main" id="{5A8CD074-956B-41A4-870B-001554B69BB5}"/>
                 </a:ext>
                 <a:ext uri="{C183D7F6-B498-43B3-948B-1728B52AA6E4}">
-                  <adec:decorative xmlns:adec="http://schemas.microsoft.com/office/drawing/2017/decorative" val="1"/>
+                  <adec:decorative xmlns:adec="http://schemas.microsoft.com/office/drawing/2017/decorative" xmlns="" val="1"/>
                 </a:ext>
               </a:extLst>
             </p:cNvPr>
@@ -22399,7 +22419,7 @@
             </a:ln>
             <a:extLst>
               <a:ext uri="{91240B29-F687-4f45-9708-019B960494DF}">
-                <a14:hiddenLine xmlns:a14="http://schemas.microsoft.com/office/drawing/2010/main" xmlns:dgm="http://schemas.openxmlformats.org/drawingml/2006/diagram" xmlns:p14="http://schemas.microsoft.com/office/powerpoint/2010/main" xmlns:a16="http://schemas.microsoft.com/office/drawing/2014/main" xmlns="" w="9525">
+                <a14:hiddenLine xmlns="" xmlns:a16="http://schemas.microsoft.com/office/drawing/2014/main" xmlns:p14="http://schemas.microsoft.com/office/powerpoint/2010/main" xmlns:dgm="http://schemas.openxmlformats.org/drawingml/2006/diagram" xmlns:a14="http://schemas.microsoft.com/office/drawing/2010/main" w="9525">
                   <a:solidFill>
                     <a:srgbClr val="000000"/>
                   </a:solidFill>
@@ -22419,7 +22439,7 @@
                   <a16:creationId xmlns:a16="http://schemas.microsoft.com/office/drawing/2014/main" id="{070C253B-974E-459F-AD0B-70572248284D}"/>
                 </a:ext>
                 <a:ext uri="{C183D7F6-B498-43B3-948B-1728B52AA6E4}">
-                  <adec:decorative xmlns:adec="http://schemas.microsoft.com/office/drawing/2017/decorative" val="1"/>
+                  <adec:decorative xmlns:adec="http://schemas.microsoft.com/office/drawing/2017/decorative" xmlns="" val="1"/>
                 </a:ext>
               </a:extLst>
             </p:cNvPr>
@@ -22476,7 +22496,7 @@
             </a:ln>
             <a:extLst>
               <a:ext uri="{91240B29-F687-4f45-9708-019B960494DF}">
-                <a14:hiddenLine xmlns:a14="http://schemas.microsoft.com/office/drawing/2010/main" xmlns:dgm="http://schemas.openxmlformats.org/drawingml/2006/diagram" xmlns:p14="http://schemas.microsoft.com/office/powerpoint/2010/main" xmlns:a16="http://schemas.microsoft.com/office/drawing/2014/main" xmlns="" w="9525">
+                <a14:hiddenLine xmlns="" xmlns:a16="http://schemas.microsoft.com/office/drawing/2014/main" xmlns:p14="http://schemas.microsoft.com/office/powerpoint/2010/main" xmlns:dgm="http://schemas.openxmlformats.org/drawingml/2006/diagram" xmlns:a14="http://schemas.microsoft.com/office/drawing/2010/main" w="9525">
                   <a:solidFill>
                     <a:srgbClr val="000000"/>
                   </a:solidFill>
@@ -22496,7 +22516,7 @@
                   <a16:creationId xmlns:a16="http://schemas.microsoft.com/office/drawing/2014/main" id="{BBC07B3D-A631-44EA-861A-7D80383A102C}"/>
                 </a:ext>
                 <a:ext uri="{C183D7F6-B498-43B3-948B-1728B52AA6E4}">
-                  <adec:decorative xmlns:adec="http://schemas.microsoft.com/office/drawing/2017/decorative" val="1"/>
+                  <adec:decorative xmlns:adec="http://schemas.microsoft.com/office/drawing/2017/decorative" xmlns="" val="1"/>
                 </a:ext>
               </a:extLst>
             </p:cNvPr>
@@ -22581,7 +22601,7 @@
             </a:ln>
             <a:extLst>
               <a:ext uri="{91240B29-F687-4f45-9708-019B960494DF}">
-                <a14:hiddenLine xmlns:a14="http://schemas.microsoft.com/office/drawing/2010/main" xmlns:dgm="http://schemas.openxmlformats.org/drawingml/2006/diagram" xmlns:p14="http://schemas.microsoft.com/office/powerpoint/2010/main" xmlns:a16="http://schemas.microsoft.com/office/drawing/2014/main" xmlns="" w="9525">
+                <a14:hiddenLine xmlns="" xmlns:a16="http://schemas.microsoft.com/office/drawing/2014/main" xmlns:p14="http://schemas.microsoft.com/office/powerpoint/2010/main" xmlns:dgm="http://schemas.openxmlformats.org/drawingml/2006/diagram" xmlns:a14="http://schemas.microsoft.com/office/drawing/2010/main" w="9525">
                   <a:solidFill>
                     <a:srgbClr val="000000"/>
                   </a:solidFill>
@@ -22601,7 +22621,7 @@
                   <a16:creationId xmlns:a16="http://schemas.microsoft.com/office/drawing/2014/main" id="{32039DC6-B4CF-4A5A-8D17-3A568D125C96}"/>
                 </a:ext>
                 <a:ext uri="{C183D7F6-B498-43B3-948B-1728B52AA6E4}">
-                  <adec:decorative xmlns:adec="http://schemas.microsoft.com/office/drawing/2017/decorative" val="1"/>
+                  <adec:decorative xmlns:adec="http://schemas.microsoft.com/office/drawing/2017/decorative" xmlns="" val="1"/>
                 </a:ext>
               </a:extLst>
             </p:cNvPr>
@@ -22661,7 +22681,7 @@
             </a:ln>
             <a:extLst>
               <a:ext uri="{91240B29-F687-4f45-9708-019B960494DF}">
-                <a14:hiddenLine xmlns:a14="http://schemas.microsoft.com/office/drawing/2010/main" xmlns:dgm="http://schemas.openxmlformats.org/drawingml/2006/diagram" xmlns:p14="http://schemas.microsoft.com/office/powerpoint/2010/main" xmlns:a16="http://schemas.microsoft.com/office/drawing/2014/main" xmlns="" w="9525">
+                <a14:hiddenLine xmlns="" xmlns:a16="http://schemas.microsoft.com/office/drawing/2014/main" xmlns:p14="http://schemas.microsoft.com/office/powerpoint/2010/main" xmlns:dgm="http://schemas.openxmlformats.org/drawingml/2006/diagram" xmlns:a14="http://schemas.microsoft.com/office/drawing/2010/main" w="9525">
                   <a:solidFill>
                     <a:srgbClr val="000000"/>
                   </a:solidFill>
@@ -22681,7 +22701,7 @@
                   <a16:creationId xmlns:a16="http://schemas.microsoft.com/office/drawing/2014/main" id="{99E0C81F-5D8D-4AF8-BDE5-4DF75868F745}"/>
                 </a:ext>
                 <a:ext uri="{C183D7F6-B498-43B3-948B-1728B52AA6E4}">
-                  <adec:decorative xmlns:adec="http://schemas.microsoft.com/office/drawing/2017/decorative" val="1"/>
+                  <adec:decorative xmlns:adec="http://schemas.microsoft.com/office/drawing/2017/decorative" xmlns="" val="1"/>
                 </a:ext>
               </a:extLst>
             </p:cNvPr>
@@ -22738,7 +22758,7 @@
             </a:ln>
             <a:extLst>
               <a:ext uri="{91240B29-F687-4f45-9708-019B960494DF}">
-                <a14:hiddenLine xmlns:a14="http://schemas.microsoft.com/office/drawing/2010/main" xmlns:dgm="http://schemas.openxmlformats.org/drawingml/2006/diagram" xmlns:p14="http://schemas.microsoft.com/office/powerpoint/2010/main" xmlns:a16="http://schemas.microsoft.com/office/drawing/2014/main" xmlns="" w="9525">
+                <a14:hiddenLine xmlns="" xmlns:a16="http://schemas.microsoft.com/office/drawing/2014/main" xmlns:p14="http://schemas.microsoft.com/office/powerpoint/2010/main" xmlns:dgm="http://schemas.openxmlformats.org/drawingml/2006/diagram" xmlns:a14="http://schemas.microsoft.com/office/drawing/2010/main" w="9525">
                   <a:solidFill>
                     <a:srgbClr val="000000"/>
                   </a:solidFill>
@@ -22758,7 +22778,7 @@
                   <a16:creationId xmlns:a16="http://schemas.microsoft.com/office/drawing/2014/main" id="{0D946680-855C-41EC-BBA2-61F6F776E545}"/>
                 </a:ext>
                 <a:ext uri="{C183D7F6-B498-43B3-948B-1728B52AA6E4}">
-                  <adec:decorative xmlns:adec="http://schemas.microsoft.com/office/drawing/2017/decorative" val="1"/>
+                  <adec:decorative xmlns:adec="http://schemas.microsoft.com/office/drawing/2017/decorative" xmlns="" val="1"/>
                 </a:ext>
               </a:extLst>
             </p:cNvPr>
@@ -22843,7 +22863,7 @@
             </a:ln>
             <a:extLst>
               <a:ext uri="{91240B29-F687-4f45-9708-019B960494DF}">
-                <a14:hiddenLine xmlns:a14="http://schemas.microsoft.com/office/drawing/2010/main" xmlns:dgm="http://schemas.openxmlformats.org/drawingml/2006/diagram" xmlns:p14="http://schemas.microsoft.com/office/powerpoint/2010/main" xmlns:a16="http://schemas.microsoft.com/office/drawing/2014/main" xmlns="" w="9525">
+                <a14:hiddenLine xmlns="" xmlns:a16="http://schemas.microsoft.com/office/drawing/2014/main" xmlns:p14="http://schemas.microsoft.com/office/powerpoint/2010/main" xmlns:dgm="http://schemas.openxmlformats.org/drawingml/2006/diagram" xmlns:a14="http://schemas.microsoft.com/office/drawing/2010/main" w="9525">
                   <a:solidFill>
                     <a:srgbClr val="000000"/>
                   </a:solidFill>
@@ -22863,7 +22883,7 @@
                   <a16:creationId xmlns:a16="http://schemas.microsoft.com/office/drawing/2014/main" id="{E6FAD9E8-6E13-45A0-A5D6-8BCAD27B4081}"/>
                 </a:ext>
                 <a:ext uri="{C183D7F6-B498-43B3-948B-1728B52AA6E4}">
-                  <adec:decorative xmlns:adec="http://schemas.microsoft.com/office/drawing/2017/decorative" val="1"/>
+                  <adec:decorative xmlns:adec="http://schemas.microsoft.com/office/drawing/2017/decorative" xmlns="" val="1"/>
                 </a:ext>
               </a:extLst>
             </p:cNvPr>
@@ -22948,7 +22968,7 @@
             </a:ln>
             <a:extLst>
               <a:ext uri="{91240B29-F687-4f45-9708-019B960494DF}">
-                <a14:hiddenLine xmlns:a14="http://schemas.microsoft.com/office/drawing/2010/main" xmlns:dgm="http://schemas.openxmlformats.org/drawingml/2006/diagram" xmlns:p14="http://schemas.microsoft.com/office/powerpoint/2010/main" xmlns:a16="http://schemas.microsoft.com/office/drawing/2014/main" xmlns="" w="9525">
+                <a14:hiddenLine xmlns="" xmlns:a16="http://schemas.microsoft.com/office/drawing/2014/main" xmlns:p14="http://schemas.microsoft.com/office/powerpoint/2010/main" xmlns:dgm="http://schemas.openxmlformats.org/drawingml/2006/diagram" xmlns:a14="http://schemas.microsoft.com/office/drawing/2010/main" w="9525">
                   <a:solidFill>
                     <a:srgbClr val="000000"/>
                   </a:solidFill>
@@ -22968,7 +22988,7 @@
                   <a16:creationId xmlns:a16="http://schemas.microsoft.com/office/drawing/2014/main" id="{0CCBC8FA-0581-454F-9FD1-6B6102A1AA9F}"/>
                 </a:ext>
                 <a:ext uri="{C183D7F6-B498-43B3-948B-1728B52AA6E4}">
-                  <adec:decorative xmlns:adec="http://schemas.microsoft.com/office/drawing/2017/decorative" val="1"/>
+                  <adec:decorative xmlns:adec="http://schemas.microsoft.com/office/drawing/2017/decorative" xmlns="" val="1"/>
                 </a:ext>
               </a:extLst>
             </p:cNvPr>
@@ -23028,7 +23048,7 @@
             </a:ln>
             <a:extLst>
               <a:ext uri="{91240B29-F687-4f45-9708-019B960494DF}">
-                <a14:hiddenLine xmlns:a14="http://schemas.microsoft.com/office/drawing/2010/main" xmlns:dgm="http://schemas.openxmlformats.org/drawingml/2006/diagram" xmlns:p14="http://schemas.microsoft.com/office/powerpoint/2010/main" xmlns:a16="http://schemas.microsoft.com/office/drawing/2014/main" xmlns="" w="9525">
+                <a14:hiddenLine xmlns="" xmlns:a16="http://schemas.microsoft.com/office/drawing/2014/main" xmlns:p14="http://schemas.microsoft.com/office/powerpoint/2010/main" xmlns:dgm="http://schemas.openxmlformats.org/drawingml/2006/diagram" xmlns:a14="http://schemas.microsoft.com/office/drawing/2010/main" w="9525">
                   <a:solidFill>
                     <a:srgbClr val="000000"/>
                   </a:solidFill>
@@ -23048,7 +23068,7 @@
                   <a16:creationId xmlns:a16="http://schemas.microsoft.com/office/drawing/2014/main" id="{5D6C328F-65A5-41E8-86E9-E4E638CC3B4D}"/>
                 </a:ext>
                 <a:ext uri="{C183D7F6-B498-43B3-948B-1728B52AA6E4}">
-                  <adec:decorative xmlns:adec="http://schemas.microsoft.com/office/drawing/2017/decorative" val="1"/>
+                  <adec:decorative xmlns:adec="http://schemas.microsoft.com/office/drawing/2017/decorative" xmlns="" val="1"/>
                 </a:ext>
               </a:extLst>
             </p:cNvPr>
@@ -23163,7 +23183,7 @@
             </a:ln>
             <a:extLst>
               <a:ext uri="{91240B29-F687-4f45-9708-019B960494DF}">
-                <a14:hiddenLine xmlns:a14="http://schemas.microsoft.com/office/drawing/2010/main" xmlns:dgm="http://schemas.openxmlformats.org/drawingml/2006/diagram" xmlns:p14="http://schemas.microsoft.com/office/powerpoint/2010/main" xmlns:a16="http://schemas.microsoft.com/office/drawing/2014/main" xmlns="" w="9525">
+                <a14:hiddenLine xmlns="" xmlns:a16="http://schemas.microsoft.com/office/drawing/2014/main" xmlns:p14="http://schemas.microsoft.com/office/powerpoint/2010/main" xmlns:dgm="http://schemas.openxmlformats.org/drawingml/2006/diagram" xmlns:a14="http://schemas.microsoft.com/office/drawing/2010/main" w="9525">
                   <a:solidFill>
                     <a:srgbClr val="000000"/>
                   </a:solidFill>
@@ -23184,7 +23204,7 @@
                 <a16:creationId xmlns:a16="http://schemas.microsoft.com/office/drawing/2014/main" id="{3E94A106-9341-485C-9057-9D62B2BD083F}"/>
               </a:ext>
               <a:ext uri="{C183D7F6-B498-43B3-948B-1728B52AA6E4}">
-                <adec:decorative xmlns:adec="http://schemas.microsoft.com/office/drawing/2017/decorative" val="1"/>
+                <adec:decorative xmlns:adec="http://schemas.microsoft.com/office/drawing/2017/decorative" xmlns="" val="1"/>
               </a:ext>
             </a:extLst>
           </p:cNvPr>
@@ -23222,7 +23242,7 @@
           </a:prstGeom>
           <a:extLst>
             <a:ext uri="{909E8E84-426E-40dd-AFC4-6F175D3DCCD1}">
-              <a14:hiddenFill xmlns:a14="http://schemas.microsoft.com/office/drawing/2010/main" xmlns:dgm="http://schemas.openxmlformats.org/drawingml/2006/diagram" xmlns:p14="http://schemas.microsoft.com/office/powerpoint/2010/main" xmlns:a16="http://schemas.microsoft.com/office/drawing/2014/main" xmlns="">
+              <a14:hiddenFill xmlns="" xmlns:a16="http://schemas.microsoft.com/office/drawing/2014/main" xmlns:p14="http://schemas.microsoft.com/office/powerpoint/2010/main" xmlns:dgm="http://schemas.openxmlformats.org/drawingml/2006/diagram" xmlns:a14="http://schemas.microsoft.com/office/drawing/2010/main">
                 <a:solidFill>
                   <a:srgbClr val="FFFFFF"/>
                 </a:solidFill>
@@ -23239,7 +23259,7 @@
                 <a16:creationId xmlns:a16="http://schemas.microsoft.com/office/drawing/2014/main" id="{B53044DC-4918-43DA-B49D-91673C6C9485}"/>
               </a:ext>
               <a:ext uri="{C183D7F6-B498-43B3-948B-1728B52AA6E4}">
-                <adec:decorative xmlns:adec="http://schemas.microsoft.com/office/drawing/2017/decorative" val="1"/>
+                <adec:decorative xmlns:adec="http://schemas.microsoft.com/office/drawing/2017/decorative" xmlns="" val="1"/>
               </a:ext>
             </a:extLst>
           </p:cNvPr>
@@ -23306,7 +23326,7 @@
                 <a16:creationId xmlns:a16="http://schemas.microsoft.com/office/drawing/2014/main" id="{1DCE6B36-1420-43AB-86CF-4E653A517B9C}"/>
               </a:ext>
               <a:ext uri="{C183D7F6-B498-43B3-948B-1728B52AA6E4}">
-                <adec:decorative xmlns:adec="http://schemas.microsoft.com/office/drawing/2017/decorative" val="1"/>
+                <adec:decorative xmlns:adec="http://schemas.microsoft.com/office/drawing/2017/decorative" xmlns="" val="1"/>
               </a:ext>
             </a:extLst>
           </p:cNvPr>
@@ -23352,7 +23372,7 @@
                   <a16:creationId xmlns:a16="http://schemas.microsoft.com/office/drawing/2014/main" id="{72626E0B-9628-468E-A713-011C02F602BB}"/>
                 </a:ext>
                 <a:ext uri="{C183D7F6-B498-43B3-948B-1728B52AA6E4}">
-                  <adec:decorative xmlns:adec="http://schemas.microsoft.com/office/drawing/2017/decorative" val="1"/>
+                  <adec:decorative xmlns:adec="http://schemas.microsoft.com/office/drawing/2017/decorative" xmlns="" val="1"/>
                 </a:ext>
               </a:extLst>
             </p:cNvPr>
@@ -23381,7 +23401,7 @@
             </a:ln>
             <a:extLst>
               <a:ext uri="{91240B29-F687-4f45-9708-019B960494DF}">
-                <a14:hiddenLine xmlns:a14="http://schemas.microsoft.com/office/drawing/2010/main" xmlns:dgm="http://schemas.openxmlformats.org/drawingml/2006/diagram" xmlns:p14="http://schemas.microsoft.com/office/powerpoint/2010/main" xmlns:a16="http://schemas.microsoft.com/office/drawing/2014/main" xmlns="" w="9525">
+                <a14:hiddenLine xmlns="" xmlns:a16="http://schemas.microsoft.com/office/drawing/2014/main" xmlns:p14="http://schemas.microsoft.com/office/powerpoint/2010/main" xmlns:dgm="http://schemas.openxmlformats.org/drawingml/2006/diagram" xmlns:a14="http://schemas.microsoft.com/office/drawing/2010/main" w="9525">
                   <a:solidFill>
                     <a:srgbClr val="000000"/>
                   </a:solidFill>
@@ -23401,7 +23421,7 @@
                   <a16:creationId xmlns:a16="http://schemas.microsoft.com/office/drawing/2014/main" id="{93F7977A-BD91-4B0D-9A8D-372DB67AD8DC}"/>
                 </a:ext>
                 <a:ext uri="{C183D7F6-B498-43B3-948B-1728B52AA6E4}">
-                  <adec:decorative xmlns:adec="http://schemas.microsoft.com/office/drawing/2017/decorative" val="1"/>
+                  <adec:decorative xmlns:adec="http://schemas.microsoft.com/office/drawing/2017/decorative" xmlns="" val="1"/>
                 </a:ext>
               </a:extLst>
             </p:cNvPr>
@@ -23486,7 +23506,7 @@
             </a:ln>
             <a:extLst>
               <a:ext uri="{91240B29-F687-4f45-9708-019B960494DF}">
-                <a14:hiddenLine xmlns:a14="http://schemas.microsoft.com/office/drawing/2010/main" xmlns:dgm="http://schemas.openxmlformats.org/drawingml/2006/diagram" xmlns:p14="http://schemas.microsoft.com/office/powerpoint/2010/main" xmlns:a16="http://schemas.microsoft.com/office/drawing/2014/main" xmlns="" w="9525">
+                <a14:hiddenLine xmlns="" xmlns:a16="http://schemas.microsoft.com/office/drawing/2014/main" xmlns:p14="http://schemas.microsoft.com/office/powerpoint/2010/main" xmlns:dgm="http://schemas.openxmlformats.org/drawingml/2006/diagram" xmlns:a14="http://schemas.microsoft.com/office/drawing/2010/main" w="9525">
                   <a:solidFill>
                     <a:srgbClr val="000000"/>
                   </a:solidFill>
@@ -23506,7 +23526,7 @@
                   <a16:creationId xmlns:a16="http://schemas.microsoft.com/office/drawing/2014/main" id="{9FEE6A56-01A1-404D-864E-1C2587C9AFBD}"/>
                 </a:ext>
                 <a:ext uri="{C183D7F6-B498-43B3-948B-1728B52AA6E4}">
-                  <adec:decorative xmlns:adec="http://schemas.microsoft.com/office/drawing/2017/decorative" val="1"/>
+                  <adec:decorative xmlns:adec="http://schemas.microsoft.com/office/drawing/2017/decorative" xmlns="" val="1"/>
                 </a:ext>
               </a:extLst>
             </p:cNvPr>
@@ -23591,7 +23611,7 @@
             </a:ln>
             <a:extLst>
               <a:ext uri="{91240B29-F687-4f45-9708-019B960494DF}">
-                <a14:hiddenLine xmlns:a14="http://schemas.microsoft.com/office/drawing/2010/main" xmlns:dgm="http://schemas.openxmlformats.org/drawingml/2006/diagram" xmlns:p14="http://schemas.microsoft.com/office/powerpoint/2010/main" xmlns:a16="http://schemas.microsoft.com/office/drawing/2014/main" xmlns="" w="9525">
+                <a14:hiddenLine xmlns="" xmlns:a16="http://schemas.microsoft.com/office/drawing/2014/main" xmlns:p14="http://schemas.microsoft.com/office/powerpoint/2010/main" xmlns:dgm="http://schemas.openxmlformats.org/drawingml/2006/diagram" xmlns:a14="http://schemas.microsoft.com/office/drawing/2010/main" w="9525">
                   <a:solidFill>
                     <a:srgbClr val="000000"/>
                   </a:solidFill>
@@ -23611,7 +23631,7 @@
                   <a16:creationId xmlns:a16="http://schemas.microsoft.com/office/drawing/2014/main" id="{E74DBBF2-EF6F-4E3E-B183-F8EEE7609460}"/>
                 </a:ext>
                 <a:ext uri="{C183D7F6-B498-43B3-948B-1728B52AA6E4}">
-                  <adec:decorative xmlns:adec="http://schemas.microsoft.com/office/drawing/2017/decorative" val="1"/>
+                  <adec:decorative xmlns:adec="http://schemas.microsoft.com/office/drawing/2017/decorative" xmlns="" val="1"/>
                 </a:ext>
               </a:extLst>
             </p:cNvPr>
@@ -23668,7 +23688,7 @@
             </a:ln>
             <a:extLst>
               <a:ext uri="{91240B29-F687-4f45-9708-019B960494DF}">
-                <a14:hiddenLine xmlns:a14="http://schemas.microsoft.com/office/drawing/2010/main" xmlns:dgm="http://schemas.openxmlformats.org/drawingml/2006/diagram" xmlns:p14="http://schemas.microsoft.com/office/powerpoint/2010/main" xmlns:a16="http://schemas.microsoft.com/office/drawing/2014/main" xmlns="" w="9525">
+                <a14:hiddenLine xmlns="" xmlns:a16="http://schemas.microsoft.com/office/drawing/2014/main" xmlns:p14="http://schemas.microsoft.com/office/powerpoint/2010/main" xmlns:dgm="http://schemas.openxmlformats.org/drawingml/2006/diagram" xmlns:a14="http://schemas.microsoft.com/office/drawing/2010/main" w="9525">
                   <a:solidFill>
                     <a:srgbClr val="000000"/>
                   </a:solidFill>
@@ -23688,7 +23708,7 @@
                   <a16:creationId xmlns:a16="http://schemas.microsoft.com/office/drawing/2014/main" id="{ABCF0F27-B056-474C-A0FB-1DB747A92FB2}"/>
                 </a:ext>
                 <a:ext uri="{C183D7F6-B498-43B3-948B-1728B52AA6E4}">
-                  <adec:decorative xmlns:adec="http://schemas.microsoft.com/office/drawing/2017/decorative" val="1"/>
+                  <adec:decorative xmlns:adec="http://schemas.microsoft.com/office/drawing/2017/decorative" xmlns="" val="1"/>
                 </a:ext>
               </a:extLst>
             </p:cNvPr>
@@ -23773,7 +23793,7 @@
             </a:ln>
             <a:extLst>
               <a:ext uri="{91240B29-F687-4f45-9708-019B960494DF}">
-                <a14:hiddenLine xmlns:a14="http://schemas.microsoft.com/office/drawing/2010/main" xmlns:dgm="http://schemas.openxmlformats.org/drawingml/2006/diagram" xmlns:p14="http://schemas.microsoft.com/office/powerpoint/2010/main" xmlns:a16="http://schemas.microsoft.com/office/drawing/2014/main" xmlns="" w="9525">
+                <a14:hiddenLine xmlns="" xmlns:a16="http://schemas.microsoft.com/office/drawing/2014/main" xmlns:p14="http://schemas.microsoft.com/office/powerpoint/2010/main" xmlns:dgm="http://schemas.openxmlformats.org/drawingml/2006/diagram" xmlns:a14="http://schemas.microsoft.com/office/drawing/2010/main" w="9525">
                   <a:solidFill>
                     <a:srgbClr val="000000"/>
                   </a:solidFill>
@@ -23793,7 +23813,7 @@
                   <a16:creationId xmlns:a16="http://schemas.microsoft.com/office/drawing/2014/main" id="{0A0A5B7B-BA2A-45CC-AABE-9D5B08A5DB61}"/>
                 </a:ext>
                 <a:ext uri="{C183D7F6-B498-43B3-948B-1728B52AA6E4}">
-                  <adec:decorative xmlns:adec="http://schemas.microsoft.com/office/drawing/2017/decorative" val="1"/>
+                  <adec:decorative xmlns:adec="http://schemas.microsoft.com/office/drawing/2017/decorative" xmlns="" val="1"/>
                 </a:ext>
               </a:extLst>
             </p:cNvPr>
@@ -23850,7 +23870,7 @@
             </a:ln>
             <a:extLst>
               <a:ext uri="{91240B29-F687-4f45-9708-019B960494DF}">
-                <a14:hiddenLine xmlns:a14="http://schemas.microsoft.com/office/drawing/2010/main" xmlns:dgm="http://schemas.openxmlformats.org/drawingml/2006/diagram" xmlns:p14="http://schemas.microsoft.com/office/powerpoint/2010/main" xmlns:a16="http://schemas.microsoft.com/office/drawing/2014/main" xmlns="" w="9525">
+                <a14:hiddenLine xmlns="" xmlns:a16="http://schemas.microsoft.com/office/drawing/2014/main" xmlns:p14="http://schemas.microsoft.com/office/powerpoint/2010/main" xmlns:dgm="http://schemas.openxmlformats.org/drawingml/2006/diagram" xmlns:a14="http://schemas.microsoft.com/office/drawing/2010/main" w="9525">
                   <a:solidFill>
                     <a:srgbClr val="000000"/>
                   </a:solidFill>
@@ -23870,7 +23890,7 @@
                   <a16:creationId xmlns:a16="http://schemas.microsoft.com/office/drawing/2014/main" id="{3C9A5D2B-1787-4954-9108-B9D497A87C83}"/>
                 </a:ext>
                 <a:ext uri="{C183D7F6-B498-43B3-948B-1728B52AA6E4}">
-                  <adec:decorative xmlns:adec="http://schemas.microsoft.com/office/drawing/2017/decorative" val="1"/>
+                  <adec:decorative xmlns:adec="http://schemas.microsoft.com/office/drawing/2017/decorative" xmlns="" val="1"/>
                 </a:ext>
               </a:extLst>
             </p:cNvPr>
@@ -23927,7 +23947,7 @@
             </a:ln>
             <a:extLst>
               <a:ext uri="{91240B29-F687-4f45-9708-019B960494DF}">
-                <a14:hiddenLine xmlns:a14="http://schemas.microsoft.com/office/drawing/2010/main" xmlns:dgm="http://schemas.openxmlformats.org/drawingml/2006/diagram" xmlns:p14="http://schemas.microsoft.com/office/powerpoint/2010/main" xmlns:a16="http://schemas.microsoft.com/office/drawing/2014/main" xmlns="" w="9525">
+                <a14:hiddenLine xmlns="" xmlns:a16="http://schemas.microsoft.com/office/drawing/2014/main" xmlns:p14="http://schemas.microsoft.com/office/powerpoint/2010/main" xmlns:dgm="http://schemas.openxmlformats.org/drawingml/2006/diagram" xmlns:a14="http://schemas.microsoft.com/office/drawing/2010/main" w="9525">
                   <a:solidFill>
                     <a:srgbClr val="000000"/>
                   </a:solidFill>
@@ -23947,7 +23967,7 @@
                   <a16:creationId xmlns:a16="http://schemas.microsoft.com/office/drawing/2014/main" id="{818C4F8B-7556-49A7-83C6-C8F631F6A983}"/>
                 </a:ext>
                 <a:ext uri="{C183D7F6-B498-43B3-948B-1728B52AA6E4}">
-                  <adec:decorative xmlns:adec="http://schemas.microsoft.com/office/drawing/2017/decorative" val="1"/>
+                  <adec:decorative xmlns:adec="http://schemas.microsoft.com/office/drawing/2017/decorative" xmlns="" val="1"/>
                 </a:ext>
               </a:extLst>
             </p:cNvPr>
@@ -24032,7 +24052,7 @@
             </a:ln>
             <a:extLst>
               <a:ext uri="{91240B29-F687-4f45-9708-019B960494DF}">
-                <a14:hiddenLine xmlns:a14="http://schemas.microsoft.com/office/drawing/2010/main" xmlns:dgm="http://schemas.openxmlformats.org/drawingml/2006/diagram" xmlns:p14="http://schemas.microsoft.com/office/powerpoint/2010/main" xmlns:a16="http://schemas.microsoft.com/office/drawing/2014/main" xmlns="" w="9525">
+                <a14:hiddenLine xmlns="" xmlns:a16="http://schemas.microsoft.com/office/drawing/2014/main" xmlns:p14="http://schemas.microsoft.com/office/powerpoint/2010/main" xmlns:dgm="http://schemas.openxmlformats.org/drawingml/2006/diagram" xmlns:a14="http://schemas.microsoft.com/office/drawing/2010/main" w="9525">
                   <a:solidFill>
                     <a:srgbClr val="000000"/>
                   </a:solidFill>
@@ -24052,7 +24072,7 @@
                   <a16:creationId xmlns:a16="http://schemas.microsoft.com/office/drawing/2014/main" id="{22BED614-D078-47EA-9C72-190217FDD577}"/>
                 </a:ext>
                 <a:ext uri="{C183D7F6-B498-43B3-948B-1728B52AA6E4}">
-                  <adec:decorative xmlns:adec="http://schemas.microsoft.com/office/drawing/2017/decorative" val="1"/>
+                  <adec:decorative xmlns:adec="http://schemas.microsoft.com/office/drawing/2017/decorative" xmlns="" val="1"/>
                 </a:ext>
               </a:extLst>
             </p:cNvPr>
@@ -24137,7 +24157,7 @@
             </a:ln>
             <a:extLst>
               <a:ext uri="{91240B29-F687-4f45-9708-019B960494DF}">
-                <a14:hiddenLine xmlns:a14="http://schemas.microsoft.com/office/drawing/2010/main" xmlns:dgm="http://schemas.openxmlformats.org/drawingml/2006/diagram" xmlns:p14="http://schemas.microsoft.com/office/powerpoint/2010/main" xmlns:a16="http://schemas.microsoft.com/office/drawing/2014/main" xmlns="" w="9525">
+                <a14:hiddenLine xmlns="" xmlns:a16="http://schemas.microsoft.com/office/drawing/2014/main" xmlns:p14="http://schemas.microsoft.com/office/powerpoint/2010/main" xmlns:dgm="http://schemas.openxmlformats.org/drawingml/2006/diagram" xmlns:a14="http://schemas.microsoft.com/office/drawing/2010/main" w="9525">
                   <a:solidFill>
                     <a:srgbClr val="000000"/>
                   </a:solidFill>
@@ -24157,7 +24177,7 @@
                   <a16:creationId xmlns:a16="http://schemas.microsoft.com/office/drawing/2014/main" id="{73DE0BF2-86D7-4038-AC4B-AF0F116A5870}"/>
                 </a:ext>
                 <a:ext uri="{C183D7F6-B498-43B3-948B-1728B52AA6E4}">
-                  <adec:decorative xmlns:adec="http://schemas.microsoft.com/office/drawing/2017/decorative" val="1"/>
+                  <adec:decorative xmlns:adec="http://schemas.microsoft.com/office/drawing/2017/decorative" xmlns="" val="1"/>
                 </a:ext>
               </a:extLst>
             </p:cNvPr>
@@ -24214,7 +24234,7 @@
             </a:ln>
             <a:extLst>
               <a:ext uri="{91240B29-F687-4f45-9708-019B960494DF}">
-                <a14:hiddenLine xmlns:a14="http://schemas.microsoft.com/office/drawing/2010/main" xmlns:dgm="http://schemas.openxmlformats.org/drawingml/2006/diagram" xmlns:p14="http://schemas.microsoft.com/office/powerpoint/2010/main" xmlns:a16="http://schemas.microsoft.com/office/drawing/2014/main" xmlns="" w="9525">
+                <a14:hiddenLine xmlns="" xmlns:a16="http://schemas.microsoft.com/office/drawing/2014/main" xmlns:p14="http://schemas.microsoft.com/office/powerpoint/2010/main" xmlns:dgm="http://schemas.openxmlformats.org/drawingml/2006/diagram" xmlns:a14="http://schemas.microsoft.com/office/drawing/2010/main" w="9525">
                   <a:solidFill>
                     <a:srgbClr val="000000"/>
                   </a:solidFill>
@@ -24234,7 +24254,7 @@
                   <a16:creationId xmlns:a16="http://schemas.microsoft.com/office/drawing/2014/main" id="{11D8BB55-D027-420C-9EF9-49B3BA79DC73}"/>
                 </a:ext>
                 <a:ext uri="{C183D7F6-B498-43B3-948B-1728B52AA6E4}">
-                  <adec:decorative xmlns:adec="http://schemas.microsoft.com/office/drawing/2017/decorative" val="1"/>
+                  <adec:decorative xmlns:adec="http://schemas.microsoft.com/office/drawing/2017/decorative" xmlns="" val="1"/>
                 </a:ext>
               </a:extLst>
             </p:cNvPr>
@@ -24339,7 +24359,7 @@
             </a:ln>
             <a:extLst>
               <a:ext uri="{91240B29-F687-4f45-9708-019B960494DF}">
-                <a14:hiddenLine xmlns:a14="http://schemas.microsoft.com/office/drawing/2010/main" xmlns:dgm="http://schemas.openxmlformats.org/drawingml/2006/diagram" xmlns:p14="http://schemas.microsoft.com/office/powerpoint/2010/main" xmlns:a16="http://schemas.microsoft.com/office/drawing/2014/main" xmlns="" w="9525">
+                <a14:hiddenLine xmlns="" xmlns:a16="http://schemas.microsoft.com/office/drawing/2014/main" xmlns:p14="http://schemas.microsoft.com/office/powerpoint/2010/main" xmlns:dgm="http://schemas.openxmlformats.org/drawingml/2006/diagram" xmlns:a14="http://schemas.microsoft.com/office/drawing/2010/main" w="9525">
                   <a:solidFill>
                     <a:srgbClr val="000000"/>
                   </a:solidFill>
@@ -24359,7 +24379,7 @@
                   <a16:creationId xmlns:a16="http://schemas.microsoft.com/office/drawing/2014/main" id="{3FAEF5CE-07ED-46A7-9777-D86C70719583}"/>
                 </a:ext>
                 <a:ext uri="{C183D7F6-B498-43B3-948B-1728B52AA6E4}">
-                  <adec:decorative xmlns:adec="http://schemas.microsoft.com/office/drawing/2017/decorative" val="1"/>
+                  <adec:decorative xmlns:adec="http://schemas.microsoft.com/office/drawing/2017/decorative" xmlns="" val="1"/>
                 </a:ext>
               </a:extLst>
             </p:cNvPr>
@@ -24402,7 +24422,7 @@
                   <a16:creationId xmlns:a16="http://schemas.microsoft.com/office/drawing/2014/main" id="{29CAFB1A-357C-4313-B734-1CD4E4F9D2D7}"/>
                 </a:ext>
                 <a:ext uri="{C183D7F6-B498-43B3-948B-1728B52AA6E4}">
-                  <adec:decorative xmlns:adec="http://schemas.microsoft.com/office/drawing/2017/decorative" val="1"/>
+                  <adec:decorative xmlns:adec="http://schemas.microsoft.com/office/drawing/2017/decorative" xmlns="" val="1"/>
                 </a:ext>
               </a:extLst>
             </p:cNvPr>
@@ -24453,7 +24473,7 @@
             </a:ln>
             <a:extLst>
               <a:ext uri="{91240B29-F687-4f45-9708-019B960494DF}">
-                <a14:hiddenLine xmlns:a14="http://schemas.microsoft.com/office/drawing/2010/main" xmlns:dgm="http://schemas.openxmlformats.org/drawingml/2006/diagram" xmlns:p14="http://schemas.microsoft.com/office/powerpoint/2010/main" xmlns:a16="http://schemas.microsoft.com/office/drawing/2014/main" xmlns="" w="9525">
+                <a14:hiddenLine xmlns="" xmlns:a16="http://schemas.microsoft.com/office/drawing/2014/main" xmlns:p14="http://schemas.microsoft.com/office/powerpoint/2010/main" xmlns:dgm="http://schemas.openxmlformats.org/drawingml/2006/diagram" xmlns:a14="http://schemas.microsoft.com/office/drawing/2010/main" w="9525">
                   <a:solidFill>
                     <a:srgbClr val="000000"/>
                   </a:solidFill>
@@ -24473,7 +24493,7 @@
                   <a16:creationId xmlns:a16="http://schemas.microsoft.com/office/drawing/2014/main" id="{653161D3-8634-4BB7-A2BC-028C4EAA1513}"/>
                 </a:ext>
                 <a:ext uri="{C183D7F6-B498-43B3-948B-1728B52AA6E4}">
-                  <adec:decorative xmlns:adec="http://schemas.microsoft.com/office/drawing/2017/decorative" val="1"/>
+                  <adec:decorative xmlns:adec="http://schemas.microsoft.com/office/drawing/2017/decorative" xmlns="" val="1"/>
                 </a:ext>
               </a:extLst>
             </p:cNvPr>
@@ -24530,7 +24550,7 @@
             </a:ln>
             <a:extLst>
               <a:ext uri="{91240B29-F687-4f45-9708-019B960494DF}">
-                <a14:hiddenLine xmlns:a14="http://schemas.microsoft.com/office/drawing/2010/main" xmlns:dgm="http://schemas.openxmlformats.org/drawingml/2006/diagram" xmlns:p14="http://schemas.microsoft.com/office/powerpoint/2010/main" xmlns:a16="http://schemas.microsoft.com/office/drawing/2014/main" xmlns="" w="9525">
+                <a14:hiddenLine xmlns="" xmlns:a16="http://schemas.microsoft.com/office/drawing/2014/main" xmlns:p14="http://schemas.microsoft.com/office/powerpoint/2010/main" xmlns:dgm="http://schemas.openxmlformats.org/drawingml/2006/diagram" xmlns:a14="http://schemas.microsoft.com/office/drawing/2010/main" w="9525">
                   <a:solidFill>
                     <a:srgbClr val="000000"/>
                   </a:solidFill>
@@ -24550,7 +24570,7 @@
                   <a16:creationId xmlns:a16="http://schemas.microsoft.com/office/drawing/2014/main" id="{9537546A-6FF1-408B-AFE2-BBF7D348230F}"/>
                 </a:ext>
                 <a:ext uri="{C183D7F6-B498-43B3-948B-1728B52AA6E4}">
-                  <adec:decorative xmlns:adec="http://schemas.microsoft.com/office/drawing/2017/decorative" val="1"/>
+                  <adec:decorative xmlns:adec="http://schemas.microsoft.com/office/drawing/2017/decorative" xmlns="" val="1"/>
                 </a:ext>
               </a:extLst>
             </p:cNvPr>
@@ -24607,7 +24627,7 @@
             </a:ln>
             <a:extLst>
               <a:ext uri="{91240B29-F687-4f45-9708-019B960494DF}">
-                <a14:hiddenLine xmlns:a14="http://schemas.microsoft.com/office/drawing/2010/main" xmlns:dgm="http://schemas.openxmlformats.org/drawingml/2006/diagram" xmlns:p14="http://schemas.microsoft.com/office/powerpoint/2010/main" xmlns:a16="http://schemas.microsoft.com/office/drawing/2014/main" xmlns="" w="9525">
+                <a14:hiddenLine xmlns="" xmlns:a16="http://schemas.microsoft.com/office/drawing/2014/main" xmlns:p14="http://schemas.microsoft.com/office/powerpoint/2010/main" xmlns:dgm="http://schemas.openxmlformats.org/drawingml/2006/diagram" xmlns:a14="http://schemas.microsoft.com/office/drawing/2010/main" w="9525">
                   <a:solidFill>
                     <a:srgbClr val="000000"/>
                   </a:solidFill>
@@ -24627,7 +24647,7 @@
                   <a16:creationId xmlns:a16="http://schemas.microsoft.com/office/drawing/2014/main" id="{F73EE662-79B7-404B-B1B8-0E096BE4CD66}"/>
                 </a:ext>
                 <a:ext uri="{C183D7F6-B498-43B3-948B-1728B52AA6E4}">
-                  <adec:decorative xmlns:adec="http://schemas.microsoft.com/office/drawing/2017/decorative" val="1"/>
+                  <adec:decorative xmlns:adec="http://schemas.microsoft.com/office/drawing/2017/decorative" xmlns="" val="1"/>
                 </a:ext>
               </a:extLst>
             </p:cNvPr>
@@ -24712,7 +24732,7 @@
             </a:ln>
             <a:extLst>
               <a:ext uri="{91240B29-F687-4f45-9708-019B960494DF}">
-                <a14:hiddenLine xmlns:a14="http://schemas.microsoft.com/office/drawing/2010/main" xmlns:dgm="http://schemas.openxmlformats.org/drawingml/2006/diagram" xmlns:p14="http://schemas.microsoft.com/office/powerpoint/2010/main" xmlns:a16="http://schemas.microsoft.com/office/drawing/2014/main" xmlns="" w="9525">
+                <a14:hiddenLine xmlns="" xmlns:a16="http://schemas.microsoft.com/office/drawing/2014/main" xmlns:p14="http://schemas.microsoft.com/office/powerpoint/2010/main" xmlns:dgm="http://schemas.openxmlformats.org/drawingml/2006/diagram" xmlns:a14="http://schemas.microsoft.com/office/drawing/2010/main" w="9525">
                   <a:solidFill>
                     <a:srgbClr val="000000"/>
                   </a:solidFill>
@@ -24732,7 +24752,7 @@
                   <a16:creationId xmlns:a16="http://schemas.microsoft.com/office/drawing/2014/main" id="{B6DDB906-1F52-4D64-8493-4816EDDD34CC}"/>
                 </a:ext>
                 <a:ext uri="{C183D7F6-B498-43B3-948B-1728B52AA6E4}">
-                  <adec:decorative xmlns:adec="http://schemas.microsoft.com/office/drawing/2017/decorative" val="1"/>
+                  <adec:decorative xmlns:adec="http://schemas.microsoft.com/office/drawing/2017/decorative" xmlns="" val="1"/>
                 </a:ext>
               </a:extLst>
             </p:cNvPr>
@@ -24761,7 +24781,7 @@
             </a:ln>
             <a:extLst>
               <a:ext uri="{91240B29-F687-4f45-9708-019B960494DF}">
-                <a14:hiddenLine xmlns:a14="http://schemas.microsoft.com/office/drawing/2010/main" xmlns:dgm="http://schemas.openxmlformats.org/drawingml/2006/diagram" xmlns:p14="http://schemas.microsoft.com/office/powerpoint/2010/main" xmlns:a16="http://schemas.microsoft.com/office/drawing/2014/main" xmlns="" w="9525">
+                <a14:hiddenLine xmlns="" xmlns:a16="http://schemas.microsoft.com/office/drawing/2014/main" xmlns:p14="http://schemas.microsoft.com/office/powerpoint/2010/main" xmlns:dgm="http://schemas.openxmlformats.org/drawingml/2006/diagram" xmlns:a14="http://schemas.microsoft.com/office/drawing/2010/main" w="9525">
                   <a:solidFill>
                     <a:srgbClr val="000000"/>
                   </a:solidFill>
@@ -24781,7 +24801,7 @@
                   <a16:creationId xmlns:a16="http://schemas.microsoft.com/office/drawing/2014/main" id="{4FA472A5-ABEA-4961-897B-7EB96AF09A1F}"/>
                 </a:ext>
                 <a:ext uri="{C183D7F6-B498-43B3-948B-1728B52AA6E4}">
-                  <adec:decorative xmlns:adec="http://schemas.microsoft.com/office/drawing/2017/decorative" val="1"/>
+                  <adec:decorative xmlns:adec="http://schemas.microsoft.com/office/drawing/2017/decorative" xmlns="" val="1"/>
                 </a:ext>
               </a:extLst>
             </p:cNvPr>
@@ -24841,7 +24861,7 @@
             </a:ln>
             <a:extLst>
               <a:ext uri="{91240B29-F687-4f45-9708-019B960494DF}">
-                <a14:hiddenLine xmlns:a14="http://schemas.microsoft.com/office/drawing/2010/main" xmlns:dgm="http://schemas.openxmlformats.org/drawingml/2006/diagram" xmlns:p14="http://schemas.microsoft.com/office/powerpoint/2010/main" xmlns:a16="http://schemas.microsoft.com/office/drawing/2014/main" xmlns="" w="9525">
+                <a14:hiddenLine xmlns="" xmlns:a16="http://schemas.microsoft.com/office/drawing/2014/main" xmlns:p14="http://schemas.microsoft.com/office/powerpoint/2010/main" xmlns:dgm="http://schemas.openxmlformats.org/drawingml/2006/diagram" xmlns:a14="http://schemas.microsoft.com/office/drawing/2010/main" w="9525">
                   <a:solidFill>
                     <a:srgbClr val="000000"/>
                   </a:solidFill>
@@ -24861,7 +24881,7 @@
                   <a16:creationId xmlns:a16="http://schemas.microsoft.com/office/drawing/2014/main" id="{54226E99-C38F-4456-A1F8-8897483FD9A8}"/>
                 </a:ext>
                 <a:ext uri="{C183D7F6-B498-43B3-948B-1728B52AA6E4}">
-                  <adec:decorative xmlns:adec="http://schemas.microsoft.com/office/drawing/2017/decorative" val="1"/>
+                  <adec:decorative xmlns:adec="http://schemas.microsoft.com/office/drawing/2017/decorative" xmlns="" val="1"/>
                 </a:ext>
               </a:extLst>
             </p:cNvPr>
@@ -24946,7 +24966,7 @@
             </a:ln>
             <a:extLst>
               <a:ext uri="{91240B29-F687-4f45-9708-019B960494DF}">
-                <a14:hiddenLine xmlns:a14="http://schemas.microsoft.com/office/drawing/2010/main" xmlns:dgm="http://schemas.openxmlformats.org/drawingml/2006/diagram" xmlns:p14="http://schemas.microsoft.com/office/powerpoint/2010/main" xmlns:a16="http://schemas.microsoft.com/office/drawing/2014/main" xmlns="" w="9525">
+                <a14:hiddenLine xmlns="" xmlns:a16="http://schemas.microsoft.com/office/drawing/2014/main" xmlns:p14="http://schemas.microsoft.com/office/powerpoint/2010/main" xmlns:dgm="http://schemas.openxmlformats.org/drawingml/2006/diagram" xmlns:a14="http://schemas.microsoft.com/office/drawing/2010/main" w="9525">
                   <a:solidFill>
                     <a:srgbClr val="000000"/>
                   </a:solidFill>
@@ -24966,7 +24986,7 @@
                   <a16:creationId xmlns:a16="http://schemas.microsoft.com/office/drawing/2014/main" id="{0A4A0196-A383-4629-B9A5-9C87E846C11E}"/>
                 </a:ext>
                 <a:ext uri="{C183D7F6-B498-43B3-948B-1728B52AA6E4}">
-                  <adec:decorative xmlns:adec="http://schemas.microsoft.com/office/drawing/2017/decorative" val="1"/>
+                  <adec:decorative xmlns:adec="http://schemas.microsoft.com/office/drawing/2017/decorative" xmlns="" val="1"/>
                 </a:ext>
               </a:extLst>
             </p:cNvPr>
@@ -25023,7 +25043,7 @@
             </a:ln>
             <a:extLst>
               <a:ext uri="{91240B29-F687-4f45-9708-019B960494DF}">
-                <a14:hiddenLine xmlns:a14="http://schemas.microsoft.com/office/drawing/2010/main" xmlns:dgm="http://schemas.openxmlformats.org/drawingml/2006/diagram" xmlns:p14="http://schemas.microsoft.com/office/powerpoint/2010/main" xmlns:a16="http://schemas.microsoft.com/office/drawing/2014/main" xmlns="" w="9525">
+                <a14:hiddenLine xmlns="" xmlns:a16="http://schemas.microsoft.com/office/drawing/2014/main" xmlns:p14="http://schemas.microsoft.com/office/powerpoint/2010/main" xmlns:dgm="http://schemas.openxmlformats.org/drawingml/2006/diagram" xmlns:a14="http://schemas.microsoft.com/office/drawing/2010/main" w="9525">
                   <a:solidFill>
                     <a:srgbClr val="000000"/>
                   </a:solidFill>
@@ -25043,7 +25063,7 @@
                   <a16:creationId xmlns:a16="http://schemas.microsoft.com/office/drawing/2014/main" id="{BA5E608D-2E7B-4662-A9A0-18D4E0F0DC6E}"/>
                 </a:ext>
                 <a:ext uri="{C183D7F6-B498-43B3-948B-1728B52AA6E4}">
-                  <adec:decorative xmlns:adec="http://schemas.microsoft.com/office/drawing/2017/decorative" val="1"/>
+                  <adec:decorative xmlns:adec="http://schemas.microsoft.com/office/drawing/2017/decorative" xmlns="" val="1"/>
                 </a:ext>
               </a:extLst>
             </p:cNvPr>
@@ -25128,7 +25148,7 @@
             </a:ln>
             <a:extLst>
               <a:ext uri="{91240B29-F687-4f45-9708-019B960494DF}">
-                <a14:hiddenLine xmlns:a14="http://schemas.microsoft.com/office/drawing/2010/main" xmlns:dgm="http://schemas.openxmlformats.org/drawingml/2006/diagram" xmlns:p14="http://schemas.microsoft.com/office/powerpoint/2010/main" xmlns:a16="http://schemas.microsoft.com/office/drawing/2014/main" xmlns="" w="9525">
+                <a14:hiddenLine xmlns="" xmlns:a16="http://schemas.microsoft.com/office/drawing/2014/main" xmlns:p14="http://schemas.microsoft.com/office/powerpoint/2010/main" xmlns:dgm="http://schemas.openxmlformats.org/drawingml/2006/diagram" xmlns:a14="http://schemas.microsoft.com/office/drawing/2010/main" w="9525">
                   <a:solidFill>
                     <a:srgbClr val="000000"/>
                   </a:solidFill>
@@ -25148,7 +25168,7 @@
                   <a16:creationId xmlns:a16="http://schemas.microsoft.com/office/drawing/2014/main" id="{5E211F37-790F-4BD7-B055-022AE0C2E6D3}"/>
                 </a:ext>
                 <a:ext uri="{C183D7F6-B498-43B3-948B-1728B52AA6E4}">
-                  <adec:decorative xmlns:adec="http://schemas.microsoft.com/office/drawing/2017/decorative" val="1"/>
+                  <adec:decorative xmlns:adec="http://schemas.microsoft.com/office/drawing/2017/decorative" xmlns="" val="1"/>
                 </a:ext>
               </a:extLst>
             </p:cNvPr>
@@ -25208,7 +25228,7 @@
             </a:ln>
             <a:extLst>
               <a:ext uri="{91240B29-F687-4f45-9708-019B960494DF}">
-                <a14:hiddenLine xmlns:a14="http://schemas.microsoft.com/office/drawing/2010/main" xmlns:dgm="http://schemas.openxmlformats.org/drawingml/2006/diagram" xmlns:p14="http://schemas.microsoft.com/office/powerpoint/2010/main" xmlns:a16="http://schemas.microsoft.com/office/drawing/2014/main" xmlns="" w="9525">
+                <a14:hiddenLine xmlns="" xmlns:a16="http://schemas.microsoft.com/office/drawing/2014/main" xmlns:p14="http://schemas.microsoft.com/office/powerpoint/2010/main" xmlns:dgm="http://schemas.openxmlformats.org/drawingml/2006/diagram" xmlns:a14="http://schemas.microsoft.com/office/drawing/2010/main" w="9525">
                   <a:solidFill>
                     <a:srgbClr val="000000"/>
                   </a:solidFill>
@@ -25228,7 +25248,7 @@
                   <a16:creationId xmlns:a16="http://schemas.microsoft.com/office/drawing/2014/main" id="{96F375D0-232A-490A-9499-CB5FBA3FD9A1}"/>
                 </a:ext>
                 <a:ext uri="{C183D7F6-B498-43B3-948B-1728B52AA6E4}">
-                  <adec:decorative xmlns:adec="http://schemas.microsoft.com/office/drawing/2017/decorative" val="1"/>
+                  <adec:decorative xmlns:adec="http://schemas.microsoft.com/office/drawing/2017/decorative" xmlns="" val="1"/>
                 </a:ext>
               </a:extLst>
             </p:cNvPr>
@@ -25285,7 +25305,7 @@
             </a:ln>
             <a:extLst>
               <a:ext uri="{91240B29-F687-4f45-9708-019B960494DF}">
-                <a14:hiddenLine xmlns:a14="http://schemas.microsoft.com/office/drawing/2010/main" xmlns:dgm="http://schemas.openxmlformats.org/drawingml/2006/diagram" xmlns:p14="http://schemas.microsoft.com/office/powerpoint/2010/main" xmlns:a16="http://schemas.microsoft.com/office/drawing/2014/main" xmlns="" w="9525">
+                <a14:hiddenLine xmlns="" xmlns:a16="http://schemas.microsoft.com/office/drawing/2014/main" xmlns:p14="http://schemas.microsoft.com/office/powerpoint/2010/main" xmlns:dgm="http://schemas.openxmlformats.org/drawingml/2006/diagram" xmlns:a14="http://schemas.microsoft.com/office/drawing/2010/main" w="9525">
                   <a:solidFill>
                     <a:srgbClr val="000000"/>
                   </a:solidFill>
@@ -25305,7 +25325,7 @@
                   <a16:creationId xmlns:a16="http://schemas.microsoft.com/office/drawing/2014/main" id="{6B33B423-FD0F-4780-A0D6-32FC040B37CD}"/>
                 </a:ext>
                 <a:ext uri="{C183D7F6-B498-43B3-948B-1728B52AA6E4}">
-                  <adec:decorative xmlns:adec="http://schemas.microsoft.com/office/drawing/2017/decorative" val="1"/>
+                  <adec:decorative xmlns:adec="http://schemas.microsoft.com/office/drawing/2017/decorative" xmlns="" val="1"/>
                 </a:ext>
               </a:extLst>
             </p:cNvPr>
@@ -25390,7 +25410,7 @@
             </a:ln>
             <a:extLst>
               <a:ext uri="{91240B29-F687-4f45-9708-019B960494DF}">
-                <a14:hiddenLine xmlns:a14="http://schemas.microsoft.com/office/drawing/2010/main" xmlns:dgm="http://schemas.openxmlformats.org/drawingml/2006/diagram" xmlns:p14="http://schemas.microsoft.com/office/powerpoint/2010/main" xmlns:a16="http://schemas.microsoft.com/office/drawing/2014/main" xmlns="" w="9525">
+                <a14:hiddenLine xmlns="" xmlns:a16="http://schemas.microsoft.com/office/drawing/2014/main" xmlns:p14="http://schemas.microsoft.com/office/powerpoint/2010/main" xmlns:dgm="http://schemas.openxmlformats.org/drawingml/2006/diagram" xmlns:a14="http://schemas.microsoft.com/office/drawing/2010/main" w="9525">
                   <a:solidFill>
                     <a:srgbClr val="000000"/>
                   </a:solidFill>
@@ -25410,7 +25430,7 @@
                   <a16:creationId xmlns:a16="http://schemas.microsoft.com/office/drawing/2014/main" id="{B6BD1710-838F-4CDD-A000-C6C710A6A08E}"/>
                 </a:ext>
                 <a:ext uri="{C183D7F6-B498-43B3-948B-1728B52AA6E4}">
-                  <adec:decorative xmlns:adec="http://schemas.microsoft.com/office/drawing/2017/decorative" val="1"/>
+                  <adec:decorative xmlns:adec="http://schemas.microsoft.com/office/drawing/2017/decorative" xmlns="" val="1"/>
                 </a:ext>
               </a:extLst>
             </p:cNvPr>
@@ -25495,7 +25515,7 @@
             </a:ln>
             <a:extLst>
               <a:ext uri="{91240B29-F687-4f45-9708-019B960494DF}">
-                <a14:hiddenLine xmlns:a14="http://schemas.microsoft.com/office/drawing/2010/main" xmlns:dgm="http://schemas.openxmlformats.org/drawingml/2006/diagram" xmlns:p14="http://schemas.microsoft.com/office/powerpoint/2010/main" xmlns:a16="http://schemas.microsoft.com/office/drawing/2014/main" xmlns="" w="9525">
+                <a14:hiddenLine xmlns="" xmlns:a16="http://schemas.microsoft.com/office/drawing/2014/main" xmlns:p14="http://schemas.microsoft.com/office/powerpoint/2010/main" xmlns:dgm="http://schemas.openxmlformats.org/drawingml/2006/diagram" xmlns:a14="http://schemas.microsoft.com/office/drawing/2010/main" w="9525">
                   <a:solidFill>
                     <a:srgbClr val="000000"/>
                   </a:solidFill>
@@ -25515,7 +25535,7 @@
                   <a16:creationId xmlns:a16="http://schemas.microsoft.com/office/drawing/2014/main" id="{0BB93533-1C95-4B0A-B0E2-168602B085DF}"/>
                 </a:ext>
                 <a:ext uri="{C183D7F6-B498-43B3-948B-1728B52AA6E4}">
-                  <adec:decorative xmlns:adec="http://schemas.microsoft.com/office/drawing/2017/decorative" val="1"/>
+                  <adec:decorative xmlns:adec="http://schemas.microsoft.com/office/drawing/2017/decorative" xmlns="" val="1"/>
                 </a:ext>
               </a:extLst>
             </p:cNvPr>
@@ -25575,7 +25595,7 @@
             </a:ln>
             <a:extLst>
               <a:ext uri="{91240B29-F687-4f45-9708-019B960494DF}">
-                <a14:hiddenLine xmlns:a14="http://schemas.microsoft.com/office/drawing/2010/main" xmlns:dgm="http://schemas.openxmlformats.org/drawingml/2006/diagram" xmlns:p14="http://schemas.microsoft.com/office/powerpoint/2010/main" xmlns:a16="http://schemas.microsoft.com/office/drawing/2014/main" xmlns="" w="9525">
+                <a14:hiddenLine xmlns="" xmlns:a16="http://schemas.microsoft.com/office/drawing/2014/main" xmlns:p14="http://schemas.microsoft.com/office/powerpoint/2010/main" xmlns:dgm="http://schemas.openxmlformats.org/drawingml/2006/diagram" xmlns:a14="http://schemas.microsoft.com/office/drawing/2010/main" w="9525">
                   <a:solidFill>
                     <a:srgbClr val="000000"/>
                   </a:solidFill>
@@ -25595,7 +25615,7 @@
                   <a16:creationId xmlns:a16="http://schemas.microsoft.com/office/drawing/2014/main" id="{CB0B113D-1987-4D89-A475-511E092FE1F2}"/>
                 </a:ext>
                 <a:ext uri="{C183D7F6-B498-43B3-948B-1728B52AA6E4}">
-                  <adec:decorative xmlns:adec="http://schemas.microsoft.com/office/drawing/2017/decorative" val="1"/>
+                  <adec:decorative xmlns:adec="http://schemas.microsoft.com/office/drawing/2017/decorative" xmlns="" val="1"/>
                 </a:ext>
               </a:extLst>
             </p:cNvPr>
@@ -25710,7 +25730,7 @@
             </a:ln>
             <a:extLst>
               <a:ext uri="{91240B29-F687-4f45-9708-019B960494DF}">
-                <a14:hiddenLine xmlns:a14="http://schemas.microsoft.com/office/drawing/2010/main" xmlns:dgm="http://schemas.openxmlformats.org/drawingml/2006/diagram" xmlns:p14="http://schemas.microsoft.com/office/powerpoint/2010/main" xmlns:a16="http://schemas.microsoft.com/office/drawing/2014/main" xmlns="" w="9525">
+                <a14:hiddenLine xmlns="" xmlns:a16="http://schemas.microsoft.com/office/drawing/2014/main" xmlns:p14="http://schemas.microsoft.com/office/powerpoint/2010/main" xmlns:dgm="http://schemas.openxmlformats.org/drawingml/2006/diagram" xmlns:a14="http://schemas.microsoft.com/office/drawing/2010/main" w="9525">
                   <a:solidFill>
                     <a:srgbClr val="000000"/>
                   </a:solidFill>
@@ -25731,7 +25751,7 @@
                 <a16:creationId xmlns:a16="http://schemas.microsoft.com/office/drawing/2014/main" id="{9BE36DBF-0333-4D36-A5BF-81FDA2406FE9}"/>
               </a:ext>
               <a:ext uri="{C183D7F6-B498-43B3-948B-1728B52AA6E4}">
-                <adec:decorative xmlns:adec="http://schemas.microsoft.com/office/drawing/2017/decorative" val="1"/>
+                <adec:decorative xmlns:adec="http://schemas.microsoft.com/office/drawing/2017/decorative" xmlns="" val="1"/>
               </a:ext>
             </a:extLst>
           </p:cNvPr>
@@ -25771,7 +25791,7 @@
           <a:noFill/>
           <a:extLst>
             <a:ext uri="{909E8E84-426E-40dd-AFC4-6F175D3DCCD1}">
-              <a14:hiddenFill xmlns:a14="http://schemas.microsoft.com/office/drawing/2010/main" xmlns:dgm="http://schemas.openxmlformats.org/drawingml/2006/diagram" xmlns:p14="http://schemas.microsoft.com/office/powerpoint/2010/main" xmlns:a16="http://schemas.microsoft.com/office/drawing/2014/main" xmlns="">
+              <a14:hiddenFill xmlns="" xmlns:a16="http://schemas.microsoft.com/office/drawing/2014/main" xmlns:p14="http://schemas.microsoft.com/office/powerpoint/2010/main" xmlns:dgm="http://schemas.openxmlformats.org/drawingml/2006/diagram" xmlns:a14="http://schemas.microsoft.com/office/drawing/2010/main">
                 <a:solidFill>
                   <a:srgbClr val="FFFFFF"/>
                 </a:solidFill>
@@ -25890,7 +25910,7 @@
                 <a16:creationId xmlns:a16="http://schemas.microsoft.com/office/drawing/2014/main" id="{5FF7B57D-FF7B-48B3-9F60-9BCEEECF9E76}"/>
               </a:ext>
               <a:ext uri="{C183D7F6-B498-43B3-948B-1728B52AA6E4}">
-                <adec:decorative xmlns:adec="http://schemas.microsoft.com/office/drawing/2017/decorative" val="1"/>
+                <adec:decorative xmlns:adec="http://schemas.microsoft.com/office/drawing/2017/decorative" xmlns="" val="1"/>
               </a:ext>
             </a:extLst>
           </p:cNvPr>
@@ -25930,7 +25950,7 @@
           <a:noFill/>
           <a:extLst>
             <a:ext uri="{909E8E84-426E-40dd-AFC4-6F175D3DCCD1}">
-              <a14:hiddenFill xmlns:a14="http://schemas.microsoft.com/office/drawing/2010/main" xmlns:p14="http://schemas.microsoft.com/office/powerpoint/2010/main" xmlns:a16="http://schemas.microsoft.com/office/drawing/2014/main" xmlns="">
+              <a14:hiddenFill xmlns="" xmlns:a16="http://schemas.microsoft.com/office/drawing/2014/main" xmlns:p14="http://schemas.microsoft.com/office/powerpoint/2010/main" xmlns:a14="http://schemas.microsoft.com/office/drawing/2010/main">
                 <a:solidFill>
                   <a:srgbClr val="FFFFFF"/>
                 </a:solidFill>
@@ -25947,7 +25967,7 @@
                 <a16:creationId xmlns:a16="http://schemas.microsoft.com/office/drawing/2014/main" id="{EB95AFDF-FA7D-4311-9C65-6D507D92F474}"/>
               </a:ext>
               <a:ext uri="{C183D7F6-B498-43B3-948B-1728B52AA6E4}">
-                <adec:decorative xmlns:adec="http://schemas.microsoft.com/office/drawing/2017/decorative" val="1"/>
+                <adec:decorative xmlns:adec="http://schemas.microsoft.com/office/drawing/2017/decorative" xmlns="" val="1"/>
               </a:ext>
             </a:extLst>
           </p:cNvPr>
@@ -25978,7 +25998,7 @@
                   <a16:creationId xmlns:a16="http://schemas.microsoft.com/office/drawing/2014/main" id="{9A5CCD98-20C1-4404-B788-FDA92F8A4403}"/>
                 </a:ext>
                 <a:ext uri="{C183D7F6-B498-43B3-948B-1728B52AA6E4}">
-                  <adec:decorative xmlns:adec="http://schemas.microsoft.com/office/drawing/2017/decorative" val="1"/>
+                  <adec:decorative xmlns:adec="http://schemas.microsoft.com/office/drawing/2017/decorative" xmlns="" val="1"/>
                 </a:ext>
               </a:extLst>
             </p:cNvPr>
@@ -26022,7 +26042,7 @@
                     <a16:creationId xmlns:a16="http://schemas.microsoft.com/office/drawing/2014/main" id="{C1424C76-B5C3-468E-86FA-8D9B269053DE}"/>
                   </a:ext>
                   <a:ext uri="{C183D7F6-B498-43B3-948B-1728B52AA6E4}">
-                    <adec:decorative xmlns:adec="http://schemas.microsoft.com/office/drawing/2017/decorative" val="1"/>
+                    <adec:decorative xmlns:adec="http://schemas.microsoft.com/office/drawing/2017/decorative" xmlns="" val="1"/>
                   </a:ext>
                 </a:extLst>
               </p:cNvPr>
@@ -26051,7 +26071,7 @@
               </a:ln>
               <a:extLst>
                 <a:ext uri="{91240B29-F687-4f45-9708-019B960494DF}">
-                  <a14:hiddenLine xmlns:a14="http://schemas.microsoft.com/office/drawing/2010/main" xmlns:p14="http://schemas.microsoft.com/office/powerpoint/2010/main" xmlns:a16="http://schemas.microsoft.com/office/drawing/2014/main" xmlns="" w="9525">
+                  <a14:hiddenLine xmlns="" xmlns:a16="http://schemas.microsoft.com/office/drawing/2014/main" xmlns:p14="http://schemas.microsoft.com/office/powerpoint/2010/main" xmlns:a14="http://schemas.microsoft.com/office/drawing/2010/main" w="9525">
                     <a:solidFill>
                       <a:srgbClr val="000000"/>
                     </a:solidFill>
@@ -26071,7 +26091,7 @@
                     <a16:creationId xmlns:a16="http://schemas.microsoft.com/office/drawing/2014/main" id="{B3922267-72C9-403B-A6DE-7D0A43D5541F}"/>
                   </a:ext>
                   <a:ext uri="{C183D7F6-B498-43B3-948B-1728B52AA6E4}">
-                    <adec:decorative xmlns:adec="http://schemas.microsoft.com/office/drawing/2017/decorative" val="1"/>
+                    <adec:decorative xmlns:adec="http://schemas.microsoft.com/office/drawing/2017/decorative" xmlns="" val="1"/>
                   </a:ext>
                 </a:extLst>
               </p:cNvPr>
@@ -26156,7 +26176,7 @@
               </a:ln>
               <a:extLst>
                 <a:ext uri="{91240B29-F687-4f45-9708-019B960494DF}">
-                  <a14:hiddenLine xmlns:a14="http://schemas.microsoft.com/office/drawing/2010/main" xmlns:p14="http://schemas.microsoft.com/office/powerpoint/2010/main" xmlns:a16="http://schemas.microsoft.com/office/drawing/2014/main" xmlns="" w="9525">
+                  <a14:hiddenLine xmlns="" xmlns:a16="http://schemas.microsoft.com/office/drawing/2014/main" xmlns:p14="http://schemas.microsoft.com/office/powerpoint/2010/main" xmlns:a14="http://schemas.microsoft.com/office/drawing/2010/main" w="9525">
                     <a:solidFill>
                       <a:srgbClr val="000000"/>
                     </a:solidFill>
@@ -26176,7 +26196,7 @@
                     <a16:creationId xmlns:a16="http://schemas.microsoft.com/office/drawing/2014/main" id="{7276DB68-2E8D-4723-852B-7476DD38FED0}"/>
                   </a:ext>
                   <a:ext uri="{C183D7F6-B498-43B3-948B-1728B52AA6E4}">
-                    <adec:decorative xmlns:adec="http://schemas.microsoft.com/office/drawing/2017/decorative" val="1"/>
+                    <adec:decorative xmlns:adec="http://schemas.microsoft.com/office/drawing/2017/decorative" xmlns="" val="1"/>
                   </a:ext>
                 </a:extLst>
               </p:cNvPr>
@@ -26261,7 +26281,7 @@
               </a:ln>
               <a:extLst>
                 <a:ext uri="{91240B29-F687-4f45-9708-019B960494DF}">
-                  <a14:hiddenLine xmlns:a14="http://schemas.microsoft.com/office/drawing/2010/main" xmlns:p14="http://schemas.microsoft.com/office/powerpoint/2010/main" xmlns:a16="http://schemas.microsoft.com/office/drawing/2014/main" xmlns="" w="9525">
+                  <a14:hiddenLine xmlns="" xmlns:a16="http://schemas.microsoft.com/office/drawing/2014/main" xmlns:p14="http://schemas.microsoft.com/office/powerpoint/2010/main" xmlns:a14="http://schemas.microsoft.com/office/drawing/2010/main" w="9525">
                     <a:solidFill>
                       <a:srgbClr val="000000"/>
                     </a:solidFill>
@@ -26281,7 +26301,7 @@
                     <a16:creationId xmlns:a16="http://schemas.microsoft.com/office/drawing/2014/main" id="{0A155711-4993-4D1E-89EA-A397C164F0FB}"/>
                   </a:ext>
                   <a:ext uri="{C183D7F6-B498-43B3-948B-1728B52AA6E4}">
-                    <adec:decorative xmlns:adec="http://schemas.microsoft.com/office/drawing/2017/decorative" val="1"/>
+                    <adec:decorative xmlns:adec="http://schemas.microsoft.com/office/drawing/2017/decorative" xmlns="" val="1"/>
                   </a:ext>
                 </a:extLst>
               </p:cNvPr>
@@ -26338,7 +26358,7 @@
               </a:ln>
               <a:extLst>
                 <a:ext uri="{91240B29-F687-4f45-9708-019B960494DF}">
-                  <a14:hiddenLine xmlns:a14="http://schemas.microsoft.com/office/drawing/2010/main" xmlns:p14="http://schemas.microsoft.com/office/powerpoint/2010/main" xmlns:a16="http://schemas.microsoft.com/office/drawing/2014/main" xmlns="" w="9525">
+                  <a14:hiddenLine xmlns="" xmlns:a16="http://schemas.microsoft.com/office/drawing/2014/main" xmlns:p14="http://schemas.microsoft.com/office/powerpoint/2010/main" xmlns:a14="http://schemas.microsoft.com/office/drawing/2010/main" w="9525">
                     <a:solidFill>
                       <a:srgbClr val="000000"/>
                     </a:solidFill>
@@ -26358,7 +26378,7 @@
                     <a16:creationId xmlns:a16="http://schemas.microsoft.com/office/drawing/2014/main" id="{2AB42136-2551-4CAA-857F-65FA3247B49D}"/>
                   </a:ext>
                   <a:ext uri="{C183D7F6-B498-43B3-948B-1728B52AA6E4}">
-                    <adec:decorative xmlns:adec="http://schemas.microsoft.com/office/drawing/2017/decorative" val="1"/>
+                    <adec:decorative xmlns:adec="http://schemas.microsoft.com/office/drawing/2017/decorative" xmlns="" val="1"/>
                   </a:ext>
                 </a:extLst>
               </p:cNvPr>
@@ -26443,7 +26463,7 @@
               </a:ln>
               <a:extLst>
                 <a:ext uri="{91240B29-F687-4f45-9708-019B960494DF}">
-                  <a14:hiddenLine xmlns:a14="http://schemas.microsoft.com/office/drawing/2010/main" xmlns:p14="http://schemas.microsoft.com/office/powerpoint/2010/main" xmlns:a16="http://schemas.microsoft.com/office/drawing/2014/main" xmlns="" w="9525">
+                  <a14:hiddenLine xmlns="" xmlns:a16="http://schemas.microsoft.com/office/drawing/2014/main" xmlns:p14="http://schemas.microsoft.com/office/powerpoint/2010/main" xmlns:a14="http://schemas.microsoft.com/office/drawing/2010/main" w="9525">
                     <a:solidFill>
                       <a:srgbClr val="000000"/>
                     </a:solidFill>
@@ -26463,7 +26483,7 @@
                     <a16:creationId xmlns:a16="http://schemas.microsoft.com/office/drawing/2014/main" id="{7C2ADEA1-EA3E-4C0E-A28E-460092F7FFD7}"/>
                   </a:ext>
                   <a:ext uri="{C183D7F6-B498-43B3-948B-1728B52AA6E4}">
-                    <adec:decorative xmlns:adec="http://schemas.microsoft.com/office/drawing/2017/decorative" val="1"/>
+                    <adec:decorative xmlns:adec="http://schemas.microsoft.com/office/drawing/2017/decorative" xmlns="" val="1"/>
                   </a:ext>
                 </a:extLst>
               </p:cNvPr>
@@ -26520,7 +26540,7 @@
               </a:ln>
               <a:extLst>
                 <a:ext uri="{91240B29-F687-4f45-9708-019B960494DF}">
-                  <a14:hiddenLine xmlns:a14="http://schemas.microsoft.com/office/drawing/2010/main" xmlns:p14="http://schemas.microsoft.com/office/powerpoint/2010/main" xmlns:a16="http://schemas.microsoft.com/office/drawing/2014/main" xmlns="" w="9525">
+                  <a14:hiddenLine xmlns="" xmlns:a16="http://schemas.microsoft.com/office/drawing/2014/main" xmlns:p14="http://schemas.microsoft.com/office/powerpoint/2010/main" xmlns:a14="http://schemas.microsoft.com/office/drawing/2010/main" w="9525">
                     <a:solidFill>
                       <a:srgbClr val="000000"/>
                     </a:solidFill>
@@ -26540,7 +26560,7 @@
                     <a16:creationId xmlns:a16="http://schemas.microsoft.com/office/drawing/2014/main" id="{B04584B3-081C-4286-A840-AB5B16B10AA3}"/>
                   </a:ext>
                   <a:ext uri="{C183D7F6-B498-43B3-948B-1728B52AA6E4}">
-                    <adec:decorative xmlns:adec="http://schemas.microsoft.com/office/drawing/2017/decorative" val="1"/>
+                    <adec:decorative xmlns:adec="http://schemas.microsoft.com/office/drawing/2017/decorative" xmlns="" val="1"/>
                   </a:ext>
                 </a:extLst>
               </p:cNvPr>
@@ -26597,7 +26617,7 @@
               </a:ln>
               <a:extLst>
                 <a:ext uri="{91240B29-F687-4f45-9708-019B960494DF}">
-                  <a14:hiddenLine xmlns:a14="http://schemas.microsoft.com/office/drawing/2010/main" xmlns:p14="http://schemas.microsoft.com/office/powerpoint/2010/main" xmlns:a16="http://schemas.microsoft.com/office/drawing/2014/main" xmlns="" w="9525">
+                  <a14:hiddenLine xmlns="" xmlns:a16="http://schemas.microsoft.com/office/drawing/2014/main" xmlns:p14="http://schemas.microsoft.com/office/powerpoint/2010/main" xmlns:a14="http://schemas.microsoft.com/office/drawing/2010/main" w="9525">
                     <a:solidFill>
                       <a:srgbClr val="000000"/>
                     </a:solidFill>
@@ -26617,7 +26637,7 @@
                     <a16:creationId xmlns:a16="http://schemas.microsoft.com/office/drawing/2014/main" id="{3AB388FD-C246-4936-A041-E0413A132986}"/>
                   </a:ext>
                   <a:ext uri="{C183D7F6-B498-43B3-948B-1728B52AA6E4}">
-                    <adec:decorative xmlns:adec="http://schemas.microsoft.com/office/drawing/2017/decorative" val="1"/>
+                    <adec:decorative xmlns:adec="http://schemas.microsoft.com/office/drawing/2017/decorative" xmlns="" val="1"/>
                   </a:ext>
                 </a:extLst>
               </p:cNvPr>
@@ -26702,7 +26722,7 @@
               </a:ln>
               <a:extLst>
                 <a:ext uri="{91240B29-F687-4f45-9708-019B960494DF}">
-                  <a14:hiddenLine xmlns:a14="http://schemas.microsoft.com/office/drawing/2010/main" xmlns:p14="http://schemas.microsoft.com/office/powerpoint/2010/main" xmlns:a16="http://schemas.microsoft.com/office/drawing/2014/main" xmlns="" w="9525">
+                  <a14:hiddenLine xmlns="" xmlns:a16="http://schemas.microsoft.com/office/drawing/2014/main" xmlns:p14="http://schemas.microsoft.com/office/powerpoint/2010/main" xmlns:a14="http://schemas.microsoft.com/office/drawing/2010/main" w="9525">
                     <a:solidFill>
                       <a:srgbClr val="000000"/>
                     </a:solidFill>
@@ -26722,7 +26742,7 @@
                     <a16:creationId xmlns:a16="http://schemas.microsoft.com/office/drawing/2014/main" id="{57692343-2D12-4F57-836C-945D407B68B7}"/>
                   </a:ext>
                   <a:ext uri="{C183D7F6-B498-43B3-948B-1728B52AA6E4}">
-                    <adec:decorative xmlns:adec="http://schemas.microsoft.com/office/drawing/2017/decorative" val="1"/>
+                    <adec:decorative xmlns:adec="http://schemas.microsoft.com/office/drawing/2017/decorative" xmlns="" val="1"/>
                   </a:ext>
                 </a:extLst>
               </p:cNvPr>
@@ -26807,7 +26827,7 @@
               </a:ln>
               <a:extLst>
                 <a:ext uri="{91240B29-F687-4f45-9708-019B960494DF}">
-                  <a14:hiddenLine xmlns:a14="http://schemas.microsoft.com/office/drawing/2010/main" xmlns:p14="http://schemas.microsoft.com/office/powerpoint/2010/main" xmlns:a16="http://schemas.microsoft.com/office/drawing/2014/main" xmlns="" w="9525">
+                  <a14:hiddenLine xmlns="" xmlns:a16="http://schemas.microsoft.com/office/drawing/2014/main" xmlns:p14="http://schemas.microsoft.com/office/powerpoint/2010/main" xmlns:a14="http://schemas.microsoft.com/office/drawing/2010/main" w="9525">
                     <a:solidFill>
                       <a:srgbClr val="000000"/>
                     </a:solidFill>
@@ -26827,7 +26847,7 @@
                     <a16:creationId xmlns:a16="http://schemas.microsoft.com/office/drawing/2014/main" id="{062EE710-0210-4840-8698-E0DF1C617007}"/>
                   </a:ext>
                   <a:ext uri="{C183D7F6-B498-43B3-948B-1728B52AA6E4}">
-                    <adec:decorative xmlns:adec="http://schemas.microsoft.com/office/drawing/2017/decorative" val="1"/>
+                    <adec:decorative xmlns:adec="http://schemas.microsoft.com/office/drawing/2017/decorative" xmlns="" val="1"/>
                   </a:ext>
                 </a:extLst>
               </p:cNvPr>
@@ -26884,7 +26904,7 @@
               </a:ln>
               <a:extLst>
                 <a:ext uri="{91240B29-F687-4f45-9708-019B960494DF}">
-                  <a14:hiddenLine xmlns:a14="http://schemas.microsoft.com/office/drawing/2010/main" xmlns:p14="http://schemas.microsoft.com/office/powerpoint/2010/main" xmlns:a16="http://schemas.microsoft.com/office/drawing/2014/main" xmlns="" w="9525">
+                  <a14:hiddenLine xmlns="" xmlns:a16="http://schemas.microsoft.com/office/drawing/2014/main" xmlns:p14="http://schemas.microsoft.com/office/powerpoint/2010/main" xmlns:a14="http://schemas.microsoft.com/office/drawing/2010/main" w="9525">
                     <a:solidFill>
                       <a:srgbClr val="000000"/>
                     </a:solidFill>
@@ -26904,7 +26924,7 @@
                     <a16:creationId xmlns:a16="http://schemas.microsoft.com/office/drawing/2014/main" id="{161892F4-6071-40CD-8E18-CDEE0C91B586}"/>
                   </a:ext>
                   <a:ext uri="{C183D7F6-B498-43B3-948B-1728B52AA6E4}">
-                    <adec:decorative xmlns:adec="http://schemas.microsoft.com/office/drawing/2017/decorative" val="1"/>
+                    <adec:decorative xmlns:adec="http://schemas.microsoft.com/office/drawing/2017/decorative" xmlns="" val="1"/>
                   </a:ext>
                 </a:extLst>
               </p:cNvPr>
@@ -27009,7 +27029,7 @@
               </a:ln>
               <a:extLst>
                 <a:ext uri="{91240B29-F687-4f45-9708-019B960494DF}">
-                  <a14:hiddenLine xmlns:a14="http://schemas.microsoft.com/office/drawing/2010/main" xmlns:p14="http://schemas.microsoft.com/office/powerpoint/2010/main" xmlns:a16="http://schemas.microsoft.com/office/drawing/2014/main" xmlns="" w="9525">
+                  <a14:hiddenLine xmlns="" xmlns:a16="http://schemas.microsoft.com/office/drawing/2014/main" xmlns:p14="http://schemas.microsoft.com/office/powerpoint/2010/main" xmlns:a14="http://schemas.microsoft.com/office/drawing/2010/main" w="9525">
                     <a:solidFill>
                       <a:srgbClr val="000000"/>
                     </a:solidFill>
@@ -27029,7 +27049,7 @@
                     <a16:creationId xmlns:a16="http://schemas.microsoft.com/office/drawing/2014/main" id="{3E6BBE44-8D88-407D-B1C6-10C89DD6173B}"/>
                   </a:ext>
                   <a:ext uri="{C183D7F6-B498-43B3-948B-1728B52AA6E4}">
-                    <adec:decorative xmlns:adec="http://schemas.microsoft.com/office/drawing/2017/decorative" val="1"/>
+                    <adec:decorative xmlns:adec="http://schemas.microsoft.com/office/drawing/2017/decorative" xmlns="" val="1"/>
                   </a:ext>
                 </a:extLst>
               </p:cNvPr>
@@ -27072,7 +27092,7 @@
                     <a16:creationId xmlns:a16="http://schemas.microsoft.com/office/drawing/2014/main" id="{1E90AE6E-328E-4730-825C-B5130F5CFCA4}"/>
                   </a:ext>
                   <a:ext uri="{C183D7F6-B498-43B3-948B-1728B52AA6E4}">
-                    <adec:decorative xmlns:adec="http://schemas.microsoft.com/office/drawing/2017/decorative" val="1"/>
+                    <adec:decorative xmlns:adec="http://schemas.microsoft.com/office/drawing/2017/decorative" xmlns="" val="1"/>
                   </a:ext>
                 </a:extLst>
               </p:cNvPr>
@@ -27123,7 +27143,7 @@
               </a:ln>
               <a:extLst>
                 <a:ext uri="{91240B29-F687-4f45-9708-019B960494DF}">
-                  <a14:hiddenLine xmlns:a14="http://schemas.microsoft.com/office/drawing/2010/main" xmlns:p14="http://schemas.microsoft.com/office/powerpoint/2010/main" xmlns:a16="http://schemas.microsoft.com/office/drawing/2014/main" xmlns="" w="9525">
+                  <a14:hiddenLine xmlns="" xmlns:a16="http://schemas.microsoft.com/office/drawing/2014/main" xmlns:p14="http://schemas.microsoft.com/office/powerpoint/2010/main" xmlns:a14="http://schemas.microsoft.com/office/drawing/2010/main" w="9525">
                     <a:solidFill>
                       <a:srgbClr val="000000"/>
                     </a:solidFill>
@@ -27143,7 +27163,7 @@
                     <a16:creationId xmlns:a16="http://schemas.microsoft.com/office/drawing/2014/main" id="{24EC969F-6E4A-4163-ABDA-4674429A3DC2}"/>
                   </a:ext>
                   <a:ext uri="{C183D7F6-B498-43B3-948B-1728B52AA6E4}">
-                    <adec:decorative xmlns:adec="http://schemas.microsoft.com/office/drawing/2017/decorative" val="1"/>
+                    <adec:decorative xmlns:adec="http://schemas.microsoft.com/office/drawing/2017/decorative" xmlns="" val="1"/>
                   </a:ext>
                 </a:extLst>
               </p:cNvPr>
@@ -27200,7 +27220,7 @@
               </a:ln>
               <a:extLst>
                 <a:ext uri="{91240B29-F687-4f45-9708-019B960494DF}">
-                  <a14:hiddenLine xmlns:a14="http://schemas.microsoft.com/office/drawing/2010/main" xmlns:p14="http://schemas.microsoft.com/office/powerpoint/2010/main" xmlns:a16="http://schemas.microsoft.com/office/drawing/2014/main" xmlns="" w="9525">
+                  <a14:hiddenLine xmlns="" xmlns:a16="http://schemas.microsoft.com/office/drawing/2014/main" xmlns:p14="http://schemas.microsoft.com/office/powerpoint/2010/main" xmlns:a14="http://schemas.microsoft.com/office/drawing/2010/main" w="9525">
                     <a:solidFill>
                       <a:srgbClr val="000000"/>
                     </a:solidFill>
@@ -27220,7 +27240,7 @@
                     <a16:creationId xmlns:a16="http://schemas.microsoft.com/office/drawing/2014/main" id="{1B735C94-B049-42C6-9DEF-5DB70D58CE4B}"/>
                   </a:ext>
                   <a:ext uri="{C183D7F6-B498-43B3-948B-1728B52AA6E4}">
-                    <adec:decorative xmlns:adec="http://schemas.microsoft.com/office/drawing/2017/decorative" val="1"/>
+                    <adec:decorative xmlns:adec="http://schemas.microsoft.com/office/drawing/2017/decorative" xmlns="" val="1"/>
                   </a:ext>
                 </a:extLst>
               </p:cNvPr>
@@ -27277,7 +27297,7 @@
               </a:ln>
               <a:extLst>
                 <a:ext uri="{91240B29-F687-4f45-9708-019B960494DF}">
-                  <a14:hiddenLine xmlns:a14="http://schemas.microsoft.com/office/drawing/2010/main" xmlns:p14="http://schemas.microsoft.com/office/powerpoint/2010/main" xmlns:a16="http://schemas.microsoft.com/office/drawing/2014/main" xmlns="" w="9525">
+                  <a14:hiddenLine xmlns="" xmlns:a16="http://schemas.microsoft.com/office/drawing/2014/main" xmlns:p14="http://schemas.microsoft.com/office/powerpoint/2010/main" xmlns:a14="http://schemas.microsoft.com/office/drawing/2010/main" w="9525">
                     <a:solidFill>
                       <a:srgbClr val="000000"/>
                     </a:solidFill>
@@ -27297,7 +27317,7 @@
                     <a16:creationId xmlns:a16="http://schemas.microsoft.com/office/drawing/2014/main" id="{051C02E6-1954-478B-AEAE-BF8F36BE9417}"/>
                   </a:ext>
                   <a:ext uri="{C183D7F6-B498-43B3-948B-1728B52AA6E4}">
-                    <adec:decorative xmlns:adec="http://schemas.microsoft.com/office/drawing/2017/decorative" val="1"/>
+                    <adec:decorative xmlns:adec="http://schemas.microsoft.com/office/drawing/2017/decorative" xmlns="" val="1"/>
                   </a:ext>
                 </a:extLst>
               </p:cNvPr>
@@ -27382,7 +27402,7 @@
               </a:ln>
               <a:extLst>
                 <a:ext uri="{91240B29-F687-4f45-9708-019B960494DF}">
-                  <a14:hiddenLine xmlns:a14="http://schemas.microsoft.com/office/drawing/2010/main" xmlns:p14="http://schemas.microsoft.com/office/powerpoint/2010/main" xmlns:a16="http://schemas.microsoft.com/office/drawing/2014/main" xmlns="" w="9525">
+                  <a14:hiddenLine xmlns="" xmlns:a16="http://schemas.microsoft.com/office/drawing/2014/main" xmlns:p14="http://schemas.microsoft.com/office/powerpoint/2010/main" xmlns:a14="http://schemas.microsoft.com/office/drawing/2010/main" w="9525">
                     <a:solidFill>
                       <a:srgbClr val="000000"/>
                     </a:solidFill>
@@ -27402,7 +27422,7 @@
                     <a16:creationId xmlns:a16="http://schemas.microsoft.com/office/drawing/2014/main" id="{6710B1C0-310A-48D0-B824-459D9AFC2FBC}"/>
                   </a:ext>
                   <a:ext uri="{C183D7F6-B498-43B3-948B-1728B52AA6E4}">
-                    <adec:decorative xmlns:adec="http://schemas.microsoft.com/office/drawing/2017/decorative" val="1"/>
+                    <adec:decorative xmlns:adec="http://schemas.microsoft.com/office/drawing/2017/decorative" xmlns="" val="1"/>
                   </a:ext>
                 </a:extLst>
               </p:cNvPr>
@@ -27431,7 +27451,7 @@
               </a:ln>
               <a:extLst>
                 <a:ext uri="{91240B29-F687-4f45-9708-019B960494DF}">
-                  <a14:hiddenLine xmlns:a14="http://schemas.microsoft.com/office/drawing/2010/main" xmlns:p14="http://schemas.microsoft.com/office/powerpoint/2010/main" xmlns:a16="http://schemas.microsoft.com/office/drawing/2014/main" xmlns="" w="9525">
+                  <a14:hiddenLine xmlns="" xmlns:a16="http://schemas.microsoft.com/office/drawing/2014/main" xmlns:p14="http://schemas.microsoft.com/office/powerpoint/2010/main" xmlns:a14="http://schemas.microsoft.com/office/drawing/2010/main" w="9525">
                     <a:solidFill>
                       <a:srgbClr val="000000"/>
                     </a:solidFill>
@@ -27451,7 +27471,7 @@
                     <a16:creationId xmlns:a16="http://schemas.microsoft.com/office/drawing/2014/main" id="{1204A606-D9A6-4DC6-9F0E-D516EA1EB957}"/>
                   </a:ext>
                   <a:ext uri="{C183D7F6-B498-43B3-948B-1728B52AA6E4}">
-                    <adec:decorative xmlns:adec="http://schemas.microsoft.com/office/drawing/2017/decorative" val="1"/>
+                    <adec:decorative xmlns:adec="http://schemas.microsoft.com/office/drawing/2017/decorative" xmlns="" val="1"/>
                   </a:ext>
                 </a:extLst>
               </p:cNvPr>
@@ -27511,7 +27531,7 @@
               </a:ln>
               <a:extLst>
                 <a:ext uri="{91240B29-F687-4f45-9708-019B960494DF}">
-                  <a14:hiddenLine xmlns:a14="http://schemas.microsoft.com/office/drawing/2010/main" xmlns:p14="http://schemas.microsoft.com/office/powerpoint/2010/main" xmlns:a16="http://schemas.microsoft.com/office/drawing/2014/main" xmlns="" w="9525">
+                  <a14:hiddenLine xmlns="" xmlns:a16="http://schemas.microsoft.com/office/drawing/2014/main" xmlns:p14="http://schemas.microsoft.com/office/powerpoint/2010/main" xmlns:a14="http://schemas.microsoft.com/office/drawing/2010/main" w="9525">
                     <a:solidFill>
                       <a:srgbClr val="000000"/>
                     </a:solidFill>
@@ -27531,7 +27551,7 @@
                     <a16:creationId xmlns:a16="http://schemas.microsoft.com/office/drawing/2014/main" id="{EE569555-0243-4979-A537-C9B4AFD5F258}"/>
                   </a:ext>
                   <a:ext uri="{C183D7F6-B498-43B3-948B-1728B52AA6E4}">
-                    <adec:decorative xmlns:adec="http://schemas.microsoft.com/office/drawing/2017/decorative" val="1"/>
+                    <adec:decorative xmlns:adec="http://schemas.microsoft.com/office/drawing/2017/decorative" xmlns="" val="1"/>
                   </a:ext>
                 </a:extLst>
               </p:cNvPr>
@@ -27616,7 +27636,7 @@
               </a:ln>
               <a:extLst>
                 <a:ext uri="{91240B29-F687-4f45-9708-019B960494DF}">
-                  <a14:hiddenLine xmlns:a14="http://schemas.microsoft.com/office/drawing/2010/main" xmlns:p14="http://schemas.microsoft.com/office/powerpoint/2010/main" xmlns:a16="http://schemas.microsoft.com/office/drawing/2014/main" xmlns="" w="9525">
+                  <a14:hiddenLine xmlns="" xmlns:a16="http://schemas.microsoft.com/office/drawing/2014/main" xmlns:p14="http://schemas.microsoft.com/office/powerpoint/2010/main" xmlns:a14="http://schemas.microsoft.com/office/drawing/2010/main" w="9525">
                     <a:solidFill>
                       <a:srgbClr val="000000"/>
                     </a:solidFill>
@@ -27636,7 +27656,7 @@
                     <a16:creationId xmlns:a16="http://schemas.microsoft.com/office/drawing/2014/main" id="{D52A977D-4993-48AF-A792-F2DE09639149}"/>
                   </a:ext>
                   <a:ext uri="{C183D7F6-B498-43B3-948B-1728B52AA6E4}">
-                    <adec:decorative xmlns:adec="http://schemas.microsoft.com/office/drawing/2017/decorative" val="1"/>
+                    <adec:decorative xmlns:adec="http://schemas.microsoft.com/office/drawing/2017/decorative" xmlns="" val="1"/>
                   </a:ext>
                 </a:extLst>
               </p:cNvPr>
@@ -27693,7 +27713,7 @@
               </a:ln>
               <a:extLst>
                 <a:ext uri="{91240B29-F687-4f45-9708-019B960494DF}">
-                  <a14:hiddenLine xmlns:a14="http://schemas.microsoft.com/office/drawing/2010/main" xmlns:p14="http://schemas.microsoft.com/office/powerpoint/2010/main" xmlns:a16="http://schemas.microsoft.com/office/drawing/2014/main" xmlns="" w="9525">
+                  <a14:hiddenLine xmlns="" xmlns:a16="http://schemas.microsoft.com/office/drawing/2014/main" xmlns:p14="http://schemas.microsoft.com/office/powerpoint/2010/main" xmlns:a14="http://schemas.microsoft.com/office/drawing/2010/main" w="9525">
                     <a:solidFill>
                       <a:srgbClr val="000000"/>
                     </a:solidFill>
@@ -27713,7 +27733,7 @@
                     <a16:creationId xmlns:a16="http://schemas.microsoft.com/office/drawing/2014/main" id="{93CFF2DC-E52E-4D99-97D5-B0D7B792E50A}"/>
                   </a:ext>
                   <a:ext uri="{C183D7F6-B498-43B3-948B-1728B52AA6E4}">
-                    <adec:decorative xmlns:adec="http://schemas.microsoft.com/office/drawing/2017/decorative" val="1"/>
+                    <adec:decorative xmlns:adec="http://schemas.microsoft.com/office/drawing/2017/decorative" xmlns="" val="1"/>
                   </a:ext>
                 </a:extLst>
               </p:cNvPr>
@@ -27798,7 +27818,7 @@
               </a:ln>
               <a:extLst>
                 <a:ext uri="{91240B29-F687-4f45-9708-019B960494DF}">
-                  <a14:hiddenLine xmlns:a14="http://schemas.microsoft.com/office/drawing/2010/main" xmlns:p14="http://schemas.microsoft.com/office/powerpoint/2010/main" xmlns:a16="http://schemas.microsoft.com/office/drawing/2014/main" xmlns="" w="9525">
+                  <a14:hiddenLine xmlns="" xmlns:a16="http://schemas.microsoft.com/office/drawing/2014/main" xmlns:p14="http://schemas.microsoft.com/office/powerpoint/2010/main" xmlns:a14="http://schemas.microsoft.com/office/drawing/2010/main" w="9525">
                     <a:solidFill>
                       <a:srgbClr val="000000"/>
                     </a:solidFill>
@@ -27818,7 +27838,7 @@
                     <a16:creationId xmlns:a16="http://schemas.microsoft.com/office/drawing/2014/main" id="{5E175372-AF09-42A7-B3D0-226C83489170}"/>
                   </a:ext>
                   <a:ext uri="{C183D7F6-B498-43B3-948B-1728B52AA6E4}">
-                    <adec:decorative xmlns:adec="http://schemas.microsoft.com/office/drawing/2017/decorative" val="1"/>
+                    <adec:decorative xmlns:adec="http://schemas.microsoft.com/office/drawing/2017/decorative" xmlns="" val="1"/>
                   </a:ext>
                 </a:extLst>
               </p:cNvPr>
@@ -27878,7 +27898,7 @@
               </a:ln>
               <a:extLst>
                 <a:ext uri="{91240B29-F687-4f45-9708-019B960494DF}">
-                  <a14:hiddenLine xmlns:a14="http://schemas.microsoft.com/office/drawing/2010/main" xmlns:p14="http://schemas.microsoft.com/office/powerpoint/2010/main" xmlns:a16="http://schemas.microsoft.com/office/drawing/2014/main" xmlns="" w="9525">
+                  <a14:hiddenLine xmlns="" xmlns:a16="http://schemas.microsoft.com/office/drawing/2014/main" xmlns:p14="http://schemas.microsoft.com/office/powerpoint/2010/main" xmlns:a14="http://schemas.microsoft.com/office/drawing/2010/main" w="9525">
                     <a:solidFill>
                       <a:srgbClr val="000000"/>
                     </a:solidFill>
@@ -27898,7 +27918,7 @@
                     <a16:creationId xmlns:a16="http://schemas.microsoft.com/office/drawing/2014/main" id="{ABF20BA9-F4B2-49EA-A573-578B1897747D}"/>
                   </a:ext>
                   <a:ext uri="{C183D7F6-B498-43B3-948B-1728B52AA6E4}">
-                    <adec:decorative xmlns:adec="http://schemas.microsoft.com/office/drawing/2017/decorative" val="1"/>
+                    <adec:decorative xmlns:adec="http://schemas.microsoft.com/office/drawing/2017/decorative" xmlns="" val="1"/>
                   </a:ext>
                 </a:extLst>
               </p:cNvPr>
@@ -27955,7 +27975,7 @@
               </a:ln>
               <a:extLst>
                 <a:ext uri="{91240B29-F687-4f45-9708-019B960494DF}">
-                  <a14:hiddenLine xmlns:a14="http://schemas.microsoft.com/office/drawing/2010/main" xmlns:p14="http://schemas.microsoft.com/office/powerpoint/2010/main" xmlns:a16="http://schemas.microsoft.com/office/drawing/2014/main" xmlns="" w="9525">
+                  <a14:hiddenLine xmlns="" xmlns:a16="http://schemas.microsoft.com/office/drawing/2014/main" xmlns:p14="http://schemas.microsoft.com/office/powerpoint/2010/main" xmlns:a14="http://schemas.microsoft.com/office/drawing/2010/main" w="9525">
                     <a:solidFill>
                       <a:srgbClr val="000000"/>
                     </a:solidFill>
@@ -27975,7 +27995,7 @@
                     <a16:creationId xmlns:a16="http://schemas.microsoft.com/office/drawing/2014/main" id="{AA3A7A4B-C811-4E23-8BFD-5823A032DA3D}"/>
                   </a:ext>
                   <a:ext uri="{C183D7F6-B498-43B3-948B-1728B52AA6E4}">
-                    <adec:decorative xmlns:adec="http://schemas.microsoft.com/office/drawing/2017/decorative" val="1"/>
+                    <adec:decorative xmlns:adec="http://schemas.microsoft.com/office/drawing/2017/decorative" xmlns="" val="1"/>
                   </a:ext>
                 </a:extLst>
               </p:cNvPr>
@@ -28060,7 +28080,7 @@
               </a:ln>
               <a:extLst>
                 <a:ext uri="{91240B29-F687-4f45-9708-019B960494DF}">
-                  <a14:hiddenLine xmlns:a14="http://schemas.microsoft.com/office/drawing/2010/main" xmlns:p14="http://schemas.microsoft.com/office/powerpoint/2010/main" xmlns:a16="http://schemas.microsoft.com/office/drawing/2014/main" xmlns="" w="9525">
+                  <a14:hiddenLine xmlns="" xmlns:a16="http://schemas.microsoft.com/office/drawing/2014/main" xmlns:p14="http://schemas.microsoft.com/office/powerpoint/2010/main" xmlns:a14="http://schemas.microsoft.com/office/drawing/2010/main" w="9525">
                     <a:solidFill>
                       <a:srgbClr val="000000"/>
                     </a:solidFill>
@@ -28080,7 +28100,7 @@
                     <a16:creationId xmlns:a16="http://schemas.microsoft.com/office/drawing/2014/main" id="{47537781-F057-4B97-AD8F-12FE9BE599A8}"/>
                   </a:ext>
                   <a:ext uri="{C183D7F6-B498-43B3-948B-1728B52AA6E4}">
-                    <adec:decorative xmlns:adec="http://schemas.microsoft.com/office/drawing/2017/decorative" val="1"/>
+                    <adec:decorative xmlns:adec="http://schemas.microsoft.com/office/drawing/2017/decorative" xmlns="" val="1"/>
                   </a:ext>
                 </a:extLst>
               </p:cNvPr>
@@ -28165,7 +28185,7 @@
               </a:ln>
               <a:extLst>
                 <a:ext uri="{91240B29-F687-4f45-9708-019B960494DF}">
-                  <a14:hiddenLine xmlns:a14="http://schemas.microsoft.com/office/drawing/2010/main" xmlns:p14="http://schemas.microsoft.com/office/powerpoint/2010/main" xmlns:a16="http://schemas.microsoft.com/office/drawing/2014/main" xmlns="" w="9525">
+                  <a14:hiddenLine xmlns="" xmlns:a16="http://schemas.microsoft.com/office/drawing/2014/main" xmlns:p14="http://schemas.microsoft.com/office/powerpoint/2010/main" xmlns:a14="http://schemas.microsoft.com/office/drawing/2010/main" w="9525">
                     <a:solidFill>
                       <a:srgbClr val="000000"/>
                     </a:solidFill>
@@ -28185,7 +28205,7 @@
                     <a16:creationId xmlns:a16="http://schemas.microsoft.com/office/drawing/2014/main" id="{078883C7-EB52-4BB7-A9A7-F8C046A8331D}"/>
                   </a:ext>
                   <a:ext uri="{C183D7F6-B498-43B3-948B-1728B52AA6E4}">
-                    <adec:decorative xmlns:adec="http://schemas.microsoft.com/office/drawing/2017/decorative" val="1"/>
+                    <adec:decorative xmlns:adec="http://schemas.microsoft.com/office/drawing/2017/decorative" xmlns="" val="1"/>
                   </a:ext>
                 </a:extLst>
               </p:cNvPr>
@@ -28245,7 +28265,7 @@
               </a:ln>
               <a:extLst>
                 <a:ext uri="{91240B29-F687-4f45-9708-019B960494DF}">
-                  <a14:hiddenLine xmlns:a14="http://schemas.microsoft.com/office/drawing/2010/main" xmlns:p14="http://schemas.microsoft.com/office/powerpoint/2010/main" xmlns:a16="http://schemas.microsoft.com/office/drawing/2014/main" xmlns="" w="9525">
+                  <a14:hiddenLine xmlns="" xmlns:a16="http://schemas.microsoft.com/office/drawing/2014/main" xmlns:p14="http://schemas.microsoft.com/office/powerpoint/2010/main" xmlns:a14="http://schemas.microsoft.com/office/drawing/2010/main" w="9525">
                     <a:solidFill>
                       <a:srgbClr val="000000"/>
                     </a:solidFill>
@@ -28265,7 +28285,7 @@
                     <a16:creationId xmlns:a16="http://schemas.microsoft.com/office/drawing/2014/main" id="{63CCBBF8-5972-4ED3-AB5B-46DC425B1772}"/>
                   </a:ext>
                   <a:ext uri="{C183D7F6-B498-43B3-948B-1728B52AA6E4}">
-                    <adec:decorative xmlns:adec="http://schemas.microsoft.com/office/drawing/2017/decorative" val="1"/>
+                    <adec:decorative xmlns:adec="http://schemas.microsoft.com/office/drawing/2017/decorative" xmlns="" val="1"/>
                   </a:ext>
                 </a:extLst>
               </p:cNvPr>
@@ -28380,7 +28400,7 @@
               </a:ln>
               <a:extLst>
                 <a:ext uri="{91240B29-F687-4f45-9708-019B960494DF}">
-                  <a14:hiddenLine xmlns:a14="http://schemas.microsoft.com/office/drawing/2010/main" xmlns:p14="http://schemas.microsoft.com/office/powerpoint/2010/main" xmlns:a16="http://schemas.microsoft.com/office/drawing/2014/main" xmlns="" w="9525">
+                  <a14:hiddenLine xmlns="" xmlns:a16="http://schemas.microsoft.com/office/drawing/2014/main" xmlns:p14="http://schemas.microsoft.com/office/powerpoint/2010/main" xmlns:a14="http://schemas.microsoft.com/office/drawing/2010/main" w="9525">
                     <a:solidFill>
                       <a:srgbClr val="000000"/>
                     </a:solidFill>
@@ -28401,7 +28421,7 @@
                   <a16:creationId xmlns:a16="http://schemas.microsoft.com/office/drawing/2014/main" id="{A8C19883-37FB-437C-A3AA-89AA6239D3A9}"/>
                 </a:ext>
                 <a:ext uri="{C183D7F6-B498-43B3-948B-1728B52AA6E4}">
-                  <adec:decorative xmlns:adec="http://schemas.microsoft.com/office/drawing/2017/decorative" val="1"/>
+                  <adec:decorative xmlns:adec="http://schemas.microsoft.com/office/drawing/2017/decorative" xmlns="" val="1"/>
                 </a:ext>
               </a:extLst>
             </p:cNvPr>
@@ -28448,7 +28468,7 @@
                     <a16:creationId xmlns:a16="http://schemas.microsoft.com/office/drawing/2014/main" id="{AF1753DD-4CEF-45EC-B952-90EA8895D7CB}"/>
                   </a:ext>
                   <a:ext uri="{C183D7F6-B498-43B3-948B-1728B52AA6E4}">
-                    <adec:decorative xmlns:adec="http://schemas.microsoft.com/office/drawing/2017/decorative" val="1"/>
+                    <adec:decorative xmlns:adec="http://schemas.microsoft.com/office/drawing/2017/decorative" xmlns="" val="1"/>
                   </a:ext>
                 </a:extLst>
               </p:cNvPr>
@@ -28508,7 +28528,7 @@
               </a:ln>
               <a:extLst>
                 <a:ext uri="{91240B29-F687-4f45-9708-019B960494DF}">
-                  <a14:hiddenLine xmlns:a14="http://schemas.microsoft.com/office/drawing/2010/main" xmlns:p14="http://schemas.microsoft.com/office/powerpoint/2010/main" xmlns:a16="http://schemas.microsoft.com/office/drawing/2014/main" xmlns="" w="9525">
+                  <a14:hiddenLine xmlns="" xmlns:a16="http://schemas.microsoft.com/office/drawing/2014/main" xmlns:p14="http://schemas.microsoft.com/office/powerpoint/2010/main" xmlns:a14="http://schemas.microsoft.com/office/drawing/2010/main" w="9525">
                     <a:solidFill>
                       <a:srgbClr val="000000"/>
                     </a:solidFill>
@@ -28528,7 +28548,7 @@
                     <a16:creationId xmlns:a16="http://schemas.microsoft.com/office/drawing/2014/main" id="{5B9356DB-C1BE-4D76-8FA7-4FBAA12D1D33}"/>
                   </a:ext>
                   <a:ext uri="{C183D7F6-B498-43B3-948B-1728B52AA6E4}">
-                    <adec:decorative xmlns:adec="http://schemas.microsoft.com/office/drawing/2017/decorative" val="1"/>
+                    <adec:decorative xmlns:adec="http://schemas.microsoft.com/office/drawing/2017/decorative" xmlns="" val="1"/>
                   </a:ext>
                 </a:extLst>
               </p:cNvPr>
@@ -28638,7 +28658,7 @@
               </a:ln>
               <a:extLst>
                 <a:ext uri="{91240B29-F687-4f45-9708-019B960494DF}">
-                  <a14:hiddenLine xmlns:a14="http://schemas.microsoft.com/office/drawing/2010/main" xmlns:p14="http://schemas.microsoft.com/office/powerpoint/2010/main" xmlns:a16="http://schemas.microsoft.com/office/drawing/2014/main" xmlns="" w="9525">
+                  <a14:hiddenLine xmlns="" xmlns:a16="http://schemas.microsoft.com/office/drawing/2014/main" xmlns:p14="http://schemas.microsoft.com/office/powerpoint/2010/main" xmlns:a14="http://schemas.microsoft.com/office/drawing/2010/main" w="9525">
                     <a:solidFill>
                       <a:srgbClr val="000000"/>
                     </a:solidFill>
@@ -28658,7 +28678,7 @@
                     <a16:creationId xmlns:a16="http://schemas.microsoft.com/office/drawing/2014/main" id="{C4F59561-572D-42BA-A6FD-F3AFA1A394DD}"/>
                   </a:ext>
                   <a:ext uri="{C183D7F6-B498-43B3-948B-1728B52AA6E4}">
-                    <adec:decorative xmlns:adec="http://schemas.microsoft.com/office/drawing/2017/decorative" val="1"/>
+                    <adec:decorative xmlns:adec="http://schemas.microsoft.com/office/drawing/2017/decorative" xmlns="" val="1"/>
                   </a:ext>
                 </a:extLst>
               </p:cNvPr>
@@ -28743,7 +28763,7 @@
               </a:ln>
               <a:extLst>
                 <a:ext uri="{91240B29-F687-4f45-9708-019B960494DF}">
-                  <a14:hiddenLine xmlns:a14="http://schemas.microsoft.com/office/drawing/2010/main" xmlns:p14="http://schemas.microsoft.com/office/powerpoint/2010/main" xmlns:a16="http://schemas.microsoft.com/office/drawing/2014/main" xmlns="" w="9525">
+                  <a14:hiddenLine xmlns="" xmlns:a16="http://schemas.microsoft.com/office/drawing/2014/main" xmlns:p14="http://schemas.microsoft.com/office/powerpoint/2010/main" xmlns:a14="http://schemas.microsoft.com/office/drawing/2010/main" w="9525">
                     <a:solidFill>
                       <a:srgbClr val="000000"/>
                     </a:solidFill>
@@ -28763,7 +28783,7 @@
                     <a16:creationId xmlns:a16="http://schemas.microsoft.com/office/drawing/2014/main" id="{BB7A51A1-D509-4494-BAE2-1B96CAD4DB37}"/>
                   </a:ext>
                   <a:ext uri="{C183D7F6-B498-43B3-948B-1728B52AA6E4}">
-                    <adec:decorative xmlns:adec="http://schemas.microsoft.com/office/drawing/2017/decorative" val="1"/>
+                    <adec:decorative xmlns:adec="http://schemas.microsoft.com/office/drawing/2017/decorative" xmlns="" val="1"/>
                   </a:ext>
                 </a:extLst>
               </p:cNvPr>
@@ -28823,7 +28843,7 @@
               </a:ln>
               <a:extLst>
                 <a:ext uri="{91240B29-F687-4f45-9708-019B960494DF}">
-                  <a14:hiddenLine xmlns:a14="http://schemas.microsoft.com/office/drawing/2010/main" xmlns:p14="http://schemas.microsoft.com/office/powerpoint/2010/main" xmlns:a16="http://schemas.microsoft.com/office/drawing/2014/main" xmlns="" w="9525">
+                  <a14:hiddenLine xmlns="" xmlns:a16="http://schemas.microsoft.com/office/drawing/2014/main" xmlns:p14="http://schemas.microsoft.com/office/powerpoint/2010/main" xmlns:a14="http://schemas.microsoft.com/office/drawing/2010/main" w="9525">
                     <a:solidFill>
                       <a:srgbClr val="000000"/>
                     </a:solidFill>
@@ -28843,7 +28863,7 @@
                     <a16:creationId xmlns:a16="http://schemas.microsoft.com/office/drawing/2014/main" id="{D3FE0B5A-55DE-4E56-8E9B-B92D1DB9A894}"/>
                   </a:ext>
                   <a:ext uri="{C183D7F6-B498-43B3-948B-1728B52AA6E4}">
-                    <adec:decorative xmlns:adec="http://schemas.microsoft.com/office/drawing/2017/decorative" val="1"/>
+                    <adec:decorative xmlns:adec="http://schemas.microsoft.com/office/drawing/2017/decorative" xmlns="" val="1"/>
                   </a:ext>
                 </a:extLst>
               </p:cNvPr>
@@ -28928,7 +28948,7 @@
               </a:ln>
               <a:extLst>
                 <a:ext uri="{91240B29-F687-4f45-9708-019B960494DF}">
-                  <a14:hiddenLine xmlns:a14="http://schemas.microsoft.com/office/drawing/2010/main" xmlns:p14="http://schemas.microsoft.com/office/powerpoint/2010/main" xmlns:a16="http://schemas.microsoft.com/office/drawing/2014/main" xmlns="" w="9525">
+                  <a14:hiddenLine xmlns="" xmlns:a16="http://schemas.microsoft.com/office/drawing/2014/main" xmlns:p14="http://schemas.microsoft.com/office/powerpoint/2010/main" xmlns:a14="http://schemas.microsoft.com/office/drawing/2010/main" w="9525">
                     <a:solidFill>
                       <a:srgbClr val="000000"/>
                     </a:solidFill>
@@ -28948,7 +28968,7 @@
                     <a16:creationId xmlns:a16="http://schemas.microsoft.com/office/drawing/2014/main" id="{F125661C-3A0E-4B6E-B2AB-1B08C8925175}"/>
                   </a:ext>
                   <a:ext uri="{C183D7F6-B498-43B3-948B-1728B52AA6E4}">
-                    <adec:decorative xmlns:adec="http://schemas.microsoft.com/office/drawing/2017/decorative" val="1"/>
+                    <adec:decorative xmlns:adec="http://schemas.microsoft.com/office/drawing/2017/decorative" xmlns="" val="1"/>
                   </a:ext>
                 </a:extLst>
               </p:cNvPr>
@@ -29011,7 +29031,7 @@
               </a:ln>
               <a:extLst>
                 <a:ext uri="{91240B29-F687-4f45-9708-019B960494DF}">
-                  <a14:hiddenLine xmlns:a14="http://schemas.microsoft.com/office/drawing/2010/main" xmlns:p14="http://schemas.microsoft.com/office/powerpoint/2010/main" xmlns:a16="http://schemas.microsoft.com/office/drawing/2014/main" xmlns="" w="9525">
+                  <a14:hiddenLine xmlns="" xmlns:a16="http://schemas.microsoft.com/office/drawing/2014/main" xmlns:p14="http://schemas.microsoft.com/office/powerpoint/2010/main" xmlns:a14="http://schemas.microsoft.com/office/drawing/2010/main" w="9525">
                     <a:solidFill>
                       <a:srgbClr val="000000"/>
                     </a:solidFill>
@@ -29031,7 +29051,7 @@
                     <a16:creationId xmlns:a16="http://schemas.microsoft.com/office/drawing/2014/main" id="{39304006-EE77-438A-A0D1-537322356C1F}"/>
                   </a:ext>
                   <a:ext uri="{C183D7F6-B498-43B3-948B-1728B52AA6E4}">
-                    <adec:decorative xmlns:adec="http://schemas.microsoft.com/office/drawing/2017/decorative" val="1"/>
+                    <adec:decorative xmlns:adec="http://schemas.microsoft.com/office/drawing/2017/decorative" xmlns="" val="1"/>
                   </a:ext>
                 </a:extLst>
               </p:cNvPr>
@@ -29116,7 +29136,7 @@
               </a:ln>
               <a:extLst>
                 <a:ext uri="{91240B29-F687-4f45-9708-019B960494DF}">
-                  <a14:hiddenLine xmlns:a14="http://schemas.microsoft.com/office/drawing/2010/main" xmlns:p14="http://schemas.microsoft.com/office/powerpoint/2010/main" xmlns:a16="http://schemas.microsoft.com/office/drawing/2014/main" xmlns="" w="9525">
+                  <a14:hiddenLine xmlns="" xmlns:a16="http://schemas.microsoft.com/office/drawing/2014/main" xmlns:p14="http://schemas.microsoft.com/office/powerpoint/2010/main" xmlns:a14="http://schemas.microsoft.com/office/drawing/2010/main" w="9525">
                     <a:solidFill>
                       <a:srgbClr val="000000"/>
                     </a:solidFill>
@@ -29136,7 +29156,7 @@
                     <a16:creationId xmlns:a16="http://schemas.microsoft.com/office/drawing/2014/main" id="{C6031DEB-4109-4049-82CF-DD06483A2CA1}"/>
                   </a:ext>
                   <a:ext uri="{C183D7F6-B498-43B3-948B-1728B52AA6E4}">
-                    <adec:decorative xmlns:adec="http://schemas.microsoft.com/office/drawing/2017/decorative" val="1"/>
+                    <adec:decorative xmlns:adec="http://schemas.microsoft.com/office/drawing/2017/decorative" xmlns="" val="1"/>
                   </a:ext>
                 </a:extLst>
               </p:cNvPr>
@@ -29199,7 +29219,7 @@
               </a:ln>
               <a:extLst>
                 <a:ext uri="{91240B29-F687-4f45-9708-019B960494DF}">
-                  <a14:hiddenLine xmlns:a14="http://schemas.microsoft.com/office/drawing/2010/main" xmlns:p14="http://schemas.microsoft.com/office/powerpoint/2010/main" xmlns:a16="http://schemas.microsoft.com/office/drawing/2014/main" xmlns="" w="9525">
+                  <a14:hiddenLine xmlns="" xmlns:a16="http://schemas.microsoft.com/office/drawing/2014/main" xmlns:p14="http://schemas.microsoft.com/office/powerpoint/2010/main" xmlns:a14="http://schemas.microsoft.com/office/drawing/2010/main" w="9525">
                     <a:solidFill>
                       <a:srgbClr val="000000"/>
                     </a:solidFill>
@@ -29219,7 +29239,7 @@
                     <a16:creationId xmlns:a16="http://schemas.microsoft.com/office/drawing/2014/main" id="{65FC2657-18D6-4490-88D6-32E6B1C6FB15}"/>
                   </a:ext>
                   <a:ext uri="{C183D7F6-B498-43B3-948B-1728B52AA6E4}">
-                    <adec:decorative xmlns:adec="http://schemas.microsoft.com/office/drawing/2017/decorative" val="1"/>
+                    <adec:decorative xmlns:adec="http://schemas.microsoft.com/office/drawing/2017/decorative" xmlns="" val="1"/>
                   </a:ext>
                 </a:extLst>
               </p:cNvPr>
@@ -29304,7 +29324,7 @@
               </a:ln>
               <a:extLst>
                 <a:ext uri="{91240B29-F687-4f45-9708-019B960494DF}">
-                  <a14:hiddenLine xmlns:a14="http://schemas.microsoft.com/office/drawing/2010/main" xmlns:p14="http://schemas.microsoft.com/office/powerpoint/2010/main" xmlns:a16="http://schemas.microsoft.com/office/drawing/2014/main" xmlns="" w="9525">
+                  <a14:hiddenLine xmlns="" xmlns:a16="http://schemas.microsoft.com/office/drawing/2014/main" xmlns:p14="http://schemas.microsoft.com/office/powerpoint/2010/main" xmlns:a14="http://schemas.microsoft.com/office/drawing/2010/main" w="9525">
                     <a:solidFill>
                       <a:srgbClr val="000000"/>
                     </a:solidFill>
@@ -29324,7 +29344,7 @@
                     <a16:creationId xmlns:a16="http://schemas.microsoft.com/office/drawing/2014/main" id="{20BEA03B-3EAD-4FA2-BC9D-25A14D635CF6}"/>
                   </a:ext>
                   <a:ext uri="{C183D7F6-B498-43B3-948B-1728B52AA6E4}">
-                    <adec:decorative xmlns:adec="http://schemas.microsoft.com/office/drawing/2017/decorative" val="1"/>
+                    <adec:decorative xmlns:adec="http://schemas.microsoft.com/office/drawing/2017/decorative" xmlns="" val="1"/>
                   </a:ext>
                 </a:extLst>
               </p:cNvPr>
@@ -29353,7 +29373,7 @@
               </a:ln>
               <a:extLst>
                 <a:ext uri="{91240B29-F687-4f45-9708-019B960494DF}">
-                  <a14:hiddenLine xmlns:a14="http://schemas.microsoft.com/office/drawing/2010/main" xmlns:p14="http://schemas.microsoft.com/office/powerpoint/2010/main" xmlns:a16="http://schemas.microsoft.com/office/drawing/2014/main" xmlns="" w="9525">
+                  <a14:hiddenLine xmlns="" xmlns:a16="http://schemas.microsoft.com/office/drawing/2014/main" xmlns:p14="http://schemas.microsoft.com/office/powerpoint/2010/main" xmlns:a14="http://schemas.microsoft.com/office/drawing/2010/main" w="9525">
                     <a:solidFill>
                       <a:srgbClr val="000000"/>
                     </a:solidFill>
@@ -29375,7 +29395,7 @@
                 <a16:creationId xmlns:a16="http://schemas.microsoft.com/office/drawing/2014/main" id="{3CBA50DB-DBC7-4B6E-B3C1-8FF1EA519791}"/>
               </a:ext>
               <a:ext uri="{C183D7F6-B498-43B3-948B-1728B52AA6E4}">
-                <adec:decorative xmlns:adec="http://schemas.microsoft.com/office/drawing/2017/decorative" val="1"/>
+                <adec:decorative xmlns:adec="http://schemas.microsoft.com/office/drawing/2017/decorative" xmlns="" val="1"/>
               </a:ext>
             </a:extLst>
           </p:cNvPr>
@@ -29435,7 +29455,7 @@
                 <a16:creationId xmlns:a16="http://schemas.microsoft.com/office/drawing/2014/main" id="{1DED8FB6-AF8D-4D98-913D-E6486FEC1021}"/>
               </a:ext>
               <a:ext uri="{C183D7F6-B498-43B3-948B-1728B52AA6E4}">
-                <adec:decorative xmlns:adec="http://schemas.microsoft.com/office/drawing/2017/decorative" val="1"/>
+                <adec:decorative xmlns:adec="http://schemas.microsoft.com/office/drawing/2017/decorative" xmlns="" val="1"/>
               </a:ext>
             </a:extLst>
           </p:cNvPr>
@@ -29466,7 +29486,7 @@
                   <a16:creationId xmlns:a16="http://schemas.microsoft.com/office/drawing/2014/main" id="{0A805ED2-113B-4584-8827-567B5792F1FA}"/>
                 </a:ext>
                 <a:ext uri="{C183D7F6-B498-43B3-948B-1728B52AA6E4}">
-                  <adec:decorative xmlns:adec="http://schemas.microsoft.com/office/drawing/2017/decorative" val="1"/>
+                  <adec:decorative xmlns:adec="http://schemas.microsoft.com/office/drawing/2017/decorative" xmlns="" val="1"/>
                 </a:ext>
               </a:extLst>
             </p:cNvPr>
@@ -29510,7 +29530,7 @@
                     <a16:creationId xmlns:a16="http://schemas.microsoft.com/office/drawing/2014/main" id="{C6CF21D8-CC72-4F35-A29E-3AF9E6DA1302}"/>
                   </a:ext>
                   <a:ext uri="{C183D7F6-B498-43B3-948B-1728B52AA6E4}">
-                    <adec:decorative xmlns:adec="http://schemas.microsoft.com/office/drawing/2017/decorative" val="1"/>
+                    <adec:decorative xmlns:adec="http://schemas.microsoft.com/office/drawing/2017/decorative" xmlns="" val="1"/>
                   </a:ext>
                 </a:extLst>
               </p:cNvPr>
@@ -29539,7 +29559,7 @@
               </a:ln>
               <a:extLst>
                 <a:ext uri="{91240B29-F687-4f45-9708-019B960494DF}">
-                  <a14:hiddenLine xmlns:a14="http://schemas.microsoft.com/office/drawing/2010/main" xmlns:p14="http://schemas.microsoft.com/office/powerpoint/2010/main" xmlns:a16="http://schemas.microsoft.com/office/drawing/2014/main" xmlns="" w="9525">
+                  <a14:hiddenLine xmlns="" xmlns:a16="http://schemas.microsoft.com/office/drawing/2014/main" xmlns:p14="http://schemas.microsoft.com/office/powerpoint/2010/main" xmlns:a14="http://schemas.microsoft.com/office/drawing/2010/main" w="9525">
                     <a:solidFill>
                       <a:srgbClr val="000000"/>
                     </a:solidFill>
@@ -29559,7 +29579,7 @@
                     <a16:creationId xmlns:a16="http://schemas.microsoft.com/office/drawing/2014/main" id="{8E60A7C3-087D-47B4-AB5A-C8B1042FD201}"/>
                   </a:ext>
                   <a:ext uri="{C183D7F6-B498-43B3-948B-1728B52AA6E4}">
-                    <adec:decorative xmlns:adec="http://schemas.microsoft.com/office/drawing/2017/decorative" val="1"/>
+                    <adec:decorative xmlns:adec="http://schemas.microsoft.com/office/drawing/2017/decorative" xmlns="" val="1"/>
                   </a:ext>
                 </a:extLst>
               </p:cNvPr>
@@ -29644,7 +29664,7 @@
               </a:ln>
               <a:extLst>
                 <a:ext uri="{91240B29-F687-4f45-9708-019B960494DF}">
-                  <a14:hiddenLine xmlns:a14="http://schemas.microsoft.com/office/drawing/2010/main" xmlns:p14="http://schemas.microsoft.com/office/powerpoint/2010/main" xmlns:a16="http://schemas.microsoft.com/office/drawing/2014/main" xmlns="" w="9525">
+                  <a14:hiddenLine xmlns="" xmlns:a16="http://schemas.microsoft.com/office/drawing/2014/main" xmlns:p14="http://schemas.microsoft.com/office/powerpoint/2010/main" xmlns:a14="http://schemas.microsoft.com/office/drawing/2010/main" w="9525">
                     <a:solidFill>
                       <a:srgbClr val="000000"/>
                     </a:solidFill>
@@ -29664,7 +29684,7 @@
                     <a16:creationId xmlns:a16="http://schemas.microsoft.com/office/drawing/2014/main" id="{1885EECE-F6D9-4128-BC90-01583BF2699D}"/>
                   </a:ext>
                   <a:ext uri="{C183D7F6-B498-43B3-948B-1728B52AA6E4}">
-                    <adec:decorative xmlns:adec="http://schemas.microsoft.com/office/drawing/2017/decorative" val="1"/>
+                    <adec:decorative xmlns:adec="http://schemas.microsoft.com/office/drawing/2017/decorative" xmlns="" val="1"/>
                   </a:ext>
                 </a:extLst>
               </p:cNvPr>
@@ -29749,7 +29769,7 @@
               </a:ln>
               <a:extLst>
                 <a:ext uri="{91240B29-F687-4f45-9708-019B960494DF}">
-                  <a14:hiddenLine xmlns:a14="http://schemas.microsoft.com/office/drawing/2010/main" xmlns:p14="http://schemas.microsoft.com/office/powerpoint/2010/main" xmlns:a16="http://schemas.microsoft.com/office/drawing/2014/main" xmlns="" w="9525">
+                  <a14:hiddenLine xmlns="" xmlns:a16="http://schemas.microsoft.com/office/drawing/2014/main" xmlns:p14="http://schemas.microsoft.com/office/powerpoint/2010/main" xmlns:a14="http://schemas.microsoft.com/office/drawing/2010/main" w="9525">
                     <a:solidFill>
                       <a:srgbClr val="000000"/>
                     </a:solidFill>
@@ -29769,7 +29789,7 @@
                     <a16:creationId xmlns:a16="http://schemas.microsoft.com/office/drawing/2014/main" id="{F44AA128-AA96-4FF2-A1C3-F9D2E7FD38CA}"/>
                   </a:ext>
                   <a:ext uri="{C183D7F6-B498-43B3-948B-1728B52AA6E4}">
-                    <adec:decorative xmlns:adec="http://schemas.microsoft.com/office/drawing/2017/decorative" val="1"/>
+                    <adec:decorative xmlns:adec="http://schemas.microsoft.com/office/drawing/2017/decorative" xmlns="" val="1"/>
                   </a:ext>
                 </a:extLst>
               </p:cNvPr>
@@ -29826,7 +29846,7 @@
               </a:ln>
               <a:extLst>
                 <a:ext uri="{91240B29-F687-4f45-9708-019B960494DF}">
-                  <a14:hiddenLine xmlns:a14="http://schemas.microsoft.com/office/drawing/2010/main" xmlns:p14="http://schemas.microsoft.com/office/powerpoint/2010/main" xmlns:a16="http://schemas.microsoft.com/office/drawing/2014/main" xmlns="" w="9525">
+                  <a14:hiddenLine xmlns="" xmlns:a16="http://schemas.microsoft.com/office/drawing/2014/main" xmlns:p14="http://schemas.microsoft.com/office/powerpoint/2010/main" xmlns:a14="http://schemas.microsoft.com/office/drawing/2010/main" w="9525">
                     <a:solidFill>
                       <a:srgbClr val="000000"/>
                     </a:solidFill>
@@ -29846,7 +29866,7 @@
                     <a16:creationId xmlns:a16="http://schemas.microsoft.com/office/drawing/2014/main" id="{7E52DC12-230B-4892-B284-F2FE9DE16A7C}"/>
                   </a:ext>
                   <a:ext uri="{C183D7F6-B498-43B3-948B-1728B52AA6E4}">
-                    <adec:decorative xmlns:adec="http://schemas.microsoft.com/office/drawing/2017/decorative" val="1"/>
+                    <adec:decorative xmlns:adec="http://schemas.microsoft.com/office/drawing/2017/decorative" xmlns="" val="1"/>
                   </a:ext>
                 </a:extLst>
               </p:cNvPr>
@@ -29931,7 +29951,7 @@
               </a:ln>
               <a:extLst>
                 <a:ext uri="{91240B29-F687-4f45-9708-019B960494DF}">
-                  <a14:hiddenLine xmlns:a14="http://schemas.microsoft.com/office/drawing/2010/main" xmlns:p14="http://schemas.microsoft.com/office/powerpoint/2010/main" xmlns:a16="http://schemas.microsoft.com/office/drawing/2014/main" xmlns="" w="9525">
+                  <a14:hiddenLine xmlns="" xmlns:a16="http://schemas.microsoft.com/office/drawing/2014/main" xmlns:p14="http://schemas.microsoft.com/office/powerpoint/2010/main" xmlns:a14="http://schemas.microsoft.com/office/drawing/2010/main" w="9525">
                     <a:solidFill>
                       <a:srgbClr val="000000"/>
                     </a:solidFill>
@@ -29951,7 +29971,7 @@
                     <a16:creationId xmlns:a16="http://schemas.microsoft.com/office/drawing/2014/main" id="{A68FBF9E-B81A-41D0-8A03-6CFC30811D1F}"/>
                   </a:ext>
                   <a:ext uri="{C183D7F6-B498-43B3-948B-1728B52AA6E4}">
-                    <adec:decorative xmlns:adec="http://schemas.microsoft.com/office/drawing/2017/decorative" val="1"/>
+                    <adec:decorative xmlns:adec="http://schemas.microsoft.com/office/drawing/2017/decorative" xmlns="" val="1"/>
                   </a:ext>
                 </a:extLst>
               </p:cNvPr>
@@ -30008,7 +30028,7 @@
               </a:ln>
               <a:extLst>
                 <a:ext uri="{91240B29-F687-4f45-9708-019B960494DF}">
-                  <a14:hiddenLine xmlns:a14="http://schemas.microsoft.com/office/drawing/2010/main" xmlns:p14="http://schemas.microsoft.com/office/powerpoint/2010/main" xmlns:a16="http://schemas.microsoft.com/office/drawing/2014/main" xmlns="" w="9525">
+                  <a14:hiddenLine xmlns="" xmlns:a16="http://schemas.microsoft.com/office/drawing/2014/main" xmlns:p14="http://schemas.microsoft.com/office/powerpoint/2010/main" xmlns:a14="http://schemas.microsoft.com/office/drawing/2010/main" w="9525">
                     <a:solidFill>
                       <a:srgbClr val="000000"/>
                     </a:solidFill>
@@ -30028,7 +30048,7 @@
                     <a16:creationId xmlns:a16="http://schemas.microsoft.com/office/drawing/2014/main" id="{B0047F84-8480-494F-9241-39FF17CFFFAE}"/>
                   </a:ext>
                   <a:ext uri="{C183D7F6-B498-43B3-948B-1728B52AA6E4}">
-                    <adec:decorative xmlns:adec="http://schemas.microsoft.com/office/drawing/2017/decorative" val="1"/>
+                    <adec:decorative xmlns:adec="http://schemas.microsoft.com/office/drawing/2017/decorative" xmlns="" val="1"/>
                   </a:ext>
                 </a:extLst>
               </p:cNvPr>
@@ -30085,7 +30105,7 @@
               </a:ln>
               <a:extLst>
                 <a:ext uri="{91240B29-F687-4f45-9708-019B960494DF}">
-                  <a14:hiddenLine xmlns:a14="http://schemas.microsoft.com/office/drawing/2010/main" xmlns:p14="http://schemas.microsoft.com/office/powerpoint/2010/main" xmlns:a16="http://schemas.microsoft.com/office/drawing/2014/main" xmlns="" w="9525">
+                  <a14:hiddenLine xmlns="" xmlns:a16="http://schemas.microsoft.com/office/drawing/2014/main" xmlns:p14="http://schemas.microsoft.com/office/powerpoint/2010/main" xmlns:a14="http://schemas.microsoft.com/office/drawing/2010/main" w="9525">
                     <a:solidFill>
                       <a:srgbClr val="000000"/>
                     </a:solidFill>
@@ -30105,7 +30125,7 @@
                     <a16:creationId xmlns:a16="http://schemas.microsoft.com/office/drawing/2014/main" id="{8CAF76D8-4B95-4A8E-9EE5-8CCC0A7AD2CA}"/>
                   </a:ext>
                   <a:ext uri="{C183D7F6-B498-43B3-948B-1728B52AA6E4}">
-                    <adec:decorative xmlns:adec="http://schemas.microsoft.com/office/drawing/2017/decorative" val="1"/>
+                    <adec:decorative xmlns:adec="http://schemas.microsoft.com/office/drawing/2017/decorative" xmlns="" val="1"/>
                   </a:ext>
                 </a:extLst>
               </p:cNvPr>
@@ -30190,7 +30210,7 @@
               </a:ln>
               <a:extLst>
                 <a:ext uri="{91240B29-F687-4f45-9708-019B960494DF}">
-                  <a14:hiddenLine xmlns:a14="http://schemas.microsoft.com/office/drawing/2010/main" xmlns:p14="http://schemas.microsoft.com/office/powerpoint/2010/main" xmlns:a16="http://schemas.microsoft.com/office/drawing/2014/main" xmlns="" w="9525">
+                  <a14:hiddenLine xmlns="" xmlns:a16="http://schemas.microsoft.com/office/drawing/2014/main" xmlns:p14="http://schemas.microsoft.com/office/powerpoint/2010/main" xmlns:a14="http://schemas.microsoft.com/office/drawing/2010/main" w="9525">
                     <a:solidFill>
                       <a:srgbClr val="000000"/>
                     </a:solidFill>
@@ -30210,7 +30230,7 @@
                     <a16:creationId xmlns:a16="http://schemas.microsoft.com/office/drawing/2014/main" id="{792F82F3-05A8-4A55-8C5B-81F6678B595B}"/>
                   </a:ext>
                   <a:ext uri="{C183D7F6-B498-43B3-948B-1728B52AA6E4}">
-                    <adec:decorative xmlns:adec="http://schemas.microsoft.com/office/drawing/2017/decorative" val="1"/>
+                    <adec:decorative xmlns:adec="http://schemas.microsoft.com/office/drawing/2017/decorative" xmlns="" val="1"/>
                   </a:ext>
                 </a:extLst>
               </p:cNvPr>
@@ -30295,7 +30315,7 @@
               </a:ln>
               <a:extLst>
                 <a:ext uri="{91240B29-F687-4f45-9708-019B960494DF}">
-                  <a14:hiddenLine xmlns:a14="http://schemas.microsoft.com/office/drawing/2010/main" xmlns:p14="http://schemas.microsoft.com/office/powerpoint/2010/main" xmlns:a16="http://schemas.microsoft.com/office/drawing/2014/main" xmlns="" w="9525">
+                  <a14:hiddenLine xmlns="" xmlns:a16="http://schemas.microsoft.com/office/drawing/2014/main" xmlns:p14="http://schemas.microsoft.com/office/powerpoint/2010/main" xmlns:a14="http://schemas.microsoft.com/office/drawing/2010/main" w="9525">
                     <a:solidFill>
                       <a:srgbClr val="000000"/>
                     </a:solidFill>
@@ -30315,7 +30335,7 @@
                     <a16:creationId xmlns:a16="http://schemas.microsoft.com/office/drawing/2014/main" id="{B8472536-021A-4E59-BD59-DDC090A18ABE}"/>
                   </a:ext>
                   <a:ext uri="{C183D7F6-B498-43B3-948B-1728B52AA6E4}">
-                    <adec:decorative xmlns:adec="http://schemas.microsoft.com/office/drawing/2017/decorative" val="1"/>
+                    <adec:decorative xmlns:adec="http://schemas.microsoft.com/office/drawing/2017/decorative" xmlns="" val="1"/>
                   </a:ext>
                 </a:extLst>
               </p:cNvPr>
@@ -30372,7 +30392,7 @@
               </a:ln>
               <a:extLst>
                 <a:ext uri="{91240B29-F687-4f45-9708-019B960494DF}">
-                  <a14:hiddenLine xmlns:a14="http://schemas.microsoft.com/office/drawing/2010/main" xmlns:p14="http://schemas.microsoft.com/office/powerpoint/2010/main" xmlns:a16="http://schemas.microsoft.com/office/drawing/2014/main" xmlns="" w="9525">
+                  <a14:hiddenLine xmlns="" xmlns:a16="http://schemas.microsoft.com/office/drawing/2014/main" xmlns:p14="http://schemas.microsoft.com/office/powerpoint/2010/main" xmlns:a14="http://schemas.microsoft.com/office/drawing/2010/main" w="9525">
                     <a:solidFill>
                       <a:srgbClr val="000000"/>
                     </a:solidFill>
@@ -30392,7 +30412,7 @@
                     <a16:creationId xmlns:a16="http://schemas.microsoft.com/office/drawing/2014/main" id="{AEBEF646-3C12-469F-B194-A161A7A95D2F}"/>
                   </a:ext>
                   <a:ext uri="{C183D7F6-B498-43B3-948B-1728B52AA6E4}">
-                    <adec:decorative xmlns:adec="http://schemas.microsoft.com/office/drawing/2017/decorative" val="1"/>
+                    <adec:decorative xmlns:adec="http://schemas.microsoft.com/office/drawing/2017/decorative" xmlns="" val="1"/>
                   </a:ext>
                 </a:extLst>
               </p:cNvPr>
@@ -30497,7 +30517,7 @@
               </a:ln>
               <a:extLst>
                 <a:ext uri="{91240B29-F687-4f45-9708-019B960494DF}">
-                  <a14:hiddenLine xmlns:a14="http://schemas.microsoft.com/office/drawing/2010/main" xmlns:p14="http://schemas.microsoft.com/office/powerpoint/2010/main" xmlns:a16="http://schemas.microsoft.com/office/drawing/2014/main" xmlns="" w="9525">
+                  <a14:hiddenLine xmlns="" xmlns:a16="http://schemas.microsoft.com/office/drawing/2014/main" xmlns:p14="http://schemas.microsoft.com/office/powerpoint/2010/main" xmlns:a14="http://schemas.microsoft.com/office/drawing/2010/main" w="9525">
                     <a:solidFill>
                       <a:srgbClr val="000000"/>
                     </a:solidFill>
@@ -30517,7 +30537,7 @@
                     <a16:creationId xmlns:a16="http://schemas.microsoft.com/office/drawing/2014/main" id="{D4501159-D7AC-4307-9DFC-C8F3A94341DA}"/>
                   </a:ext>
                   <a:ext uri="{C183D7F6-B498-43B3-948B-1728B52AA6E4}">
-                    <adec:decorative xmlns:adec="http://schemas.microsoft.com/office/drawing/2017/decorative" val="1"/>
+                    <adec:decorative xmlns:adec="http://schemas.microsoft.com/office/drawing/2017/decorative" xmlns="" val="1"/>
                   </a:ext>
                 </a:extLst>
               </p:cNvPr>
@@ -30560,7 +30580,7 @@
                     <a16:creationId xmlns:a16="http://schemas.microsoft.com/office/drawing/2014/main" id="{B5244C41-454C-47D8-A6A9-C17EC2A36631}"/>
                   </a:ext>
                   <a:ext uri="{C183D7F6-B498-43B3-948B-1728B52AA6E4}">
-                    <adec:decorative xmlns:adec="http://schemas.microsoft.com/office/drawing/2017/decorative" val="1"/>
+                    <adec:decorative xmlns:adec="http://schemas.microsoft.com/office/drawing/2017/decorative" xmlns="" val="1"/>
                   </a:ext>
                 </a:extLst>
               </p:cNvPr>
@@ -30611,7 +30631,7 @@
               </a:ln>
               <a:extLst>
                 <a:ext uri="{91240B29-F687-4f45-9708-019B960494DF}">
-                  <a14:hiddenLine xmlns:a14="http://schemas.microsoft.com/office/drawing/2010/main" xmlns:p14="http://schemas.microsoft.com/office/powerpoint/2010/main" xmlns:a16="http://schemas.microsoft.com/office/drawing/2014/main" xmlns="" w="9525">
+                  <a14:hiddenLine xmlns="" xmlns:a16="http://schemas.microsoft.com/office/drawing/2014/main" xmlns:p14="http://schemas.microsoft.com/office/powerpoint/2010/main" xmlns:a14="http://schemas.microsoft.com/office/drawing/2010/main" w="9525">
                     <a:solidFill>
                       <a:srgbClr val="000000"/>
                     </a:solidFill>
@@ -30631,7 +30651,7 @@
                     <a16:creationId xmlns:a16="http://schemas.microsoft.com/office/drawing/2014/main" id="{8FA883B8-99FB-4540-B573-F0674BFB1C2A}"/>
                   </a:ext>
                   <a:ext uri="{C183D7F6-B498-43B3-948B-1728B52AA6E4}">
-                    <adec:decorative xmlns:adec="http://schemas.microsoft.com/office/drawing/2017/decorative" val="1"/>
+                    <adec:decorative xmlns:adec="http://schemas.microsoft.com/office/drawing/2017/decorative" xmlns="" val="1"/>
                   </a:ext>
                 </a:extLst>
               </p:cNvPr>
@@ -30688,7 +30708,7 @@
               </a:ln>
               <a:extLst>
                 <a:ext uri="{91240B29-F687-4f45-9708-019B960494DF}">
-                  <a14:hiddenLine xmlns:a14="http://schemas.microsoft.com/office/drawing/2010/main" xmlns:p14="http://schemas.microsoft.com/office/powerpoint/2010/main" xmlns:a16="http://schemas.microsoft.com/office/drawing/2014/main" xmlns="" w="9525">
+                  <a14:hiddenLine xmlns="" xmlns:a16="http://schemas.microsoft.com/office/drawing/2014/main" xmlns:p14="http://schemas.microsoft.com/office/powerpoint/2010/main" xmlns:a14="http://schemas.microsoft.com/office/drawing/2010/main" w="9525">
                     <a:solidFill>
                       <a:srgbClr val="000000"/>
                     </a:solidFill>
@@ -30708,7 +30728,7 @@
                     <a16:creationId xmlns:a16="http://schemas.microsoft.com/office/drawing/2014/main" id="{F1178B7C-5A00-4E5B-9010-B1477621E049}"/>
                   </a:ext>
                   <a:ext uri="{C183D7F6-B498-43B3-948B-1728B52AA6E4}">
-                    <adec:decorative xmlns:adec="http://schemas.microsoft.com/office/drawing/2017/decorative" val="1"/>
+                    <adec:decorative xmlns:adec="http://schemas.microsoft.com/office/drawing/2017/decorative" xmlns="" val="1"/>
                   </a:ext>
                 </a:extLst>
               </p:cNvPr>
@@ -30765,7 +30785,7 @@
               </a:ln>
               <a:extLst>
                 <a:ext uri="{91240B29-F687-4f45-9708-019B960494DF}">
-                  <a14:hiddenLine xmlns:a14="http://schemas.microsoft.com/office/drawing/2010/main" xmlns:p14="http://schemas.microsoft.com/office/powerpoint/2010/main" xmlns:a16="http://schemas.microsoft.com/office/drawing/2014/main" xmlns="" w="9525">
+                  <a14:hiddenLine xmlns="" xmlns:a16="http://schemas.microsoft.com/office/drawing/2014/main" xmlns:p14="http://schemas.microsoft.com/office/powerpoint/2010/main" xmlns:a14="http://schemas.microsoft.com/office/drawing/2010/main" w="9525">
                     <a:solidFill>
                       <a:srgbClr val="000000"/>
                     </a:solidFill>
@@ -30785,7 +30805,7 @@
                     <a16:creationId xmlns:a16="http://schemas.microsoft.com/office/drawing/2014/main" id="{E359D5D8-EE2E-4714-A40A-C3A6D91F9897}"/>
                   </a:ext>
                   <a:ext uri="{C183D7F6-B498-43B3-948B-1728B52AA6E4}">
-                    <adec:decorative xmlns:adec="http://schemas.microsoft.com/office/drawing/2017/decorative" val="1"/>
+                    <adec:decorative xmlns:adec="http://schemas.microsoft.com/office/drawing/2017/decorative" xmlns="" val="1"/>
                   </a:ext>
                 </a:extLst>
               </p:cNvPr>
@@ -30870,7 +30890,7 @@
               </a:ln>
               <a:extLst>
                 <a:ext uri="{91240B29-F687-4f45-9708-019B960494DF}">
-                  <a14:hiddenLine xmlns:a14="http://schemas.microsoft.com/office/drawing/2010/main" xmlns:p14="http://schemas.microsoft.com/office/powerpoint/2010/main" xmlns:a16="http://schemas.microsoft.com/office/drawing/2014/main" xmlns="" w="9525">
+                  <a14:hiddenLine xmlns="" xmlns:a16="http://schemas.microsoft.com/office/drawing/2014/main" xmlns:p14="http://schemas.microsoft.com/office/powerpoint/2010/main" xmlns:a14="http://schemas.microsoft.com/office/drawing/2010/main" w="9525">
                     <a:solidFill>
                       <a:srgbClr val="000000"/>
                     </a:solidFill>
@@ -30890,7 +30910,7 @@
                     <a16:creationId xmlns:a16="http://schemas.microsoft.com/office/drawing/2014/main" id="{8A89C2E5-F892-4666-85FB-995578FBC739}"/>
                   </a:ext>
                   <a:ext uri="{C183D7F6-B498-43B3-948B-1728B52AA6E4}">
-                    <adec:decorative xmlns:adec="http://schemas.microsoft.com/office/drawing/2017/decorative" val="1"/>
+                    <adec:decorative xmlns:adec="http://schemas.microsoft.com/office/drawing/2017/decorative" xmlns="" val="1"/>
                   </a:ext>
                 </a:extLst>
               </p:cNvPr>
@@ -30919,7 +30939,7 @@
               </a:ln>
               <a:extLst>
                 <a:ext uri="{91240B29-F687-4f45-9708-019B960494DF}">
-                  <a14:hiddenLine xmlns:a14="http://schemas.microsoft.com/office/drawing/2010/main" xmlns:p14="http://schemas.microsoft.com/office/powerpoint/2010/main" xmlns:a16="http://schemas.microsoft.com/office/drawing/2014/main" xmlns="" w="9525">
+                  <a14:hiddenLine xmlns="" xmlns:a16="http://schemas.microsoft.com/office/drawing/2014/main" xmlns:p14="http://schemas.microsoft.com/office/powerpoint/2010/main" xmlns:a14="http://schemas.microsoft.com/office/drawing/2010/main" w="9525">
                     <a:solidFill>
                       <a:srgbClr val="000000"/>
                     </a:solidFill>
@@ -30939,7 +30959,7 @@
                     <a16:creationId xmlns:a16="http://schemas.microsoft.com/office/drawing/2014/main" id="{6DC6174B-0EC3-4A81-A0D1-D10DBB869A5A}"/>
                   </a:ext>
                   <a:ext uri="{C183D7F6-B498-43B3-948B-1728B52AA6E4}">
-                    <adec:decorative xmlns:adec="http://schemas.microsoft.com/office/drawing/2017/decorative" val="1"/>
+                    <adec:decorative xmlns:adec="http://schemas.microsoft.com/office/drawing/2017/decorative" xmlns="" val="1"/>
                   </a:ext>
                 </a:extLst>
               </p:cNvPr>
@@ -30999,7 +31019,7 @@
               </a:ln>
               <a:extLst>
                 <a:ext uri="{91240B29-F687-4f45-9708-019B960494DF}">
-                  <a14:hiddenLine xmlns:a14="http://schemas.microsoft.com/office/drawing/2010/main" xmlns:p14="http://schemas.microsoft.com/office/powerpoint/2010/main" xmlns:a16="http://schemas.microsoft.com/office/drawing/2014/main" xmlns="" w="9525">
+                  <a14:hiddenLine xmlns="" xmlns:a16="http://schemas.microsoft.com/office/drawing/2014/main" xmlns:p14="http://schemas.microsoft.com/office/powerpoint/2010/main" xmlns:a14="http://schemas.microsoft.com/office/drawing/2010/main" w="9525">
                     <a:solidFill>
                       <a:srgbClr val="000000"/>
                     </a:solidFill>
@@ -31019,7 +31039,7 @@
                     <a16:creationId xmlns:a16="http://schemas.microsoft.com/office/drawing/2014/main" id="{2CB96070-0553-4F79-984C-8DABB1CD5DB5}"/>
                   </a:ext>
                   <a:ext uri="{C183D7F6-B498-43B3-948B-1728B52AA6E4}">
-                    <adec:decorative xmlns:adec="http://schemas.microsoft.com/office/drawing/2017/decorative" val="1"/>
+                    <adec:decorative xmlns:adec="http://schemas.microsoft.com/office/drawing/2017/decorative" xmlns="" val="1"/>
                   </a:ext>
                 </a:extLst>
               </p:cNvPr>
@@ -31104,7 +31124,7 @@
               </a:ln>
               <a:extLst>
                 <a:ext uri="{91240B29-F687-4f45-9708-019B960494DF}">
-                  <a14:hiddenLine xmlns:a14="http://schemas.microsoft.com/office/drawing/2010/main" xmlns:p14="http://schemas.microsoft.com/office/powerpoint/2010/main" xmlns:a16="http://schemas.microsoft.com/office/drawing/2014/main" xmlns="" w="9525">
+                  <a14:hiddenLine xmlns="" xmlns:a16="http://schemas.microsoft.com/office/drawing/2014/main" xmlns:p14="http://schemas.microsoft.com/office/powerpoint/2010/main" xmlns:a14="http://schemas.microsoft.com/office/drawing/2010/main" w="9525">
                     <a:solidFill>
                       <a:srgbClr val="000000"/>
                     </a:solidFill>
@@ -31124,7 +31144,7 @@
                     <a16:creationId xmlns:a16="http://schemas.microsoft.com/office/drawing/2014/main" id="{BA23B6E2-3718-4009-B80E-9279154B1918}"/>
                   </a:ext>
                   <a:ext uri="{C183D7F6-B498-43B3-948B-1728B52AA6E4}">
-                    <adec:decorative xmlns:adec="http://schemas.microsoft.com/office/drawing/2017/decorative" val="1"/>
+                    <adec:decorative xmlns:adec="http://schemas.microsoft.com/office/drawing/2017/decorative" xmlns="" val="1"/>
                   </a:ext>
                 </a:extLst>
               </p:cNvPr>
@@ -31181,7 +31201,7 @@
               </a:ln>
               <a:extLst>
                 <a:ext uri="{91240B29-F687-4f45-9708-019B960494DF}">
-                  <a14:hiddenLine xmlns:a14="http://schemas.microsoft.com/office/drawing/2010/main" xmlns:p14="http://schemas.microsoft.com/office/powerpoint/2010/main" xmlns:a16="http://schemas.microsoft.com/office/drawing/2014/main" xmlns="" w="9525">
+                  <a14:hiddenLine xmlns="" xmlns:a16="http://schemas.microsoft.com/office/drawing/2014/main" xmlns:p14="http://schemas.microsoft.com/office/powerpoint/2010/main" xmlns:a14="http://schemas.microsoft.com/office/drawing/2010/main" w="9525">
                     <a:solidFill>
                       <a:srgbClr val="000000"/>
                     </a:solidFill>
@@ -31201,7 +31221,7 @@
                     <a16:creationId xmlns:a16="http://schemas.microsoft.com/office/drawing/2014/main" id="{CAFB32D5-E528-419B-80EE-1475633970AC}"/>
                   </a:ext>
                   <a:ext uri="{C183D7F6-B498-43B3-948B-1728B52AA6E4}">
-                    <adec:decorative xmlns:adec="http://schemas.microsoft.com/office/drawing/2017/decorative" val="1"/>
+                    <adec:decorative xmlns:adec="http://schemas.microsoft.com/office/drawing/2017/decorative" xmlns="" val="1"/>
                   </a:ext>
                 </a:extLst>
               </p:cNvPr>
@@ -31286,7 +31306,7 @@
               </a:ln>
               <a:extLst>
                 <a:ext uri="{91240B29-F687-4f45-9708-019B960494DF}">
-                  <a14:hiddenLine xmlns:a14="http://schemas.microsoft.com/office/drawing/2010/main" xmlns:p14="http://schemas.microsoft.com/office/powerpoint/2010/main" xmlns:a16="http://schemas.microsoft.com/office/drawing/2014/main" xmlns="" w="9525">
+                  <a14:hiddenLine xmlns="" xmlns:a16="http://schemas.microsoft.com/office/drawing/2014/main" xmlns:p14="http://schemas.microsoft.com/office/powerpoint/2010/main" xmlns:a14="http://schemas.microsoft.com/office/drawing/2010/main" w="9525">
                     <a:solidFill>
                       <a:srgbClr val="000000"/>
                     </a:solidFill>
@@ -31306,7 +31326,7 @@
                     <a16:creationId xmlns:a16="http://schemas.microsoft.com/office/drawing/2014/main" id="{A68ADD35-4FEA-404D-B2F3-23556E6E8F72}"/>
                   </a:ext>
                   <a:ext uri="{C183D7F6-B498-43B3-948B-1728B52AA6E4}">
-                    <adec:decorative xmlns:adec="http://schemas.microsoft.com/office/drawing/2017/decorative" val="1"/>
+                    <adec:decorative xmlns:adec="http://schemas.microsoft.com/office/drawing/2017/decorative" xmlns="" val="1"/>
                   </a:ext>
                 </a:extLst>
               </p:cNvPr>
@@ -31366,7 +31386,7 @@
               </a:ln>
               <a:extLst>
                 <a:ext uri="{91240B29-F687-4f45-9708-019B960494DF}">
-                  <a14:hiddenLine xmlns:a14="http://schemas.microsoft.com/office/drawing/2010/main" xmlns:p14="http://schemas.microsoft.com/office/powerpoint/2010/main" xmlns:a16="http://schemas.microsoft.com/office/drawing/2014/main" xmlns="" w="9525">
+                  <a14:hiddenLine xmlns="" xmlns:a16="http://schemas.microsoft.com/office/drawing/2014/main" xmlns:p14="http://schemas.microsoft.com/office/powerpoint/2010/main" xmlns:a14="http://schemas.microsoft.com/office/drawing/2010/main" w="9525">
                     <a:solidFill>
                       <a:srgbClr val="000000"/>
                     </a:solidFill>
@@ -31386,7 +31406,7 @@
                     <a16:creationId xmlns:a16="http://schemas.microsoft.com/office/drawing/2014/main" id="{89CF17CA-49E3-4B4A-836A-4FD55C67BECE}"/>
                   </a:ext>
                   <a:ext uri="{C183D7F6-B498-43B3-948B-1728B52AA6E4}">
-                    <adec:decorative xmlns:adec="http://schemas.microsoft.com/office/drawing/2017/decorative" val="1"/>
+                    <adec:decorative xmlns:adec="http://schemas.microsoft.com/office/drawing/2017/decorative" xmlns="" val="1"/>
                   </a:ext>
                 </a:extLst>
               </p:cNvPr>
@@ -31443,7 +31463,7 @@
               </a:ln>
               <a:extLst>
                 <a:ext uri="{91240B29-F687-4f45-9708-019B960494DF}">
-                  <a14:hiddenLine xmlns:a14="http://schemas.microsoft.com/office/drawing/2010/main" xmlns:p14="http://schemas.microsoft.com/office/powerpoint/2010/main" xmlns:a16="http://schemas.microsoft.com/office/drawing/2014/main" xmlns="" w="9525">
+                  <a14:hiddenLine xmlns="" xmlns:a16="http://schemas.microsoft.com/office/drawing/2014/main" xmlns:p14="http://schemas.microsoft.com/office/powerpoint/2010/main" xmlns:a14="http://schemas.microsoft.com/office/drawing/2010/main" w="9525">
                     <a:solidFill>
                       <a:srgbClr val="000000"/>
                     </a:solidFill>
@@ -31463,7 +31483,7 @@
                     <a16:creationId xmlns:a16="http://schemas.microsoft.com/office/drawing/2014/main" id="{AB394F2E-F3E7-4CED-84A9-35C47AB287C8}"/>
                   </a:ext>
                   <a:ext uri="{C183D7F6-B498-43B3-948B-1728B52AA6E4}">
-                    <adec:decorative xmlns:adec="http://schemas.microsoft.com/office/drawing/2017/decorative" val="1"/>
+                    <adec:decorative xmlns:adec="http://schemas.microsoft.com/office/drawing/2017/decorative" xmlns="" val="1"/>
                   </a:ext>
                 </a:extLst>
               </p:cNvPr>
@@ -31548,7 +31568,7 @@
               </a:ln>
               <a:extLst>
                 <a:ext uri="{91240B29-F687-4f45-9708-019B960494DF}">
-                  <a14:hiddenLine xmlns:a14="http://schemas.microsoft.com/office/drawing/2010/main" xmlns:p14="http://schemas.microsoft.com/office/powerpoint/2010/main" xmlns:a16="http://schemas.microsoft.com/office/drawing/2014/main" xmlns="" w="9525">
+                  <a14:hiddenLine xmlns="" xmlns:a16="http://schemas.microsoft.com/office/drawing/2014/main" xmlns:p14="http://schemas.microsoft.com/office/powerpoint/2010/main" xmlns:a14="http://schemas.microsoft.com/office/drawing/2010/main" w="9525">
                     <a:solidFill>
                       <a:srgbClr val="000000"/>
                     </a:solidFill>
@@ -31568,7 +31588,7 @@
                     <a16:creationId xmlns:a16="http://schemas.microsoft.com/office/drawing/2014/main" id="{FF816C2F-3999-4A9F-8395-5D68ED33A41E}"/>
                   </a:ext>
                   <a:ext uri="{C183D7F6-B498-43B3-948B-1728B52AA6E4}">
-                    <adec:decorative xmlns:adec="http://schemas.microsoft.com/office/drawing/2017/decorative" val="1"/>
+                    <adec:decorative xmlns:adec="http://schemas.microsoft.com/office/drawing/2017/decorative" xmlns="" val="1"/>
                   </a:ext>
                 </a:extLst>
               </p:cNvPr>
@@ -31653,7 +31673,7 @@
               </a:ln>
               <a:extLst>
                 <a:ext uri="{91240B29-F687-4f45-9708-019B960494DF}">
-                  <a14:hiddenLine xmlns:a14="http://schemas.microsoft.com/office/drawing/2010/main" xmlns:p14="http://schemas.microsoft.com/office/powerpoint/2010/main" xmlns:a16="http://schemas.microsoft.com/office/drawing/2014/main" xmlns="" w="9525">
+                  <a14:hiddenLine xmlns="" xmlns:a16="http://schemas.microsoft.com/office/drawing/2014/main" xmlns:p14="http://schemas.microsoft.com/office/powerpoint/2010/main" xmlns:a14="http://schemas.microsoft.com/office/drawing/2010/main" w="9525">
                     <a:solidFill>
                       <a:srgbClr val="000000"/>
                     </a:solidFill>
@@ -31673,7 +31693,7 @@
                     <a16:creationId xmlns:a16="http://schemas.microsoft.com/office/drawing/2014/main" id="{82AD6AC6-71D5-4BD8-9185-D3062968B57E}"/>
                   </a:ext>
                   <a:ext uri="{C183D7F6-B498-43B3-948B-1728B52AA6E4}">
-                    <adec:decorative xmlns:adec="http://schemas.microsoft.com/office/drawing/2017/decorative" val="1"/>
+                    <adec:decorative xmlns:adec="http://schemas.microsoft.com/office/drawing/2017/decorative" xmlns="" val="1"/>
                   </a:ext>
                 </a:extLst>
               </p:cNvPr>
@@ -31733,7 +31753,7 @@
               </a:ln>
               <a:extLst>
                 <a:ext uri="{91240B29-F687-4f45-9708-019B960494DF}">
-                  <a14:hiddenLine xmlns:a14="http://schemas.microsoft.com/office/drawing/2010/main" xmlns:p14="http://schemas.microsoft.com/office/powerpoint/2010/main" xmlns:a16="http://schemas.microsoft.com/office/drawing/2014/main" xmlns="" w="9525">
+                  <a14:hiddenLine xmlns="" xmlns:a16="http://schemas.microsoft.com/office/drawing/2014/main" xmlns:p14="http://schemas.microsoft.com/office/powerpoint/2010/main" xmlns:a14="http://schemas.microsoft.com/office/drawing/2010/main" w="9525">
                     <a:solidFill>
                       <a:srgbClr val="000000"/>
                     </a:solidFill>
@@ -31753,7 +31773,7 @@
                     <a16:creationId xmlns:a16="http://schemas.microsoft.com/office/drawing/2014/main" id="{743A50C2-65CF-4F4C-B412-6149A93ACFE5}"/>
                   </a:ext>
                   <a:ext uri="{C183D7F6-B498-43B3-948B-1728B52AA6E4}">
-                    <adec:decorative xmlns:adec="http://schemas.microsoft.com/office/drawing/2017/decorative" val="1"/>
+                    <adec:decorative xmlns:adec="http://schemas.microsoft.com/office/drawing/2017/decorative" xmlns="" val="1"/>
                   </a:ext>
                 </a:extLst>
               </p:cNvPr>
@@ -31868,7 +31888,7 @@
               </a:ln>
               <a:extLst>
                 <a:ext uri="{91240B29-F687-4f45-9708-019B960494DF}">
-                  <a14:hiddenLine xmlns:a14="http://schemas.microsoft.com/office/drawing/2010/main" xmlns:p14="http://schemas.microsoft.com/office/powerpoint/2010/main" xmlns:a16="http://schemas.microsoft.com/office/drawing/2014/main" xmlns="" w="9525">
+                  <a14:hiddenLine xmlns="" xmlns:a16="http://schemas.microsoft.com/office/drawing/2014/main" xmlns:p14="http://schemas.microsoft.com/office/powerpoint/2010/main" xmlns:a14="http://schemas.microsoft.com/office/drawing/2010/main" w="9525">
                     <a:solidFill>
                       <a:srgbClr val="000000"/>
                     </a:solidFill>
@@ -31889,7 +31909,7 @@
                   <a16:creationId xmlns:a16="http://schemas.microsoft.com/office/drawing/2014/main" id="{6C0E7A88-FEDF-4C4F-A6B4-F7DDE9DE926A}"/>
                 </a:ext>
                 <a:ext uri="{C183D7F6-B498-43B3-948B-1728B52AA6E4}">
-                  <adec:decorative xmlns:adec="http://schemas.microsoft.com/office/drawing/2017/decorative" val="1"/>
+                  <adec:decorative xmlns:adec="http://schemas.microsoft.com/office/drawing/2017/decorative" xmlns="" val="1"/>
                 </a:ext>
               </a:extLst>
             </p:cNvPr>
@@ -31933,7 +31953,7 @@
                     <a16:creationId xmlns:a16="http://schemas.microsoft.com/office/drawing/2014/main" id="{AE94B3EE-D5C0-4BDE-B6AA-7599F0486EA5}"/>
                   </a:ext>
                   <a:ext uri="{C183D7F6-B498-43B3-948B-1728B52AA6E4}">
-                    <adec:decorative xmlns:adec="http://schemas.microsoft.com/office/drawing/2017/decorative" val="1"/>
+                    <adec:decorative xmlns:adec="http://schemas.microsoft.com/office/drawing/2017/decorative" xmlns="" val="1"/>
                   </a:ext>
                 </a:extLst>
               </p:cNvPr>
@@ -31993,7 +32013,7 @@
               </a:ln>
               <a:extLst>
                 <a:ext uri="{91240B29-F687-4f45-9708-019B960494DF}">
-                  <a14:hiddenLine xmlns:a14="http://schemas.microsoft.com/office/drawing/2010/main" xmlns:p14="http://schemas.microsoft.com/office/powerpoint/2010/main" xmlns:a16="http://schemas.microsoft.com/office/drawing/2014/main" xmlns="" w="9525">
+                  <a14:hiddenLine xmlns="" xmlns:a16="http://schemas.microsoft.com/office/drawing/2014/main" xmlns:p14="http://schemas.microsoft.com/office/powerpoint/2010/main" xmlns:a14="http://schemas.microsoft.com/office/drawing/2010/main" w="9525">
                     <a:solidFill>
                       <a:srgbClr val="000000"/>
                     </a:solidFill>
@@ -32013,7 +32033,7 @@
                     <a16:creationId xmlns:a16="http://schemas.microsoft.com/office/drawing/2014/main" id="{5EF110E8-C00D-454E-8F3A-ECF2D356676F}"/>
                   </a:ext>
                   <a:ext uri="{C183D7F6-B498-43B3-948B-1728B52AA6E4}">
-                    <adec:decorative xmlns:adec="http://schemas.microsoft.com/office/drawing/2017/decorative" val="1"/>
+                    <adec:decorative xmlns:adec="http://schemas.microsoft.com/office/drawing/2017/decorative" xmlns="" val="1"/>
                   </a:ext>
                 </a:extLst>
               </p:cNvPr>
@@ -32123,7 +32143,7 @@
               </a:ln>
               <a:extLst>
                 <a:ext uri="{91240B29-F687-4f45-9708-019B960494DF}">
-                  <a14:hiddenLine xmlns:a14="http://schemas.microsoft.com/office/drawing/2010/main" xmlns:p14="http://schemas.microsoft.com/office/powerpoint/2010/main" xmlns:a16="http://schemas.microsoft.com/office/drawing/2014/main" xmlns="" w="9525">
+                  <a14:hiddenLine xmlns="" xmlns:a16="http://schemas.microsoft.com/office/drawing/2014/main" xmlns:p14="http://schemas.microsoft.com/office/powerpoint/2010/main" xmlns:a14="http://schemas.microsoft.com/office/drawing/2010/main" w="9525">
                     <a:solidFill>
                       <a:srgbClr val="000000"/>
                     </a:solidFill>
@@ -32143,7 +32163,7 @@
                     <a16:creationId xmlns:a16="http://schemas.microsoft.com/office/drawing/2014/main" id="{BFC5F327-6927-4F35-9AF6-C45527BB4512}"/>
                   </a:ext>
                   <a:ext uri="{C183D7F6-B498-43B3-948B-1728B52AA6E4}">
-                    <adec:decorative xmlns:adec="http://schemas.microsoft.com/office/drawing/2017/decorative" val="1"/>
+                    <adec:decorative xmlns:adec="http://schemas.microsoft.com/office/drawing/2017/decorative" xmlns="" val="1"/>
                   </a:ext>
                 </a:extLst>
               </p:cNvPr>
@@ -32228,7 +32248,7 @@
               </a:ln>
               <a:extLst>
                 <a:ext uri="{91240B29-F687-4f45-9708-019B960494DF}">
-                  <a14:hiddenLine xmlns:a14="http://schemas.microsoft.com/office/drawing/2010/main" xmlns:p14="http://schemas.microsoft.com/office/powerpoint/2010/main" xmlns:a16="http://schemas.microsoft.com/office/drawing/2014/main" xmlns="" w="9525">
+                  <a14:hiddenLine xmlns="" xmlns:a16="http://schemas.microsoft.com/office/drawing/2014/main" xmlns:p14="http://schemas.microsoft.com/office/powerpoint/2010/main" xmlns:a14="http://schemas.microsoft.com/office/drawing/2010/main" w="9525">
                     <a:solidFill>
                       <a:srgbClr val="000000"/>
                     </a:solidFill>
@@ -32248,7 +32268,7 @@
                     <a16:creationId xmlns:a16="http://schemas.microsoft.com/office/drawing/2014/main" id="{BF2D314D-AEDE-418D-9702-D3CDB98C30FB}"/>
                   </a:ext>
                   <a:ext uri="{C183D7F6-B498-43B3-948B-1728B52AA6E4}">
-                    <adec:decorative xmlns:adec="http://schemas.microsoft.com/office/drawing/2017/decorative" val="1"/>
+                    <adec:decorative xmlns:adec="http://schemas.microsoft.com/office/drawing/2017/decorative" xmlns="" val="1"/>
                   </a:ext>
                 </a:extLst>
               </p:cNvPr>
@@ -32308,7 +32328,7 @@
               </a:ln>
               <a:extLst>
                 <a:ext uri="{91240B29-F687-4f45-9708-019B960494DF}">
-                  <a14:hiddenLine xmlns:a14="http://schemas.microsoft.com/office/drawing/2010/main" xmlns:p14="http://schemas.microsoft.com/office/powerpoint/2010/main" xmlns:a16="http://schemas.microsoft.com/office/drawing/2014/main" xmlns="" w="9525">
+                  <a14:hiddenLine xmlns="" xmlns:a16="http://schemas.microsoft.com/office/drawing/2014/main" xmlns:p14="http://schemas.microsoft.com/office/powerpoint/2010/main" xmlns:a14="http://schemas.microsoft.com/office/drawing/2010/main" w="9525">
                     <a:solidFill>
                       <a:srgbClr val="000000"/>
                     </a:solidFill>
@@ -32328,7 +32348,7 @@
                     <a16:creationId xmlns:a16="http://schemas.microsoft.com/office/drawing/2014/main" id="{64FD07F8-3CA6-4209-9A9E-30609FE9A36D}"/>
                   </a:ext>
                   <a:ext uri="{C183D7F6-B498-43B3-948B-1728B52AA6E4}">
-                    <adec:decorative xmlns:adec="http://schemas.microsoft.com/office/drawing/2017/decorative" val="1"/>
+                    <adec:decorative xmlns:adec="http://schemas.microsoft.com/office/drawing/2017/decorative" xmlns="" val="1"/>
                   </a:ext>
                 </a:extLst>
               </p:cNvPr>
@@ -32413,7 +32433,7 @@
               </a:ln>
               <a:extLst>
                 <a:ext uri="{91240B29-F687-4f45-9708-019B960494DF}">
-                  <a14:hiddenLine xmlns:a14="http://schemas.microsoft.com/office/drawing/2010/main" xmlns:p14="http://schemas.microsoft.com/office/powerpoint/2010/main" xmlns:a16="http://schemas.microsoft.com/office/drawing/2014/main" xmlns="" w="9525">
+                  <a14:hiddenLine xmlns="" xmlns:a16="http://schemas.microsoft.com/office/drawing/2014/main" xmlns:p14="http://schemas.microsoft.com/office/powerpoint/2010/main" xmlns:a14="http://schemas.microsoft.com/office/drawing/2010/main" w="9525">
                     <a:solidFill>
                       <a:srgbClr val="000000"/>
                     </a:solidFill>
@@ -32433,7 +32453,7 @@
                     <a16:creationId xmlns:a16="http://schemas.microsoft.com/office/drawing/2014/main" id="{AB0AE24D-CD49-4B57-82E0-780F62AE4FDE}"/>
                   </a:ext>
                   <a:ext uri="{C183D7F6-B498-43B3-948B-1728B52AA6E4}">
-                    <adec:decorative xmlns:adec="http://schemas.microsoft.com/office/drawing/2017/decorative" val="1"/>
+                    <adec:decorative xmlns:adec="http://schemas.microsoft.com/office/drawing/2017/decorative" xmlns="" val="1"/>
                   </a:ext>
                 </a:extLst>
               </p:cNvPr>
@@ -32496,7 +32516,7 @@
               </a:ln>
               <a:extLst>
                 <a:ext uri="{91240B29-F687-4f45-9708-019B960494DF}">
-                  <a14:hiddenLine xmlns:a14="http://schemas.microsoft.com/office/drawing/2010/main" xmlns:p14="http://schemas.microsoft.com/office/powerpoint/2010/main" xmlns:a16="http://schemas.microsoft.com/office/drawing/2014/main" xmlns="" w="9525">
+                  <a14:hiddenLine xmlns="" xmlns:a16="http://schemas.microsoft.com/office/drawing/2014/main" xmlns:p14="http://schemas.microsoft.com/office/powerpoint/2010/main" xmlns:a14="http://schemas.microsoft.com/office/drawing/2010/main" w="9525">
                     <a:solidFill>
                       <a:srgbClr val="000000"/>
                     </a:solidFill>
@@ -32516,7 +32536,7 @@
                     <a16:creationId xmlns:a16="http://schemas.microsoft.com/office/drawing/2014/main" id="{66803AF8-6368-45E6-A0B7-C0C4CFFEEB51}"/>
                   </a:ext>
                   <a:ext uri="{C183D7F6-B498-43B3-948B-1728B52AA6E4}">
-                    <adec:decorative xmlns:adec="http://schemas.microsoft.com/office/drawing/2017/decorative" val="1"/>
+                    <adec:decorative xmlns:adec="http://schemas.microsoft.com/office/drawing/2017/decorative" xmlns="" val="1"/>
                   </a:ext>
                 </a:extLst>
               </p:cNvPr>
@@ -32601,7 +32621,7 @@
               </a:ln>
               <a:extLst>
                 <a:ext uri="{91240B29-F687-4f45-9708-019B960494DF}">
-                  <a14:hiddenLine xmlns:a14="http://schemas.microsoft.com/office/drawing/2010/main" xmlns:p14="http://schemas.microsoft.com/office/powerpoint/2010/main" xmlns:a16="http://schemas.microsoft.com/office/drawing/2014/main" xmlns="" w="9525">
+                  <a14:hiddenLine xmlns="" xmlns:a16="http://schemas.microsoft.com/office/drawing/2014/main" xmlns:p14="http://schemas.microsoft.com/office/powerpoint/2010/main" xmlns:a14="http://schemas.microsoft.com/office/drawing/2010/main" w="9525">
                     <a:solidFill>
                       <a:srgbClr val="000000"/>
                     </a:solidFill>
@@ -32621,7 +32641,7 @@
                     <a16:creationId xmlns:a16="http://schemas.microsoft.com/office/drawing/2014/main" id="{B4761E05-2792-472B-A814-9616151CF305}"/>
                   </a:ext>
                   <a:ext uri="{C183D7F6-B498-43B3-948B-1728B52AA6E4}">
-                    <adec:decorative xmlns:adec="http://schemas.microsoft.com/office/drawing/2017/decorative" val="1"/>
+                    <adec:decorative xmlns:adec="http://schemas.microsoft.com/office/drawing/2017/decorative" xmlns="" val="1"/>
                   </a:ext>
                 </a:extLst>
               </p:cNvPr>
@@ -32684,7 +32704,7 @@
               </a:ln>
               <a:extLst>
                 <a:ext uri="{91240B29-F687-4f45-9708-019B960494DF}">
-                  <a14:hiddenLine xmlns:a14="http://schemas.microsoft.com/office/drawing/2010/main" xmlns:p14="http://schemas.microsoft.com/office/powerpoint/2010/main" xmlns:a16="http://schemas.microsoft.com/office/drawing/2014/main" xmlns="" w="9525">
+                  <a14:hiddenLine xmlns="" xmlns:a16="http://schemas.microsoft.com/office/drawing/2014/main" xmlns:p14="http://schemas.microsoft.com/office/powerpoint/2010/main" xmlns:a14="http://schemas.microsoft.com/office/drawing/2010/main" w="9525">
                     <a:solidFill>
                       <a:srgbClr val="000000"/>
                     </a:solidFill>
@@ -32704,7 +32724,7 @@
                     <a16:creationId xmlns:a16="http://schemas.microsoft.com/office/drawing/2014/main" id="{40B6A261-9427-4E70-9564-048AD009BD83}"/>
                   </a:ext>
                   <a:ext uri="{C183D7F6-B498-43B3-948B-1728B52AA6E4}">
-                    <adec:decorative xmlns:adec="http://schemas.microsoft.com/office/drawing/2017/decorative" val="1"/>
+                    <adec:decorative xmlns:adec="http://schemas.microsoft.com/office/drawing/2017/decorative" xmlns="" val="1"/>
                   </a:ext>
                 </a:extLst>
               </p:cNvPr>
@@ -32789,7 +32809,7 @@
               </a:ln>
               <a:extLst>
                 <a:ext uri="{91240B29-F687-4f45-9708-019B960494DF}">
-                  <a14:hiddenLine xmlns:a14="http://schemas.microsoft.com/office/drawing/2010/main" xmlns:p14="http://schemas.microsoft.com/office/powerpoint/2010/main" xmlns:a16="http://schemas.microsoft.com/office/drawing/2014/main" xmlns="" w="9525">
+                  <a14:hiddenLine xmlns="" xmlns:a16="http://schemas.microsoft.com/office/drawing/2014/main" xmlns:p14="http://schemas.microsoft.com/office/powerpoint/2010/main" xmlns:a14="http://schemas.microsoft.com/office/drawing/2010/main" w="9525">
                     <a:solidFill>
                       <a:srgbClr val="000000"/>
                     </a:solidFill>
@@ -32809,7 +32829,7 @@
                     <a16:creationId xmlns:a16="http://schemas.microsoft.com/office/drawing/2014/main" id="{68BFDFBE-2286-4123-9436-E1DF84AF494F}"/>
                   </a:ext>
                   <a:ext uri="{C183D7F6-B498-43B3-948B-1728B52AA6E4}">
-                    <adec:decorative xmlns:adec="http://schemas.microsoft.com/office/drawing/2017/decorative" val="1"/>
+                    <adec:decorative xmlns:adec="http://schemas.microsoft.com/office/drawing/2017/decorative" xmlns="" val="1"/>
                   </a:ext>
                 </a:extLst>
               </p:cNvPr>
@@ -32838,7 +32858,7 @@
               </a:ln>
               <a:extLst>
                 <a:ext uri="{91240B29-F687-4f45-9708-019B960494DF}">
-                  <a14:hiddenLine xmlns:a14="http://schemas.microsoft.com/office/drawing/2010/main" xmlns:p14="http://schemas.microsoft.com/office/powerpoint/2010/main" xmlns:a16="http://schemas.microsoft.com/office/drawing/2014/main" xmlns="" w="9525">
+                  <a14:hiddenLine xmlns="" xmlns:a16="http://schemas.microsoft.com/office/drawing/2014/main" xmlns:p14="http://schemas.microsoft.com/office/powerpoint/2010/main" xmlns:a14="http://schemas.microsoft.com/office/drawing/2010/main" w="9525">
                     <a:solidFill>
                       <a:srgbClr val="000000"/>
                     </a:solidFill>
@@ -32860,7 +32880,7 @@
                 <a16:creationId xmlns:a16="http://schemas.microsoft.com/office/drawing/2014/main" id="{5B3DE270-418F-47A7-B311-C4D876041DC6}"/>
               </a:ext>
               <a:ext uri="{C183D7F6-B498-43B3-948B-1728B52AA6E4}">
-                <adec:decorative xmlns:adec="http://schemas.microsoft.com/office/drawing/2017/decorative" val="1"/>
+                <adec:decorative xmlns:adec="http://schemas.microsoft.com/office/drawing/2017/decorative" xmlns="" val="1"/>
               </a:ext>
             </a:extLst>
           </p:cNvPr>
@@ -32900,7 +32920,7 @@
           <a:noFill/>
           <a:extLst>
             <a:ext uri="{909E8E84-426E-40dd-AFC4-6F175D3DCCD1}">
-              <a14:hiddenFill xmlns:a14="http://schemas.microsoft.com/office/drawing/2010/main" xmlns:p14="http://schemas.microsoft.com/office/powerpoint/2010/main" xmlns:a16="http://schemas.microsoft.com/office/drawing/2014/main" xmlns="">
+              <a14:hiddenFill xmlns="" xmlns:a16="http://schemas.microsoft.com/office/drawing/2014/main" xmlns:p14="http://schemas.microsoft.com/office/powerpoint/2010/main" xmlns:a14="http://schemas.microsoft.com/office/drawing/2010/main">
                 <a:solidFill>
                   <a:srgbClr val="FFFFFF"/>
                 </a:solidFill>
@@ -32961,7 +32981,7 @@
                 <a16:creationId xmlns:a16="http://schemas.microsoft.com/office/drawing/2014/main" id="{A1351C6B-7343-451F-AB4A-1CE294A4E927}"/>
               </a:ext>
               <a:ext uri="{C183D7F6-B498-43B3-948B-1728B52AA6E4}">
-                <adec:decorative xmlns:adec="http://schemas.microsoft.com/office/drawing/2017/decorative" val="1"/>
+                <adec:decorative xmlns:adec="http://schemas.microsoft.com/office/drawing/2017/decorative" xmlns="" val="1"/>
               </a:ext>
             </a:extLst>
           </p:cNvPr>
@@ -33106,7 +33126,7 @@
               <a:buSzPct val="125000"/>
             </a:pPr>
             <a:r>
-              <a:rPr lang="en-US" sz="1200" kern="1200" dirty="0" err="1">
+              <a:rPr lang="es-EC" sz="1200" kern="1200" dirty="0" smtClean="0">
                 <a:solidFill>
                   <a:srgbClr val="FFFFFF"/>
                 </a:solidFill>
@@ -33118,6 +33138,18 @@
               <a:t>Actualmente</a:t>
             </a:r>
             <a:r>
+              <a:rPr lang="en-US" sz="1200" kern="1200" dirty="0" smtClean="0">
+                <a:solidFill>
+                  <a:srgbClr val="FFFFFF"/>
+                </a:solidFill>
+                <a:latin typeface="+mn-lt"/>
+                <a:ea typeface="+mn-ea"/>
+                <a:cs typeface="+mn-cs"/>
+                <a:sym typeface="PT Serif"/>
+              </a:rPr>
+              <a:t>, </a:t>
+            </a:r>
+            <a:r>
               <a:rPr lang="en-US" sz="1200" kern="1200" dirty="0">
                 <a:solidFill>
                   <a:srgbClr val="FFFFFF"/>
@@ -33127,7 +33159,7 @@
                 <a:cs typeface="+mn-cs"/>
                 <a:sym typeface="PT Serif"/>
               </a:rPr>
-              <a:t>, el Patio de </a:t>
+              <a:t>el Patio de </a:t>
             </a:r>
             <a:r>
               <a:rPr lang="en-US" sz="1200" kern="1200" dirty="0" err="1">
@@ -33538,7 +33570,7 @@
               <a:t> por </a:t>
             </a:r>
             <a:r>
-              <a:rPr lang="en-US" kern="1200" dirty="0" err="1">
+              <a:rPr lang="en-US" kern="1200" dirty="0">
                 <a:solidFill>
                   <a:srgbClr val="FFFFFF"/>
                 </a:solidFill>
@@ -34005,142 +34037,6 @@
 <file path=ppt/slides/slide3.xml><?xml version="1.0" encoding="utf-8"?>
 <p:sld xmlns:a="http://schemas.openxmlformats.org/drawingml/2006/main" xmlns:r="http://schemas.openxmlformats.org/officeDocument/2006/relationships" xmlns:p="http://schemas.openxmlformats.org/presentationml/2006/main">
   <p:cSld>
-    <p:spTree>
-      <p:nvGrpSpPr>
-        <p:cNvPr id="1" name=""/>
-        <p:cNvGrpSpPr/>
-        <p:nvPr/>
-      </p:nvGrpSpPr>
-      <p:grpSpPr>
-        <a:xfrm>
-          <a:off x="0" y="0"/>
-          <a:ext cx="0" cy="0"/>
-          <a:chOff x="0" y="0"/>
-          <a:chExt cx="0" cy="0"/>
-        </a:xfrm>
-      </p:grpSpPr>
-      <p:sp>
-        <p:nvSpPr>
-          <p:cNvPr id="4" name="Título 3">
-            <a:extLst>
-              <a:ext uri="{FF2B5EF4-FFF2-40B4-BE49-F238E27FC236}">
-                <a16:creationId xmlns:a16="http://schemas.microsoft.com/office/drawing/2014/main" id="{1506D1A8-888C-4B7A-9C63-5C9B66E5C3F8}"/>
-              </a:ext>
-            </a:extLst>
-          </p:cNvPr>
-          <p:cNvSpPr>
-            <a:spLocks noGrp="1"/>
-          </p:cNvSpPr>
-          <p:nvPr>
-            <p:ph type="title"/>
-          </p:nvPr>
-        </p:nvSpPr>
-        <p:spPr>
-          <a:xfrm>
-            <a:off x="2318100" y="113175"/>
-            <a:ext cx="4507800" cy="460336"/>
-          </a:xfrm>
-        </p:spPr>
-        <p:txBody>
-          <a:bodyPr/>
-          <a:lstStyle/>
-          <a:p>
-            <a:r>
-              <a:rPr lang="es-EC" dirty="0"/>
-              <a:t>PROPUESTA DE </a:t>
-            </a:r>
-            <a:r>
-              <a:rPr lang="es-EC" dirty="0" err="1"/>
-              <a:t>SOLUcIÓN</a:t>
-            </a:r>
-            <a:endParaRPr lang="es-EC" dirty="0"/>
-          </a:p>
-        </p:txBody>
-      </p:sp>
-      <p:sp>
-        <p:nvSpPr>
-          <p:cNvPr id="5" name="Marcador de número de diapositiva 4">
-            <a:extLst>
-              <a:ext uri="{FF2B5EF4-FFF2-40B4-BE49-F238E27FC236}">
-                <a16:creationId xmlns:a16="http://schemas.microsoft.com/office/drawing/2014/main" id="{B75E5717-7B56-4EE1-AE42-87710D53EF87}"/>
-              </a:ext>
-            </a:extLst>
-          </p:cNvPr>
-          <p:cNvSpPr>
-            <a:spLocks noGrp="1"/>
-          </p:cNvSpPr>
-          <p:nvPr>
-            <p:ph type="sldNum" idx="12"/>
-          </p:nvPr>
-        </p:nvSpPr>
-        <p:spPr/>
-        <p:txBody>
-          <a:bodyPr/>
-          <a:lstStyle/>
-          <a:p>
-            <a:pPr marL="0" lvl="0" indent="0" algn="ctr" rtl="0">
-              <a:spcBef>
-                <a:spcPts val="0"/>
-              </a:spcBef>
-              <a:spcAft>
-                <a:spcPts val="0"/>
-              </a:spcAft>
-              <a:buNone/>
-            </a:pPr>
-            <a:fld id="{00000000-1234-1234-1234-123412341234}" type="slidenum">
-              <a:rPr lang="es-EC" smtClean="0"/>
-              <a:t>3</a:t>
-            </a:fld>
-            <a:endParaRPr lang="es-EC"/>
-          </a:p>
-        </p:txBody>
-      </p:sp>
-      <p:pic>
-        <p:nvPicPr>
-          <p:cNvPr id="8" name="Imagen 7">
-            <a:extLst>
-              <a:ext uri="{FF2B5EF4-FFF2-40B4-BE49-F238E27FC236}">
-                <a16:creationId xmlns:a16="http://schemas.microsoft.com/office/drawing/2014/main" id="{512A6AB9-94CD-4E99-B1D0-190C61BEE515}"/>
-              </a:ext>
-            </a:extLst>
-          </p:cNvPr>
-          <p:cNvPicPr>
-            <a:picLocks noChangeAspect="1"/>
-          </p:cNvPicPr>
-          <p:nvPr/>
-        </p:nvPicPr>
-        <p:blipFill>
-          <a:blip r:embed="rId2"/>
-          <a:stretch>
-            <a:fillRect/>
-          </a:stretch>
-        </p:blipFill>
-        <p:spPr>
-          <a:xfrm>
-            <a:off x="0" y="573511"/>
-            <a:ext cx="9144000" cy="4569940"/>
-          </a:xfrm>
-          <a:prstGeom prst="rect">
-            <a:avLst/>
-          </a:prstGeom>
-        </p:spPr>
-      </p:pic>
-    </p:spTree>
-    <p:extLst>
-      <p:ext uri="{BB962C8B-B14F-4D97-AF65-F5344CB8AC3E}">
-        <p14:creationId xmlns:p14="http://schemas.microsoft.com/office/powerpoint/2010/main" val="4143090709"/>
-      </p:ext>
-    </p:extLst>
-  </p:cSld>
-  <p:clrMapOvr>
-    <a:masterClrMapping/>
-  </p:clrMapOvr>
-</p:sld>
-</file>
-
-<file path=ppt/slides/slide4.xml><?xml version="1.0" encoding="utf-8"?>
-<p:sld xmlns:a="http://schemas.openxmlformats.org/drawingml/2006/main" xmlns:r="http://schemas.openxmlformats.org/officeDocument/2006/relationships" xmlns:p="http://schemas.openxmlformats.org/presentationml/2006/main">
-  <p:cSld>
     <p:bg>
       <p:bgPr>
         <a:solidFill>
@@ -34290,7 +34186,7 @@
                 <a:tabLst/>
                 <a:defRPr/>
               </a:pPr>
-              <a:t>4</a:t>
+              <a:t>3</a:t>
             </a:fld>
             <a:endParaRPr kumimoji="0" sz="1300" b="0" i="0" u="none" strike="noStrike" kern="0" cap="none" spc="0" normalizeH="0" baseline="0" noProof="0">
               <a:ln>
@@ -34649,6 +34545,142 @@
     <p:extLst>
       <p:ext uri="{BB962C8B-B14F-4D97-AF65-F5344CB8AC3E}">
         <p14:creationId xmlns:p14="http://schemas.microsoft.com/office/powerpoint/2010/main" val="3278213820"/>
+      </p:ext>
+    </p:extLst>
+  </p:cSld>
+  <p:clrMapOvr>
+    <a:masterClrMapping/>
+  </p:clrMapOvr>
+</p:sld>
+</file>
+
+<file path=ppt/slides/slide4.xml><?xml version="1.0" encoding="utf-8"?>
+<p:sld xmlns:a="http://schemas.openxmlformats.org/drawingml/2006/main" xmlns:r="http://schemas.openxmlformats.org/officeDocument/2006/relationships" xmlns:p="http://schemas.openxmlformats.org/presentationml/2006/main">
+  <p:cSld>
+    <p:spTree>
+      <p:nvGrpSpPr>
+        <p:cNvPr id="1" name=""/>
+        <p:cNvGrpSpPr/>
+        <p:nvPr/>
+      </p:nvGrpSpPr>
+      <p:grpSpPr>
+        <a:xfrm>
+          <a:off x="0" y="0"/>
+          <a:ext cx="0" cy="0"/>
+          <a:chOff x="0" y="0"/>
+          <a:chExt cx="0" cy="0"/>
+        </a:xfrm>
+      </p:grpSpPr>
+      <p:sp>
+        <p:nvSpPr>
+          <p:cNvPr id="4" name="Título 3">
+            <a:extLst>
+              <a:ext uri="{FF2B5EF4-FFF2-40B4-BE49-F238E27FC236}">
+                <a16:creationId xmlns:a16="http://schemas.microsoft.com/office/drawing/2014/main" id="{1506D1A8-888C-4B7A-9C63-5C9B66E5C3F8}"/>
+              </a:ext>
+            </a:extLst>
+          </p:cNvPr>
+          <p:cNvSpPr>
+            <a:spLocks noGrp="1"/>
+          </p:cNvSpPr>
+          <p:nvPr>
+            <p:ph type="title"/>
+          </p:nvPr>
+        </p:nvSpPr>
+        <p:spPr>
+          <a:xfrm>
+            <a:off x="2318100" y="113175"/>
+            <a:ext cx="4507800" cy="460336"/>
+          </a:xfrm>
+        </p:spPr>
+        <p:txBody>
+          <a:bodyPr/>
+          <a:lstStyle/>
+          <a:p>
+            <a:r>
+              <a:rPr lang="es-EC" dirty="0"/>
+              <a:t>PROPUESTA DE </a:t>
+            </a:r>
+            <a:r>
+              <a:rPr lang="es-EC" dirty="0" err="1"/>
+              <a:t>SOLUcIÓN</a:t>
+            </a:r>
+            <a:endParaRPr lang="es-EC" dirty="0"/>
+          </a:p>
+        </p:txBody>
+      </p:sp>
+      <p:sp>
+        <p:nvSpPr>
+          <p:cNvPr id="5" name="Marcador de número de diapositiva 4">
+            <a:extLst>
+              <a:ext uri="{FF2B5EF4-FFF2-40B4-BE49-F238E27FC236}">
+                <a16:creationId xmlns:a16="http://schemas.microsoft.com/office/drawing/2014/main" id="{B75E5717-7B56-4EE1-AE42-87710D53EF87}"/>
+              </a:ext>
+            </a:extLst>
+          </p:cNvPr>
+          <p:cNvSpPr>
+            <a:spLocks noGrp="1"/>
+          </p:cNvSpPr>
+          <p:nvPr>
+            <p:ph type="sldNum" idx="12"/>
+          </p:nvPr>
+        </p:nvSpPr>
+        <p:spPr/>
+        <p:txBody>
+          <a:bodyPr/>
+          <a:lstStyle/>
+          <a:p>
+            <a:pPr marL="0" lvl="0" indent="0" algn="ctr" rtl="0">
+              <a:spcBef>
+                <a:spcPts val="0"/>
+              </a:spcBef>
+              <a:spcAft>
+                <a:spcPts val="0"/>
+              </a:spcAft>
+              <a:buNone/>
+            </a:pPr>
+            <a:fld id="{00000000-1234-1234-1234-123412341234}" type="slidenum">
+              <a:rPr lang="es-EC" smtClean="0"/>
+              <a:t>4</a:t>
+            </a:fld>
+            <a:endParaRPr lang="es-EC"/>
+          </a:p>
+        </p:txBody>
+      </p:sp>
+      <p:pic>
+        <p:nvPicPr>
+          <p:cNvPr id="8" name="Imagen 7">
+            <a:extLst>
+              <a:ext uri="{FF2B5EF4-FFF2-40B4-BE49-F238E27FC236}">
+                <a16:creationId xmlns:a16="http://schemas.microsoft.com/office/drawing/2014/main" id="{512A6AB9-94CD-4E99-B1D0-190C61BEE515}"/>
+              </a:ext>
+            </a:extLst>
+          </p:cNvPr>
+          <p:cNvPicPr>
+            <a:picLocks noChangeAspect="1"/>
+          </p:cNvPicPr>
+          <p:nvPr/>
+        </p:nvPicPr>
+        <p:blipFill>
+          <a:blip r:embed="rId2"/>
+          <a:stretch>
+            <a:fillRect/>
+          </a:stretch>
+        </p:blipFill>
+        <p:spPr>
+          <a:xfrm>
+            <a:off x="0" y="573511"/>
+            <a:ext cx="9144000" cy="4569940"/>
+          </a:xfrm>
+          <a:prstGeom prst="rect">
+            <a:avLst/>
+          </a:prstGeom>
+        </p:spPr>
+      </p:pic>
+    </p:spTree>
+    <p:extLst>
+      <p:ext uri="{BB962C8B-B14F-4D97-AF65-F5344CB8AC3E}">
+        <p14:creationId xmlns:p14="http://schemas.microsoft.com/office/powerpoint/2010/main" val="4143090709"/>
       </p:ext>
     </p:extLst>
   </p:cSld>

</xml_diff>